<commit_message>
Docs: Illustrated full process.
</commit_message>
<xml_diff>
--- a/docs/images/Diagrams.pptx
+++ b/docs/images/Diagrams.pptx
@@ -104,6 +104,11 @@
       </a:defRPr>
     </a:lvl9pPr>
   </p:defaultTextStyle>
+  <p:extLst>
+    <p:ext uri="{EFAFB233-063F-42B5-8137-9DF3F51BA10A}">
+      <p15:sldGuideLst xmlns:p15="http://schemas.microsoft.com/office/powerpoint/2012/main"/>
+    </p:ext>
+  </p:extLst>
 </p:presentation>
 </file>
 
@@ -256,7 +261,7 @@
           <a:p>
             <a:fld id="{30A9C857-609A-43FA-83CE-07000BF55DB0}" type="datetimeFigureOut">
               <a:rPr lang="en-GB" smtClean="0"/>
-              <a:t>26/10/2022</a:t>
+              <a:t>27/10/2022</a:t>
             </a:fld>
             <a:endParaRPr lang="en-GB"/>
           </a:p>
@@ -456,7 +461,7 @@
           <a:p>
             <a:fld id="{30A9C857-609A-43FA-83CE-07000BF55DB0}" type="datetimeFigureOut">
               <a:rPr lang="en-GB" smtClean="0"/>
-              <a:t>26/10/2022</a:t>
+              <a:t>27/10/2022</a:t>
             </a:fld>
             <a:endParaRPr lang="en-GB"/>
           </a:p>
@@ -666,7 +671,7 @@
           <a:p>
             <a:fld id="{30A9C857-609A-43FA-83CE-07000BF55DB0}" type="datetimeFigureOut">
               <a:rPr lang="en-GB" smtClean="0"/>
-              <a:t>26/10/2022</a:t>
+              <a:t>27/10/2022</a:t>
             </a:fld>
             <a:endParaRPr lang="en-GB"/>
           </a:p>
@@ -866,7 +871,7 @@
           <a:p>
             <a:fld id="{30A9C857-609A-43FA-83CE-07000BF55DB0}" type="datetimeFigureOut">
               <a:rPr lang="en-GB" smtClean="0"/>
-              <a:t>26/10/2022</a:t>
+              <a:t>27/10/2022</a:t>
             </a:fld>
             <a:endParaRPr lang="en-GB"/>
           </a:p>
@@ -1142,7 +1147,7 @@
           <a:p>
             <a:fld id="{30A9C857-609A-43FA-83CE-07000BF55DB0}" type="datetimeFigureOut">
               <a:rPr lang="en-GB" smtClean="0"/>
-              <a:t>26/10/2022</a:t>
+              <a:t>27/10/2022</a:t>
             </a:fld>
             <a:endParaRPr lang="en-GB"/>
           </a:p>
@@ -1410,7 +1415,7 @@
           <a:p>
             <a:fld id="{30A9C857-609A-43FA-83CE-07000BF55DB0}" type="datetimeFigureOut">
               <a:rPr lang="en-GB" smtClean="0"/>
-              <a:t>26/10/2022</a:t>
+              <a:t>27/10/2022</a:t>
             </a:fld>
             <a:endParaRPr lang="en-GB"/>
           </a:p>
@@ -1825,7 +1830,7 @@
           <a:p>
             <a:fld id="{30A9C857-609A-43FA-83CE-07000BF55DB0}" type="datetimeFigureOut">
               <a:rPr lang="en-GB" smtClean="0"/>
-              <a:t>26/10/2022</a:t>
+              <a:t>27/10/2022</a:t>
             </a:fld>
             <a:endParaRPr lang="en-GB"/>
           </a:p>
@@ -1967,7 +1972,7 @@
           <a:p>
             <a:fld id="{30A9C857-609A-43FA-83CE-07000BF55DB0}" type="datetimeFigureOut">
               <a:rPr lang="en-GB" smtClean="0"/>
-              <a:t>26/10/2022</a:t>
+              <a:t>27/10/2022</a:t>
             </a:fld>
             <a:endParaRPr lang="en-GB"/>
           </a:p>
@@ -2080,7 +2085,7 @@
           <a:p>
             <a:fld id="{30A9C857-609A-43FA-83CE-07000BF55DB0}" type="datetimeFigureOut">
               <a:rPr lang="en-GB" smtClean="0"/>
-              <a:t>26/10/2022</a:t>
+              <a:t>27/10/2022</a:t>
             </a:fld>
             <a:endParaRPr lang="en-GB"/>
           </a:p>
@@ -2393,7 +2398,7 @@
           <a:p>
             <a:fld id="{30A9C857-609A-43FA-83CE-07000BF55DB0}" type="datetimeFigureOut">
               <a:rPr lang="en-GB" smtClean="0"/>
-              <a:t>26/10/2022</a:t>
+              <a:t>27/10/2022</a:t>
             </a:fld>
             <a:endParaRPr lang="en-GB"/>
           </a:p>
@@ -2682,7 +2687,7 @@
           <a:p>
             <a:fld id="{30A9C857-609A-43FA-83CE-07000BF55DB0}" type="datetimeFigureOut">
               <a:rPr lang="en-GB" smtClean="0"/>
-              <a:t>26/10/2022</a:t>
+              <a:t>27/10/2022</a:t>
             </a:fld>
             <a:endParaRPr lang="en-GB"/>
           </a:p>
@@ -2925,7 +2930,7 @@
           <a:p>
             <a:fld id="{30A9C857-609A-43FA-83CE-07000BF55DB0}" type="datetimeFigureOut">
               <a:rPr lang="en-GB" smtClean="0"/>
-              <a:t>26/10/2022</a:t>
+              <a:t>27/10/2022</a:t>
             </a:fld>
             <a:endParaRPr lang="en-GB"/>
           </a:p>
@@ -3414,6 +3419,13 @@
           <a:prstGeom prst="rect">
             <a:avLst/>
           </a:prstGeom>
+          <a:effectLst>
+            <a:outerShdw blurRad="50800" dist="38100" dir="2700000" algn="tl" rotWithShape="0">
+              <a:prstClr val="black">
+                <a:alpha val="40000"/>
+              </a:prstClr>
+            </a:outerShdw>
+          </a:effectLst>
         </p:spPr>
         <p:style>
           <a:lnRef idx="2">
@@ -3646,6 +3658,13 @@
           <a:prstGeom prst="line">
             <a:avLst/>
           </a:prstGeom>
+          <a:effectLst>
+            <a:outerShdw blurRad="50800" dist="38100" dir="2700000" algn="tl" rotWithShape="0">
+              <a:prstClr val="black">
+                <a:alpha val="40000"/>
+              </a:prstClr>
+            </a:outerShdw>
+          </a:effectLst>
         </p:spPr>
         <p:style>
           <a:lnRef idx="3">
@@ -3682,6 +3701,13 @@
           <a:prstGeom prst="line">
             <a:avLst/>
           </a:prstGeom>
+          <a:effectLst>
+            <a:outerShdw blurRad="50800" dist="38100" dir="2700000" algn="tl" rotWithShape="0">
+              <a:prstClr val="black">
+                <a:alpha val="40000"/>
+              </a:prstClr>
+            </a:outerShdw>
+          </a:effectLst>
         </p:spPr>
         <p:style>
           <a:lnRef idx="3">
@@ -3718,6 +3744,13 @@
           <a:prstGeom prst="line">
             <a:avLst/>
           </a:prstGeom>
+          <a:effectLst>
+            <a:outerShdw blurRad="50800" dist="38100" dir="2700000" algn="tl" rotWithShape="0">
+              <a:prstClr val="black">
+                <a:alpha val="40000"/>
+              </a:prstClr>
+            </a:outerShdw>
+          </a:effectLst>
         </p:spPr>
         <p:style>
           <a:lnRef idx="3">
@@ -3754,6 +3787,13 @@
           <a:prstGeom prst="line">
             <a:avLst/>
           </a:prstGeom>
+          <a:effectLst>
+            <a:outerShdw blurRad="50800" dist="38100" dir="2700000" algn="tl" rotWithShape="0">
+              <a:prstClr val="black">
+                <a:alpha val="40000"/>
+              </a:prstClr>
+            </a:outerShdw>
+          </a:effectLst>
         </p:spPr>
         <p:style>
           <a:lnRef idx="3">
@@ -3790,6 +3830,13 @@
           <a:prstGeom prst="line">
             <a:avLst/>
           </a:prstGeom>
+          <a:effectLst>
+            <a:outerShdw blurRad="50800" dist="38100" dir="2700000" algn="tl" rotWithShape="0">
+              <a:prstClr val="black">
+                <a:alpha val="40000"/>
+              </a:prstClr>
+            </a:outerShdw>
+          </a:effectLst>
         </p:spPr>
         <p:style>
           <a:lnRef idx="3">

</xml_diff>

<commit_message>
Updated RISC CPU docs
</commit_message>
<xml_diff>
--- a/docs/images/Diagrams.pptx
+++ b/docs/images/Diagrams.pptx
@@ -7,6 +7,7 @@
   <p:sldIdLst>
     <p:sldId id="256" r:id="rId2"/>
     <p:sldId id="257" r:id="rId3"/>
+    <p:sldId id="258" r:id="rId4"/>
   </p:sldIdLst>
   <p:sldSz cx="12192000" cy="6858000"/>
   <p:notesSz cx="6858000" cy="9144000"/>
@@ -262,7 +263,7 @@
           <a:p>
             <a:fld id="{30A9C857-609A-43FA-83CE-07000BF55DB0}" type="datetimeFigureOut">
               <a:rPr lang="en-GB" smtClean="0"/>
-              <a:t>30/10/2022</a:t>
+              <a:t>10/11/2022</a:t>
             </a:fld>
             <a:endParaRPr lang="en-GB"/>
           </a:p>
@@ -462,7 +463,7 @@
           <a:p>
             <a:fld id="{30A9C857-609A-43FA-83CE-07000BF55DB0}" type="datetimeFigureOut">
               <a:rPr lang="en-GB" smtClean="0"/>
-              <a:t>30/10/2022</a:t>
+              <a:t>10/11/2022</a:t>
             </a:fld>
             <a:endParaRPr lang="en-GB"/>
           </a:p>
@@ -672,7 +673,7 @@
           <a:p>
             <a:fld id="{30A9C857-609A-43FA-83CE-07000BF55DB0}" type="datetimeFigureOut">
               <a:rPr lang="en-GB" smtClean="0"/>
-              <a:t>30/10/2022</a:t>
+              <a:t>10/11/2022</a:t>
             </a:fld>
             <a:endParaRPr lang="en-GB"/>
           </a:p>
@@ -872,7 +873,7 @@
           <a:p>
             <a:fld id="{30A9C857-609A-43FA-83CE-07000BF55DB0}" type="datetimeFigureOut">
               <a:rPr lang="en-GB" smtClean="0"/>
-              <a:t>30/10/2022</a:t>
+              <a:t>10/11/2022</a:t>
             </a:fld>
             <a:endParaRPr lang="en-GB"/>
           </a:p>
@@ -1148,7 +1149,7 @@
           <a:p>
             <a:fld id="{30A9C857-609A-43FA-83CE-07000BF55DB0}" type="datetimeFigureOut">
               <a:rPr lang="en-GB" smtClean="0"/>
-              <a:t>30/10/2022</a:t>
+              <a:t>10/11/2022</a:t>
             </a:fld>
             <a:endParaRPr lang="en-GB"/>
           </a:p>
@@ -1416,7 +1417,7 @@
           <a:p>
             <a:fld id="{30A9C857-609A-43FA-83CE-07000BF55DB0}" type="datetimeFigureOut">
               <a:rPr lang="en-GB" smtClean="0"/>
-              <a:t>30/10/2022</a:t>
+              <a:t>10/11/2022</a:t>
             </a:fld>
             <a:endParaRPr lang="en-GB"/>
           </a:p>
@@ -1831,7 +1832,7 @@
           <a:p>
             <a:fld id="{30A9C857-609A-43FA-83CE-07000BF55DB0}" type="datetimeFigureOut">
               <a:rPr lang="en-GB" smtClean="0"/>
-              <a:t>30/10/2022</a:t>
+              <a:t>10/11/2022</a:t>
             </a:fld>
             <a:endParaRPr lang="en-GB"/>
           </a:p>
@@ -1973,7 +1974,7 @@
           <a:p>
             <a:fld id="{30A9C857-609A-43FA-83CE-07000BF55DB0}" type="datetimeFigureOut">
               <a:rPr lang="en-GB" smtClean="0"/>
-              <a:t>30/10/2022</a:t>
+              <a:t>10/11/2022</a:t>
             </a:fld>
             <a:endParaRPr lang="en-GB"/>
           </a:p>
@@ -2086,7 +2087,7 @@
           <a:p>
             <a:fld id="{30A9C857-609A-43FA-83CE-07000BF55DB0}" type="datetimeFigureOut">
               <a:rPr lang="en-GB" smtClean="0"/>
-              <a:t>30/10/2022</a:t>
+              <a:t>10/11/2022</a:t>
             </a:fld>
             <a:endParaRPr lang="en-GB"/>
           </a:p>
@@ -2399,7 +2400,7 @@
           <a:p>
             <a:fld id="{30A9C857-609A-43FA-83CE-07000BF55DB0}" type="datetimeFigureOut">
               <a:rPr lang="en-GB" smtClean="0"/>
-              <a:t>30/10/2022</a:t>
+              <a:t>10/11/2022</a:t>
             </a:fld>
             <a:endParaRPr lang="en-GB"/>
           </a:p>
@@ -2688,7 +2689,7 @@
           <a:p>
             <a:fld id="{30A9C857-609A-43FA-83CE-07000BF55DB0}" type="datetimeFigureOut">
               <a:rPr lang="en-GB" smtClean="0"/>
-              <a:t>30/10/2022</a:t>
+              <a:t>10/11/2022</a:t>
             </a:fld>
             <a:endParaRPr lang="en-GB"/>
           </a:p>
@@ -2931,7 +2932,7 @@
           <a:p>
             <a:fld id="{30A9C857-609A-43FA-83CE-07000BF55DB0}" type="datetimeFigureOut">
               <a:rPr lang="en-GB" smtClean="0"/>
-              <a:t>30/10/2022</a:t>
+              <a:t>10/11/2022</a:t>
             </a:fld>
             <a:endParaRPr lang="en-GB"/>
           </a:p>
@@ -6330,6 +6331,2478 @@
 </p:sld>
 </file>
 
+<file path=ppt/slides/slide3.xml><?xml version="1.0" encoding="utf-8"?>
+<p:sld xmlns:a="http://schemas.openxmlformats.org/drawingml/2006/main" xmlns:r="http://schemas.openxmlformats.org/officeDocument/2006/relationships" xmlns:p="http://schemas.openxmlformats.org/presentationml/2006/main">
+  <p:cSld>
+    <p:spTree>
+      <p:nvGrpSpPr>
+        <p:cNvPr id="1" name=""/>
+        <p:cNvGrpSpPr/>
+        <p:nvPr/>
+      </p:nvGrpSpPr>
+      <p:grpSpPr>
+        <a:xfrm>
+          <a:off x="0" y="0"/>
+          <a:ext cx="0" cy="0"/>
+          <a:chOff x="0" y="0"/>
+          <a:chExt cx="0" cy="0"/>
+        </a:xfrm>
+      </p:grpSpPr>
+      <p:sp>
+        <p:nvSpPr>
+          <p:cNvPr id="94" name="Rectangle 93">
+            <a:extLst>
+              <a:ext uri="{FF2B5EF4-FFF2-40B4-BE49-F238E27FC236}">
+                <a16:creationId xmlns:a16="http://schemas.microsoft.com/office/drawing/2014/main" id="{F03E01E4-46C6-212F-BED7-53F290F21AA6}"/>
+              </a:ext>
+            </a:extLst>
+          </p:cNvPr>
+          <p:cNvSpPr/>
+          <p:nvPr/>
+        </p:nvSpPr>
+        <p:spPr>
+          <a:xfrm>
+            <a:off x="1244600" y="1513840"/>
+            <a:ext cx="3789680" cy="2910840"/>
+          </a:xfrm>
+          <a:prstGeom prst="rect">
+            <a:avLst/>
+          </a:prstGeom>
+          <a:ln>
+            <a:noFill/>
+          </a:ln>
+        </p:spPr>
+        <p:style>
+          <a:lnRef idx="2">
+            <a:schemeClr val="dk1"/>
+          </a:lnRef>
+          <a:fillRef idx="1">
+            <a:schemeClr val="lt1"/>
+          </a:fillRef>
+          <a:effectRef idx="0">
+            <a:schemeClr val="dk1"/>
+          </a:effectRef>
+          <a:fontRef idx="minor">
+            <a:schemeClr val="dk1"/>
+          </a:fontRef>
+        </p:style>
+        <p:txBody>
+          <a:bodyPr rtlCol="0" anchor="ctr"/>
+          <a:lstStyle/>
+          <a:p>
+            <a:pPr algn="ctr"/>
+            <a:endParaRPr lang="en-GB"/>
+          </a:p>
+        </p:txBody>
+      </p:sp>
+      <p:sp>
+        <p:nvSpPr>
+          <p:cNvPr id="2" name="Rectangle 1">
+            <a:extLst>
+              <a:ext uri="{FF2B5EF4-FFF2-40B4-BE49-F238E27FC236}">
+                <a16:creationId xmlns:a16="http://schemas.microsoft.com/office/drawing/2014/main" id="{91E30762-9D34-4724-7C56-9F2AE5FFF4ED}"/>
+              </a:ext>
+            </a:extLst>
+          </p:cNvPr>
+          <p:cNvSpPr/>
+          <p:nvPr/>
+        </p:nvSpPr>
+        <p:spPr>
+          <a:xfrm>
+            <a:off x="2793650" y="1626121"/>
+            <a:ext cx="914400" cy="914400"/>
+          </a:xfrm>
+          <a:prstGeom prst="rect">
+            <a:avLst/>
+          </a:prstGeom>
+          <a:effectLst>
+            <a:outerShdw blurRad="50800" dist="38100" dir="2700000" algn="tl" rotWithShape="0">
+              <a:prstClr val="black">
+                <a:alpha val="40000"/>
+              </a:prstClr>
+            </a:outerShdw>
+          </a:effectLst>
+        </p:spPr>
+        <p:style>
+          <a:lnRef idx="2">
+            <a:schemeClr val="dk1"/>
+          </a:lnRef>
+          <a:fillRef idx="1">
+            <a:schemeClr val="lt1"/>
+          </a:fillRef>
+          <a:effectRef idx="0">
+            <a:schemeClr val="dk1"/>
+          </a:effectRef>
+          <a:fontRef idx="minor">
+            <a:schemeClr val="dk1"/>
+          </a:fontRef>
+        </p:style>
+        <p:txBody>
+          <a:bodyPr rtlCol="0" anchor="ctr"/>
+          <a:lstStyle/>
+          <a:p>
+            <a:pPr algn="ctr"/>
+            <a:r>
+              <a:rPr lang="en-GB" dirty="0"/>
+              <a:t>ROM</a:t>
+            </a:r>
+          </a:p>
+        </p:txBody>
+      </p:sp>
+      <p:sp>
+        <p:nvSpPr>
+          <p:cNvPr id="3" name="Rectangle 2">
+            <a:extLst>
+              <a:ext uri="{FF2B5EF4-FFF2-40B4-BE49-F238E27FC236}">
+                <a16:creationId xmlns:a16="http://schemas.microsoft.com/office/drawing/2014/main" id="{C1113ED5-7B7D-B160-471C-1A86F021B81C}"/>
+              </a:ext>
+            </a:extLst>
+          </p:cNvPr>
+          <p:cNvSpPr/>
+          <p:nvPr/>
+        </p:nvSpPr>
+        <p:spPr>
+          <a:xfrm>
+            <a:off x="2793650" y="2971800"/>
+            <a:ext cx="914400" cy="914400"/>
+          </a:xfrm>
+          <a:prstGeom prst="rect">
+            <a:avLst/>
+          </a:prstGeom>
+          <a:effectLst>
+            <a:outerShdw blurRad="50800" dist="38100" dir="2700000" algn="tl" rotWithShape="0">
+              <a:prstClr val="black">
+                <a:alpha val="40000"/>
+              </a:prstClr>
+            </a:outerShdw>
+          </a:effectLst>
+        </p:spPr>
+        <p:style>
+          <a:lnRef idx="2">
+            <a:schemeClr val="dk1"/>
+          </a:lnRef>
+          <a:fillRef idx="1">
+            <a:schemeClr val="lt1"/>
+          </a:fillRef>
+          <a:effectRef idx="0">
+            <a:schemeClr val="dk1"/>
+          </a:effectRef>
+          <a:fontRef idx="minor">
+            <a:schemeClr val="dk1"/>
+          </a:fontRef>
+        </p:style>
+        <p:txBody>
+          <a:bodyPr rtlCol="0" anchor="ctr"/>
+          <a:lstStyle/>
+          <a:p>
+            <a:pPr algn="ctr"/>
+            <a:r>
+              <a:rPr lang="en-GB" dirty="0"/>
+              <a:t>RISC CPU</a:t>
+            </a:r>
+          </a:p>
+        </p:txBody>
+      </p:sp>
+      <p:grpSp>
+        <p:nvGrpSpPr>
+          <p:cNvPr id="25" name="Group 24">
+            <a:extLst>
+              <a:ext uri="{FF2B5EF4-FFF2-40B4-BE49-F238E27FC236}">
+                <a16:creationId xmlns:a16="http://schemas.microsoft.com/office/drawing/2014/main" id="{EB0A6292-D14F-0FF0-5918-F0A4E73ACA31}"/>
+              </a:ext>
+            </a:extLst>
+          </p:cNvPr>
+          <p:cNvGrpSpPr/>
+          <p:nvPr/>
+        </p:nvGrpSpPr>
+        <p:grpSpPr>
+          <a:xfrm>
+            <a:off x="4205211" y="2540521"/>
+            <a:ext cx="650875" cy="438194"/>
+            <a:chOff x="6797675" y="3488996"/>
+            <a:chExt cx="650875" cy="438194"/>
+          </a:xfrm>
+          <a:effectLst>
+            <a:outerShdw blurRad="50800" dist="38100" dir="2700000" algn="tl" rotWithShape="0">
+              <a:prstClr val="black">
+                <a:alpha val="40000"/>
+              </a:prstClr>
+            </a:outerShdw>
+          </a:effectLst>
+        </p:grpSpPr>
+        <p:sp>
+          <p:nvSpPr>
+            <p:cNvPr id="6" name="Flowchart: Extract 5">
+              <a:extLst>
+                <a:ext uri="{FF2B5EF4-FFF2-40B4-BE49-F238E27FC236}">
+                  <a16:creationId xmlns:a16="http://schemas.microsoft.com/office/drawing/2014/main" id="{2CA7C31D-7916-03EF-5350-80073B5CA380}"/>
+                </a:ext>
+              </a:extLst>
+            </p:cNvPr>
+            <p:cNvSpPr/>
+            <p:nvPr/>
+          </p:nvSpPr>
+          <p:spPr>
+            <a:xfrm rot="5400000">
+              <a:off x="6966782" y="3637105"/>
+              <a:ext cx="310580" cy="269590"/>
+            </a:xfrm>
+            <a:prstGeom prst="flowChartExtract">
+              <a:avLst/>
+            </a:prstGeom>
+          </p:spPr>
+          <p:style>
+            <a:lnRef idx="2">
+              <a:schemeClr val="dk1"/>
+            </a:lnRef>
+            <a:fillRef idx="1">
+              <a:schemeClr val="lt1"/>
+            </a:fillRef>
+            <a:effectRef idx="0">
+              <a:schemeClr val="dk1"/>
+            </a:effectRef>
+            <a:fontRef idx="minor">
+              <a:schemeClr val="dk1"/>
+            </a:fontRef>
+          </p:style>
+          <p:txBody>
+            <a:bodyPr rtlCol="0" anchor="ctr"/>
+            <a:lstStyle/>
+            <a:p>
+              <a:pPr algn="ctr"/>
+              <a:endParaRPr lang="en-GB"/>
+            </a:p>
+          </p:txBody>
+        </p:sp>
+        <p:cxnSp>
+          <p:nvCxnSpPr>
+            <p:cNvPr id="8" name="Straight Connector 7">
+              <a:extLst>
+                <a:ext uri="{FF2B5EF4-FFF2-40B4-BE49-F238E27FC236}">
+                  <a16:creationId xmlns:a16="http://schemas.microsoft.com/office/drawing/2014/main" id="{1CAF2217-A071-4B16-8D11-9B91E1FF61D1}"/>
+                </a:ext>
+              </a:extLst>
+            </p:cNvPr>
+            <p:cNvCxnSpPr>
+              <a:cxnSpLocks/>
+              <a:stCxn id="6" idx="2"/>
+            </p:cNvCxnSpPr>
+            <p:nvPr/>
+          </p:nvCxnSpPr>
+          <p:spPr>
+            <a:xfrm flipH="1">
+              <a:off x="6797675" y="3771900"/>
+              <a:ext cx="189602" cy="0"/>
+            </a:xfrm>
+            <a:prstGeom prst="line">
+              <a:avLst/>
+            </a:prstGeom>
+          </p:spPr>
+          <p:style>
+            <a:lnRef idx="2">
+              <a:schemeClr val="dk1"/>
+            </a:lnRef>
+            <a:fillRef idx="1">
+              <a:schemeClr val="lt1"/>
+            </a:fillRef>
+            <a:effectRef idx="0">
+              <a:schemeClr val="dk1"/>
+            </a:effectRef>
+            <a:fontRef idx="minor">
+              <a:schemeClr val="dk1"/>
+            </a:fontRef>
+          </p:style>
+        </p:cxnSp>
+        <p:cxnSp>
+          <p:nvCxnSpPr>
+            <p:cNvPr id="10" name="Straight Connector 9">
+              <a:extLst>
+                <a:ext uri="{FF2B5EF4-FFF2-40B4-BE49-F238E27FC236}">
+                  <a16:creationId xmlns:a16="http://schemas.microsoft.com/office/drawing/2014/main" id="{F4E566D8-AE46-2ACE-72C8-32FB4ECD2FC9}"/>
+                </a:ext>
+              </a:extLst>
+            </p:cNvPr>
+            <p:cNvCxnSpPr>
+              <a:cxnSpLocks/>
+              <a:stCxn id="6" idx="0"/>
+            </p:cNvCxnSpPr>
+            <p:nvPr/>
+          </p:nvCxnSpPr>
+          <p:spPr>
+            <a:xfrm>
+              <a:off x="7256867" y="3771900"/>
+              <a:ext cx="191683" cy="0"/>
+            </a:xfrm>
+            <a:prstGeom prst="line">
+              <a:avLst/>
+            </a:prstGeom>
+          </p:spPr>
+          <p:style>
+            <a:lnRef idx="2">
+              <a:schemeClr val="dk1"/>
+            </a:lnRef>
+            <a:fillRef idx="1">
+              <a:schemeClr val="lt1"/>
+            </a:fillRef>
+            <a:effectRef idx="0">
+              <a:schemeClr val="dk1"/>
+            </a:effectRef>
+            <a:fontRef idx="minor">
+              <a:schemeClr val="dk1"/>
+            </a:fontRef>
+          </p:style>
+        </p:cxnSp>
+        <p:cxnSp>
+          <p:nvCxnSpPr>
+            <p:cNvPr id="13" name="Straight Arrow Connector 12">
+              <a:extLst>
+                <a:ext uri="{FF2B5EF4-FFF2-40B4-BE49-F238E27FC236}">
+                  <a16:creationId xmlns:a16="http://schemas.microsoft.com/office/drawing/2014/main" id="{D370D15E-3C85-B0ED-2F3B-7BE33114B962}"/>
+                </a:ext>
+              </a:extLst>
+            </p:cNvPr>
+            <p:cNvCxnSpPr>
+              <a:cxnSpLocks/>
+            </p:cNvCxnSpPr>
+            <p:nvPr/>
+          </p:nvCxnSpPr>
+          <p:spPr>
+            <a:xfrm flipV="1">
+              <a:off x="7192524" y="3552803"/>
+              <a:ext cx="128686" cy="127614"/>
+            </a:xfrm>
+            <a:prstGeom prst="straightConnector1">
+              <a:avLst/>
+            </a:prstGeom>
+            <a:ln>
+              <a:tailEnd type="triangle"/>
+            </a:ln>
+          </p:spPr>
+          <p:style>
+            <a:lnRef idx="2">
+              <a:schemeClr val="dk1"/>
+            </a:lnRef>
+            <a:fillRef idx="1">
+              <a:schemeClr val="lt1"/>
+            </a:fillRef>
+            <a:effectRef idx="0">
+              <a:schemeClr val="dk1"/>
+            </a:effectRef>
+            <a:fontRef idx="minor">
+              <a:schemeClr val="dk1"/>
+            </a:fontRef>
+          </p:style>
+        </p:cxnSp>
+        <p:cxnSp>
+          <p:nvCxnSpPr>
+            <p:cNvPr id="22" name="Straight Arrow Connector 21">
+              <a:extLst>
+                <a:ext uri="{FF2B5EF4-FFF2-40B4-BE49-F238E27FC236}">
+                  <a16:creationId xmlns:a16="http://schemas.microsoft.com/office/drawing/2014/main" id="{C29ACBB6-EE3B-2D5C-A31A-441590245E62}"/>
+                </a:ext>
+              </a:extLst>
+            </p:cNvPr>
+            <p:cNvCxnSpPr>
+              <a:cxnSpLocks/>
+            </p:cNvCxnSpPr>
+            <p:nvPr/>
+          </p:nvCxnSpPr>
+          <p:spPr>
+            <a:xfrm flipV="1">
+              <a:off x="7105692" y="3488996"/>
+              <a:ext cx="128686" cy="127614"/>
+            </a:xfrm>
+            <a:prstGeom prst="straightConnector1">
+              <a:avLst/>
+            </a:prstGeom>
+            <a:ln>
+              <a:tailEnd type="triangle"/>
+            </a:ln>
+          </p:spPr>
+          <p:style>
+            <a:lnRef idx="2">
+              <a:schemeClr val="dk1"/>
+            </a:lnRef>
+            <a:fillRef idx="1">
+              <a:schemeClr val="lt1"/>
+            </a:fillRef>
+            <a:effectRef idx="0">
+              <a:schemeClr val="dk1"/>
+            </a:effectRef>
+            <a:fontRef idx="minor">
+              <a:schemeClr val="dk1"/>
+            </a:fontRef>
+          </p:style>
+        </p:cxnSp>
+      </p:grpSp>
+      <p:grpSp>
+        <p:nvGrpSpPr>
+          <p:cNvPr id="38" name="Group 37">
+            <a:extLst>
+              <a:ext uri="{FF2B5EF4-FFF2-40B4-BE49-F238E27FC236}">
+                <a16:creationId xmlns:a16="http://schemas.microsoft.com/office/drawing/2014/main" id="{A31F72DB-DBEC-A2D0-0298-EC6AF5DC287F}"/>
+              </a:ext>
+            </a:extLst>
+          </p:cNvPr>
+          <p:cNvGrpSpPr/>
+          <p:nvPr/>
+        </p:nvGrpSpPr>
+        <p:grpSpPr>
+          <a:xfrm>
+            <a:off x="1387782" y="2754877"/>
+            <a:ext cx="771525" cy="223838"/>
+            <a:chOff x="5454650" y="2763837"/>
+            <a:chExt cx="771525" cy="223838"/>
+          </a:xfrm>
+          <a:effectLst>
+            <a:outerShdw blurRad="50800" dist="38100" dir="2700000" algn="tl" rotWithShape="0">
+              <a:prstClr val="black">
+                <a:alpha val="40000"/>
+              </a:prstClr>
+            </a:outerShdw>
+          </a:effectLst>
+        </p:grpSpPr>
+        <p:cxnSp>
+          <p:nvCxnSpPr>
+            <p:cNvPr id="27" name="Straight Connector 26">
+              <a:extLst>
+                <a:ext uri="{FF2B5EF4-FFF2-40B4-BE49-F238E27FC236}">
+                  <a16:creationId xmlns:a16="http://schemas.microsoft.com/office/drawing/2014/main" id="{BDD12806-2A4B-6690-E459-CC846C0D1CD9}"/>
+                </a:ext>
+              </a:extLst>
+            </p:cNvPr>
+            <p:cNvCxnSpPr>
+              <a:cxnSpLocks/>
+              <a:endCxn id="28" idx="2"/>
+            </p:cNvCxnSpPr>
+            <p:nvPr/>
+          </p:nvCxnSpPr>
+          <p:spPr>
+            <a:xfrm>
+              <a:off x="5454650" y="2957512"/>
+              <a:ext cx="257175" cy="1"/>
+            </a:xfrm>
+            <a:prstGeom prst="line">
+              <a:avLst/>
+            </a:prstGeom>
+          </p:spPr>
+          <p:style>
+            <a:lnRef idx="2">
+              <a:schemeClr val="dk1"/>
+            </a:lnRef>
+            <a:fillRef idx="1">
+              <a:schemeClr val="lt1"/>
+            </a:fillRef>
+            <a:effectRef idx="0">
+              <a:schemeClr val="dk1"/>
+            </a:effectRef>
+            <a:fontRef idx="minor">
+              <a:schemeClr val="dk1"/>
+            </a:fontRef>
+          </p:style>
+        </p:cxnSp>
+        <p:sp>
+          <p:nvSpPr>
+            <p:cNvPr id="28" name="Oval 27">
+              <a:extLst>
+                <a:ext uri="{FF2B5EF4-FFF2-40B4-BE49-F238E27FC236}">
+                  <a16:creationId xmlns:a16="http://schemas.microsoft.com/office/drawing/2014/main" id="{4E633AD2-336F-5BF1-DFA2-717E4629C4B2}"/>
+                </a:ext>
+              </a:extLst>
+            </p:cNvPr>
+            <p:cNvSpPr/>
+            <p:nvPr/>
+          </p:nvSpPr>
+          <p:spPr>
+            <a:xfrm>
+              <a:off x="5711825" y="2927350"/>
+              <a:ext cx="60325" cy="60325"/>
+            </a:xfrm>
+            <a:prstGeom prst="ellipse">
+              <a:avLst/>
+            </a:prstGeom>
+          </p:spPr>
+          <p:style>
+            <a:lnRef idx="2">
+              <a:schemeClr val="dk1"/>
+            </a:lnRef>
+            <a:fillRef idx="1">
+              <a:schemeClr val="lt1"/>
+            </a:fillRef>
+            <a:effectRef idx="0">
+              <a:schemeClr val="dk1"/>
+            </a:effectRef>
+            <a:fontRef idx="minor">
+              <a:schemeClr val="dk1"/>
+            </a:fontRef>
+          </p:style>
+          <p:txBody>
+            <a:bodyPr rtlCol="0" anchor="ctr"/>
+            <a:lstStyle/>
+            <a:p>
+              <a:pPr algn="ctr"/>
+              <a:endParaRPr lang="en-GB"/>
+            </a:p>
+          </p:txBody>
+        </p:sp>
+        <p:cxnSp>
+          <p:nvCxnSpPr>
+            <p:cNvPr id="30" name="Straight Connector 29">
+              <a:extLst>
+                <a:ext uri="{FF2B5EF4-FFF2-40B4-BE49-F238E27FC236}">
+                  <a16:creationId xmlns:a16="http://schemas.microsoft.com/office/drawing/2014/main" id="{641F00EF-C7E3-FB4A-1688-1053A02DC10C}"/>
+                </a:ext>
+              </a:extLst>
+            </p:cNvPr>
+            <p:cNvCxnSpPr>
+              <a:cxnSpLocks/>
+              <a:endCxn id="31" idx="2"/>
+            </p:cNvCxnSpPr>
+            <p:nvPr/>
+          </p:nvCxnSpPr>
+          <p:spPr>
+            <a:xfrm flipH="1">
+              <a:off x="5969000" y="2957512"/>
+              <a:ext cx="257175" cy="1"/>
+            </a:xfrm>
+            <a:prstGeom prst="line">
+              <a:avLst/>
+            </a:prstGeom>
+          </p:spPr>
+          <p:style>
+            <a:lnRef idx="2">
+              <a:schemeClr val="dk1"/>
+            </a:lnRef>
+            <a:fillRef idx="1">
+              <a:schemeClr val="lt1"/>
+            </a:fillRef>
+            <a:effectRef idx="0">
+              <a:schemeClr val="dk1"/>
+            </a:effectRef>
+            <a:fontRef idx="minor">
+              <a:schemeClr val="dk1"/>
+            </a:fontRef>
+          </p:style>
+        </p:cxnSp>
+        <p:sp>
+          <p:nvSpPr>
+            <p:cNvPr id="31" name="Oval 30">
+              <a:extLst>
+                <a:ext uri="{FF2B5EF4-FFF2-40B4-BE49-F238E27FC236}">
+                  <a16:creationId xmlns:a16="http://schemas.microsoft.com/office/drawing/2014/main" id="{62D61E70-BF16-BE3B-6584-CC028F324722}"/>
+                </a:ext>
+              </a:extLst>
+            </p:cNvPr>
+            <p:cNvSpPr/>
+            <p:nvPr/>
+          </p:nvSpPr>
+          <p:spPr>
+            <a:xfrm flipH="1">
+              <a:off x="5908675" y="2927350"/>
+              <a:ext cx="60325" cy="60325"/>
+            </a:xfrm>
+            <a:prstGeom prst="ellipse">
+              <a:avLst/>
+            </a:prstGeom>
+          </p:spPr>
+          <p:style>
+            <a:lnRef idx="2">
+              <a:schemeClr val="dk1"/>
+            </a:lnRef>
+            <a:fillRef idx="1">
+              <a:schemeClr val="lt1"/>
+            </a:fillRef>
+            <a:effectRef idx="0">
+              <a:schemeClr val="dk1"/>
+            </a:effectRef>
+            <a:fontRef idx="minor">
+              <a:schemeClr val="dk1"/>
+            </a:fontRef>
+          </p:style>
+          <p:txBody>
+            <a:bodyPr rtlCol="0" anchor="ctr"/>
+            <a:lstStyle/>
+            <a:p>
+              <a:pPr algn="ctr"/>
+              <a:endParaRPr lang="en-GB"/>
+            </a:p>
+          </p:txBody>
+        </p:sp>
+        <p:grpSp>
+          <p:nvGrpSpPr>
+            <p:cNvPr id="37" name="Group 36">
+              <a:extLst>
+                <a:ext uri="{FF2B5EF4-FFF2-40B4-BE49-F238E27FC236}">
+                  <a16:creationId xmlns:a16="http://schemas.microsoft.com/office/drawing/2014/main" id="{E814C038-D570-520E-B865-C75289C90EE0}"/>
+                </a:ext>
+              </a:extLst>
+            </p:cNvPr>
+            <p:cNvGrpSpPr/>
+            <p:nvPr/>
+          </p:nvGrpSpPr>
+          <p:grpSpPr>
+            <a:xfrm>
+              <a:off x="5705474" y="2763837"/>
+              <a:ext cx="271462" cy="119063"/>
+              <a:chOff x="5688013" y="2752725"/>
+              <a:chExt cx="271462" cy="119063"/>
+            </a:xfrm>
+          </p:grpSpPr>
+          <p:cxnSp>
+            <p:nvCxnSpPr>
+              <p:cNvPr id="34" name="Straight Connector 33">
+                <a:extLst>
+                  <a:ext uri="{FF2B5EF4-FFF2-40B4-BE49-F238E27FC236}">
+                    <a16:creationId xmlns:a16="http://schemas.microsoft.com/office/drawing/2014/main" id="{DD58DF09-3FB1-45C8-97BF-2DE539220174}"/>
+                  </a:ext>
+                </a:extLst>
+              </p:cNvPr>
+              <p:cNvCxnSpPr>
+                <a:cxnSpLocks/>
+              </p:cNvCxnSpPr>
+              <p:nvPr/>
+            </p:nvCxnSpPr>
+            <p:spPr>
+              <a:xfrm>
+                <a:off x="5688013" y="2871788"/>
+                <a:ext cx="271462" cy="0"/>
+              </a:xfrm>
+              <a:prstGeom prst="line">
+                <a:avLst/>
+              </a:prstGeom>
+              <a:ln w="25400"/>
+            </p:spPr>
+            <p:style>
+              <a:lnRef idx="1">
+                <a:schemeClr val="dk1"/>
+              </a:lnRef>
+              <a:fillRef idx="0">
+                <a:schemeClr val="dk1"/>
+              </a:fillRef>
+              <a:effectRef idx="0">
+                <a:schemeClr val="dk1"/>
+              </a:effectRef>
+              <a:fontRef idx="minor">
+                <a:schemeClr val="tx1"/>
+              </a:fontRef>
+            </p:style>
+          </p:cxnSp>
+          <p:cxnSp>
+            <p:nvCxnSpPr>
+              <p:cNvPr id="36" name="Straight Connector 35">
+                <a:extLst>
+                  <a:ext uri="{FF2B5EF4-FFF2-40B4-BE49-F238E27FC236}">
+                    <a16:creationId xmlns:a16="http://schemas.microsoft.com/office/drawing/2014/main" id="{99E1606C-53C8-7462-B352-CC8259B315BD}"/>
+                  </a:ext>
+                </a:extLst>
+              </p:cNvPr>
+              <p:cNvCxnSpPr>
+                <a:cxnSpLocks/>
+              </p:cNvCxnSpPr>
+              <p:nvPr/>
+            </p:nvCxnSpPr>
+            <p:spPr>
+              <a:xfrm flipV="1">
+                <a:off x="5823744" y="2752725"/>
+                <a:ext cx="0" cy="115888"/>
+              </a:xfrm>
+              <a:prstGeom prst="line">
+                <a:avLst/>
+              </a:prstGeom>
+            </p:spPr>
+            <p:style>
+              <a:lnRef idx="2">
+                <a:schemeClr val="dk1"/>
+              </a:lnRef>
+              <a:fillRef idx="1">
+                <a:schemeClr val="lt1"/>
+              </a:fillRef>
+              <a:effectRef idx="0">
+                <a:schemeClr val="dk1"/>
+              </a:effectRef>
+              <a:fontRef idx="minor">
+                <a:schemeClr val="dk1"/>
+              </a:fontRef>
+            </p:style>
+          </p:cxnSp>
+        </p:grpSp>
+      </p:grpSp>
+      <p:grpSp>
+        <p:nvGrpSpPr>
+          <p:cNvPr id="39" name="Group 38">
+            <a:extLst>
+              <a:ext uri="{FF2B5EF4-FFF2-40B4-BE49-F238E27FC236}">
+                <a16:creationId xmlns:a16="http://schemas.microsoft.com/office/drawing/2014/main" id="{00E8F257-6C5D-7265-DE00-A44E1A550C62}"/>
+              </a:ext>
+            </a:extLst>
+          </p:cNvPr>
+          <p:cNvGrpSpPr/>
+          <p:nvPr/>
+        </p:nvGrpSpPr>
+        <p:grpSpPr>
+          <a:xfrm>
+            <a:off x="4205211" y="2986636"/>
+            <a:ext cx="650875" cy="438194"/>
+            <a:chOff x="6797675" y="3488996"/>
+            <a:chExt cx="650875" cy="438194"/>
+          </a:xfrm>
+          <a:effectLst>
+            <a:outerShdw blurRad="50800" dist="38100" dir="2700000" algn="tl" rotWithShape="0">
+              <a:prstClr val="black">
+                <a:alpha val="40000"/>
+              </a:prstClr>
+            </a:outerShdw>
+          </a:effectLst>
+        </p:grpSpPr>
+        <p:sp>
+          <p:nvSpPr>
+            <p:cNvPr id="40" name="Flowchart: Extract 39">
+              <a:extLst>
+                <a:ext uri="{FF2B5EF4-FFF2-40B4-BE49-F238E27FC236}">
+                  <a16:creationId xmlns:a16="http://schemas.microsoft.com/office/drawing/2014/main" id="{9F1242E3-5D70-4AC8-08C2-F4DEC620A37E}"/>
+                </a:ext>
+              </a:extLst>
+            </p:cNvPr>
+            <p:cNvSpPr/>
+            <p:nvPr/>
+          </p:nvSpPr>
+          <p:spPr>
+            <a:xfrm rot="5400000">
+              <a:off x="6966782" y="3637105"/>
+              <a:ext cx="310580" cy="269590"/>
+            </a:xfrm>
+            <a:prstGeom prst="flowChartExtract">
+              <a:avLst/>
+            </a:prstGeom>
+          </p:spPr>
+          <p:style>
+            <a:lnRef idx="2">
+              <a:schemeClr val="dk1"/>
+            </a:lnRef>
+            <a:fillRef idx="1">
+              <a:schemeClr val="lt1"/>
+            </a:fillRef>
+            <a:effectRef idx="0">
+              <a:schemeClr val="dk1"/>
+            </a:effectRef>
+            <a:fontRef idx="minor">
+              <a:schemeClr val="dk1"/>
+            </a:fontRef>
+          </p:style>
+          <p:txBody>
+            <a:bodyPr rtlCol="0" anchor="ctr"/>
+            <a:lstStyle/>
+            <a:p>
+              <a:pPr algn="ctr"/>
+              <a:endParaRPr lang="en-GB"/>
+            </a:p>
+          </p:txBody>
+        </p:sp>
+        <p:cxnSp>
+          <p:nvCxnSpPr>
+            <p:cNvPr id="41" name="Straight Connector 40">
+              <a:extLst>
+                <a:ext uri="{FF2B5EF4-FFF2-40B4-BE49-F238E27FC236}">
+                  <a16:creationId xmlns:a16="http://schemas.microsoft.com/office/drawing/2014/main" id="{B9ACF3FD-DF41-DD7B-62F4-B768CE5E5239}"/>
+                </a:ext>
+              </a:extLst>
+            </p:cNvPr>
+            <p:cNvCxnSpPr>
+              <a:cxnSpLocks/>
+              <a:stCxn id="40" idx="2"/>
+            </p:cNvCxnSpPr>
+            <p:nvPr/>
+          </p:nvCxnSpPr>
+          <p:spPr>
+            <a:xfrm flipH="1">
+              <a:off x="6797675" y="3771900"/>
+              <a:ext cx="189602" cy="0"/>
+            </a:xfrm>
+            <a:prstGeom prst="line">
+              <a:avLst/>
+            </a:prstGeom>
+          </p:spPr>
+          <p:style>
+            <a:lnRef idx="2">
+              <a:schemeClr val="dk1"/>
+            </a:lnRef>
+            <a:fillRef idx="1">
+              <a:schemeClr val="lt1"/>
+            </a:fillRef>
+            <a:effectRef idx="0">
+              <a:schemeClr val="dk1"/>
+            </a:effectRef>
+            <a:fontRef idx="minor">
+              <a:schemeClr val="dk1"/>
+            </a:fontRef>
+          </p:style>
+        </p:cxnSp>
+        <p:cxnSp>
+          <p:nvCxnSpPr>
+            <p:cNvPr id="42" name="Straight Connector 41">
+              <a:extLst>
+                <a:ext uri="{FF2B5EF4-FFF2-40B4-BE49-F238E27FC236}">
+                  <a16:creationId xmlns:a16="http://schemas.microsoft.com/office/drawing/2014/main" id="{8A663858-E38F-0D5A-A6EE-AFEBA6078A78}"/>
+                </a:ext>
+              </a:extLst>
+            </p:cNvPr>
+            <p:cNvCxnSpPr>
+              <a:cxnSpLocks/>
+              <a:stCxn id="40" idx="0"/>
+            </p:cNvCxnSpPr>
+            <p:nvPr/>
+          </p:nvCxnSpPr>
+          <p:spPr>
+            <a:xfrm>
+              <a:off x="7256867" y="3771900"/>
+              <a:ext cx="191683" cy="0"/>
+            </a:xfrm>
+            <a:prstGeom prst="line">
+              <a:avLst/>
+            </a:prstGeom>
+          </p:spPr>
+          <p:style>
+            <a:lnRef idx="2">
+              <a:schemeClr val="dk1"/>
+            </a:lnRef>
+            <a:fillRef idx="1">
+              <a:schemeClr val="lt1"/>
+            </a:fillRef>
+            <a:effectRef idx="0">
+              <a:schemeClr val="dk1"/>
+            </a:effectRef>
+            <a:fontRef idx="minor">
+              <a:schemeClr val="dk1"/>
+            </a:fontRef>
+          </p:style>
+        </p:cxnSp>
+        <p:cxnSp>
+          <p:nvCxnSpPr>
+            <p:cNvPr id="43" name="Straight Arrow Connector 42">
+              <a:extLst>
+                <a:ext uri="{FF2B5EF4-FFF2-40B4-BE49-F238E27FC236}">
+                  <a16:creationId xmlns:a16="http://schemas.microsoft.com/office/drawing/2014/main" id="{3D5B4BEE-665E-81BC-2F67-3F5E9CA4560F}"/>
+                </a:ext>
+              </a:extLst>
+            </p:cNvPr>
+            <p:cNvCxnSpPr>
+              <a:cxnSpLocks/>
+            </p:cNvCxnSpPr>
+            <p:nvPr/>
+          </p:nvCxnSpPr>
+          <p:spPr>
+            <a:xfrm flipV="1">
+              <a:off x="7192524" y="3552803"/>
+              <a:ext cx="128686" cy="127614"/>
+            </a:xfrm>
+            <a:prstGeom prst="straightConnector1">
+              <a:avLst/>
+            </a:prstGeom>
+            <a:ln>
+              <a:tailEnd type="triangle"/>
+            </a:ln>
+          </p:spPr>
+          <p:style>
+            <a:lnRef idx="2">
+              <a:schemeClr val="dk1"/>
+            </a:lnRef>
+            <a:fillRef idx="1">
+              <a:schemeClr val="lt1"/>
+            </a:fillRef>
+            <a:effectRef idx="0">
+              <a:schemeClr val="dk1"/>
+            </a:effectRef>
+            <a:fontRef idx="minor">
+              <a:schemeClr val="dk1"/>
+            </a:fontRef>
+          </p:style>
+        </p:cxnSp>
+        <p:cxnSp>
+          <p:nvCxnSpPr>
+            <p:cNvPr id="44" name="Straight Arrow Connector 43">
+              <a:extLst>
+                <a:ext uri="{FF2B5EF4-FFF2-40B4-BE49-F238E27FC236}">
+                  <a16:creationId xmlns:a16="http://schemas.microsoft.com/office/drawing/2014/main" id="{B7491948-8EEE-74A2-451E-2BE79A4A6D32}"/>
+                </a:ext>
+              </a:extLst>
+            </p:cNvPr>
+            <p:cNvCxnSpPr>
+              <a:cxnSpLocks/>
+            </p:cNvCxnSpPr>
+            <p:nvPr/>
+          </p:nvCxnSpPr>
+          <p:spPr>
+            <a:xfrm flipV="1">
+              <a:off x="7105692" y="3488996"/>
+              <a:ext cx="128686" cy="127614"/>
+            </a:xfrm>
+            <a:prstGeom prst="straightConnector1">
+              <a:avLst/>
+            </a:prstGeom>
+            <a:ln>
+              <a:tailEnd type="triangle"/>
+            </a:ln>
+          </p:spPr>
+          <p:style>
+            <a:lnRef idx="2">
+              <a:schemeClr val="dk1"/>
+            </a:lnRef>
+            <a:fillRef idx="1">
+              <a:schemeClr val="lt1"/>
+            </a:fillRef>
+            <a:effectRef idx="0">
+              <a:schemeClr val="dk1"/>
+            </a:effectRef>
+            <a:fontRef idx="minor">
+              <a:schemeClr val="dk1"/>
+            </a:fontRef>
+          </p:style>
+        </p:cxnSp>
+      </p:grpSp>
+      <p:grpSp>
+        <p:nvGrpSpPr>
+          <p:cNvPr id="45" name="Group 44">
+            <a:extLst>
+              <a:ext uri="{FF2B5EF4-FFF2-40B4-BE49-F238E27FC236}">
+                <a16:creationId xmlns:a16="http://schemas.microsoft.com/office/drawing/2014/main" id="{4E354E9E-0FB6-31F9-1A1E-420881941724}"/>
+              </a:ext>
+            </a:extLst>
+          </p:cNvPr>
+          <p:cNvGrpSpPr/>
+          <p:nvPr/>
+        </p:nvGrpSpPr>
+        <p:grpSpPr>
+          <a:xfrm>
+            <a:off x="4205211" y="3424829"/>
+            <a:ext cx="650875" cy="438194"/>
+            <a:chOff x="6797675" y="3488996"/>
+            <a:chExt cx="650875" cy="438194"/>
+          </a:xfrm>
+          <a:effectLst>
+            <a:outerShdw blurRad="50800" dist="38100" dir="2700000" algn="tl" rotWithShape="0">
+              <a:prstClr val="black">
+                <a:alpha val="40000"/>
+              </a:prstClr>
+            </a:outerShdw>
+          </a:effectLst>
+        </p:grpSpPr>
+        <p:sp>
+          <p:nvSpPr>
+            <p:cNvPr id="46" name="Flowchart: Extract 45">
+              <a:extLst>
+                <a:ext uri="{FF2B5EF4-FFF2-40B4-BE49-F238E27FC236}">
+                  <a16:creationId xmlns:a16="http://schemas.microsoft.com/office/drawing/2014/main" id="{948E9BBF-9DCB-A1FB-6A3B-468A64C8EBAD}"/>
+                </a:ext>
+              </a:extLst>
+            </p:cNvPr>
+            <p:cNvSpPr/>
+            <p:nvPr/>
+          </p:nvSpPr>
+          <p:spPr>
+            <a:xfrm rot="5400000">
+              <a:off x="6966782" y="3637105"/>
+              <a:ext cx="310580" cy="269590"/>
+            </a:xfrm>
+            <a:prstGeom prst="flowChartExtract">
+              <a:avLst/>
+            </a:prstGeom>
+          </p:spPr>
+          <p:style>
+            <a:lnRef idx="2">
+              <a:schemeClr val="dk1"/>
+            </a:lnRef>
+            <a:fillRef idx="1">
+              <a:schemeClr val="lt1"/>
+            </a:fillRef>
+            <a:effectRef idx="0">
+              <a:schemeClr val="dk1"/>
+            </a:effectRef>
+            <a:fontRef idx="minor">
+              <a:schemeClr val="dk1"/>
+            </a:fontRef>
+          </p:style>
+          <p:txBody>
+            <a:bodyPr rtlCol="0" anchor="ctr"/>
+            <a:lstStyle/>
+            <a:p>
+              <a:pPr algn="ctr"/>
+              <a:endParaRPr lang="en-GB"/>
+            </a:p>
+          </p:txBody>
+        </p:sp>
+        <p:cxnSp>
+          <p:nvCxnSpPr>
+            <p:cNvPr id="47" name="Straight Connector 46">
+              <a:extLst>
+                <a:ext uri="{FF2B5EF4-FFF2-40B4-BE49-F238E27FC236}">
+                  <a16:creationId xmlns:a16="http://schemas.microsoft.com/office/drawing/2014/main" id="{9A18076C-3E79-8466-548C-206D072EC6E3}"/>
+                </a:ext>
+              </a:extLst>
+            </p:cNvPr>
+            <p:cNvCxnSpPr>
+              <a:cxnSpLocks/>
+              <a:stCxn id="46" idx="2"/>
+            </p:cNvCxnSpPr>
+            <p:nvPr/>
+          </p:nvCxnSpPr>
+          <p:spPr>
+            <a:xfrm flipH="1">
+              <a:off x="6797675" y="3771900"/>
+              <a:ext cx="189602" cy="0"/>
+            </a:xfrm>
+            <a:prstGeom prst="line">
+              <a:avLst/>
+            </a:prstGeom>
+          </p:spPr>
+          <p:style>
+            <a:lnRef idx="2">
+              <a:schemeClr val="dk1"/>
+            </a:lnRef>
+            <a:fillRef idx="1">
+              <a:schemeClr val="lt1"/>
+            </a:fillRef>
+            <a:effectRef idx="0">
+              <a:schemeClr val="dk1"/>
+            </a:effectRef>
+            <a:fontRef idx="minor">
+              <a:schemeClr val="dk1"/>
+            </a:fontRef>
+          </p:style>
+        </p:cxnSp>
+        <p:cxnSp>
+          <p:nvCxnSpPr>
+            <p:cNvPr id="48" name="Straight Connector 47">
+              <a:extLst>
+                <a:ext uri="{FF2B5EF4-FFF2-40B4-BE49-F238E27FC236}">
+                  <a16:creationId xmlns:a16="http://schemas.microsoft.com/office/drawing/2014/main" id="{8BF9DD04-FC92-5390-118F-6FBAF9E2ED45}"/>
+                </a:ext>
+              </a:extLst>
+            </p:cNvPr>
+            <p:cNvCxnSpPr>
+              <a:cxnSpLocks/>
+              <a:stCxn id="46" idx="0"/>
+            </p:cNvCxnSpPr>
+            <p:nvPr/>
+          </p:nvCxnSpPr>
+          <p:spPr>
+            <a:xfrm>
+              <a:off x="7256867" y="3771900"/>
+              <a:ext cx="191683" cy="0"/>
+            </a:xfrm>
+            <a:prstGeom prst="line">
+              <a:avLst/>
+            </a:prstGeom>
+          </p:spPr>
+          <p:style>
+            <a:lnRef idx="2">
+              <a:schemeClr val="dk1"/>
+            </a:lnRef>
+            <a:fillRef idx="1">
+              <a:schemeClr val="lt1"/>
+            </a:fillRef>
+            <a:effectRef idx="0">
+              <a:schemeClr val="dk1"/>
+            </a:effectRef>
+            <a:fontRef idx="minor">
+              <a:schemeClr val="dk1"/>
+            </a:fontRef>
+          </p:style>
+        </p:cxnSp>
+        <p:cxnSp>
+          <p:nvCxnSpPr>
+            <p:cNvPr id="49" name="Straight Arrow Connector 48">
+              <a:extLst>
+                <a:ext uri="{FF2B5EF4-FFF2-40B4-BE49-F238E27FC236}">
+                  <a16:creationId xmlns:a16="http://schemas.microsoft.com/office/drawing/2014/main" id="{793CC925-382B-D26B-B939-A89484C195CA}"/>
+                </a:ext>
+              </a:extLst>
+            </p:cNvPr>
+            <p:cNvCxnSpPr>
+              <a:cxnSpLocks/>
+            </p:cNvCxnSpPr>
+            <p:nvPr/>
+          </p:nvCxnSpPr>
+          <p:spPr>
+            <a:xfrm flipV="1">
+              <a:off x="7192524" y="3552803"/>
+              <a:ext cx="128686" cy="127614"/>
+            </a:xfrm>
+            <a:prstGeom prst="straightConnector1">
+              <a:avLst/>
+            </a:prstGeom>
+            <a:ln>
+              <a:tailEnd type="triangle"/>
+            </a:ln>
+          </p:spPr>
+          <p:style>
+            <a:lnRef idx="2">
+              <a:schemeClr val="dk1"/>
+            </a:lnRef>
+            <a:fillRef idx="1">
+              <a:schemeClr val="lt1"/>
+            </a:fillRef>
+            <a:effectRef idx="0">
+              <a:schemeClr val="dk1"/>
+            </a:effectRef>
+            <a:fontRef idx="minor">
+              <a:schemeClr val="dk1"/>
+            </a:fontRef>
+          </p:style>
+        </p:cxnSp>
+        <p:cxnSp>
+          <p:nvCxnSpPr>
+            <p:cNvPr id="50" name="Straight Arrow Connector 49">
+              <a:extLst>
+                <a:ext uri="{FF2B5EF4-FFF2-40B4-BE49-F238E27FC236}">
+                  <a16:creationId xmlns:a16="http://schemas.microsoft.com/office/drawing/2014/main" id="{575B9DC0-85C6-1FAC-A6BB-5FB6F7528BFD}"/>
+                </a:ext>
+              </a:extLst>
+            </p:cNvPr>
+            <p:cNvCxnSpPr>
+              <a:cxnSpLocks/>
+            </p:cNvCxnSpPr>
+            <p:nvPr/>
+          </p:nvCxnSpPr>
+          <p:spPr>
+            <a:xfrm flipV="1">
+              <a:off x="7105692" y="3488996"/>
+              <a:ext cx="128686" cy="127614"/>
+            </a:xfrm>
+            <a:prstGeom prst="straightConnector1">
+              <a:avLst/>
+            </a:prstGeom>
+            <a:ln>
+              <a:tailEnd type="triangle"/>
+            </a:ln>
+          </p:spPr>
+          <p:style>
+            <a:lnRef idx="2">
+              <a:schemeClr val="dk1"/>
+            </a:lnRef>
+            <a:fillRef idx="1">
+              <a:schemeClr val="lt1"/>
+            </a:fillRef>
+            <a:effectRef idx="0">
+              <a:schemeClr val="dk1"/>
+            </a:effectRef>
+            <a:fontRef idx="minor">
+              <a:schemeClr val="dk1"/>
+            </a:fontRef>
+          </p:style>
+        </p:cxnSp>
+      </p:grpSp>
+      <p:grpSp>
+        <p:nvGrpSpPr>
+          <p:cNvPr id="51" name="Group 50">
+            <a:extLst>
+              <a:ext uri="{FF2B5EF4-FFF2-40B4-BE49-F238E27FC236}">
+                <a16:creationId xmlns:a16="http://schemas.microsoft.com/office/drawing/2014/main" id="{9364A078-E710-4D29-2747-537B5D3D134B}"/>
+              </a:ext>
+            </a:extLst>
+          </p:cNvPr>
+          <p:cNvGrpSpPr/>
+          <p:nvPr/>
+        </p:nvGrpSpPr>
+        <p:grpSpPr>
+          <a:xfrm>
+            <a:off x="4205211" y="3863021"/>
+            <a:ext cx="650875" cy="438194"/>
+            <a:chOff x="6797675" y="3488996"/>
+            <a:chExt cx="650875" cy="438194"/>
+          </a:xfrm>
+          <a:effectLst>
+            <a:outerShdw blurRad="50800" dist="38100" dir="2700000" algn="tl" rotWithShape="0">
+              <a:prstClr val="black">
+                <a:alpha val="40000"/>
+              </a:prstClr>
+            </a:outerShdw>
+          </a:effectLst>
+        </p:grpSpPr>
+        <p:sp>
+          <p:nvSpPr>
+            <p:cNvPr id="52" name="Flowchart: Extract 51">
+              <a:extLst>
+                <a:ext uri="{FF2B5EF4-FFF2-40B4-BE49-F238E27FC236}">
+                  <a16:creationId xmlns:a16="http://schemas.microsoft.com/office/drawing/2014/main" id="{3F9629D9-F9DD-67A0-3C66-C5E8BE200188}"/>
+                </a:ext>
+              </a:extLst>
+            </p:cNvPr>
+            <p:cNvSpPr/>
+            <p:nvPr/>
+          </p:nvSpPr>
+          <p:spPr>
+            <a:xfrm rot="5400000">
+              <a:off x="6966782" y="3637105"/>
+              <a:ext cx="310580" cy="269590"/>
+            </a:xfrm>
+            <a:prstGeom prst="flowChartExtract">
+              <a:avLst/>
+            </a:prstGeom>
+          </p:spPr>
+          <p:style>
+            <a:lnRef idx="2">
+              <a:schemeClr val="dk1"/>
+            </a:lnRef>
+            <a:fillRef idx="1">
+              <a:schemeClr val="lt1"/>
+            </a:fillRef>
+            <a:effectRef idx="0">
+              <a:schemeClr val="dk1"/>
+            </a:effectRef>
+            <a:fontRef idx="minor">
+              <a:schemeClr val="dk1"/>
+            </a:fontRef>
+          </p:style>
+          <p:txBody>
+            <a:bodyPr rtlCol="0" anchor="ctr"/>
+            <a:lstStyle/>
+            <a:p>
+              <a:pPr algn="ctr"/>
+              <a:endParaRPr lang="en-GB"/>
+            </a:p>
+          </p:txBody>
+        </p:sp>
+        <p:cxnSp>
+          <p:nvCxnSpPr>
+            <p:cNvPr id="53" name="Straight Connector 52">
+              <a:extLst>
+                <a:ext uri="{FF2B5EF4-FFF2-40B4-BE49-F238E27FC236}">
+                  <a16:creationId xmlns:a16="http://schemas.microsoft.com/office/drawing/2014/main" id="{A2194463-95D3-6273-3D26-93CF3B13AF34}"/>
+                </a:ext>
+              </a:extLst>
+            </p:cNvPr>
+            <p:cNvCxnSpPr>
+              <a:cxnSpLocks/>
+              <a:stCxn id="52" idx="2"/>
+            </p:cNvCxnSpPr>
+            <p:nvPr/>
+          </p:nvCxnSpPr>
+          <p:spPr>
+            <a:xfrm flipH="1">
+              <a:off x="6797675" y="3771900"/>
+              <a:ext cx="189602" cy="0"/>
+            </a:xfrm>
+            <a:prstGeom prst="line">
+              <a:avLst/>
+            </a:prstGeom>
+          </p:spPr>
+          <p:style>
+            <a:lnRef idx="2">
+              <a:schemeClr val="dk1"/>
+            </a:lnRef>
+            <a:fillRef idx="1">
+              <a:schemeClr val="lt1"/>
+            </a:fillRef>
+            <a:effectRef idx="0">
+              <a:schemeClr val="dk1"/>
+            </a:effectRef>
+            <a:fontRef idx="minor">
+              <a:schemeClr val="dk1"/>
+            </a:fontRef>
+          </p:style>
+        </p:cxnSp>
+        <p:cxnSp>
+          <p:nvCxnSpPr>
+            <p:cNvPr id="54" name="Straight Connector 53">
+              <a:extLst>
+                <a:ext uri="{FF2B5EF4-FFF2-40B4-BE49-F238E27FC236}">
+                  <a16:creationId xmlns:a16="http://schemas.microsoft.com/office/drawing/2014/main" id="{02CB481F-D360-3570-80B3-F9DC3806B202}"/>
+                </a:ext>
+              </a:extLst>
+            </p:cNvPr>
+            <p:cNvCxnSpPr>
+              <a:cxnSpLocks/>
+              <a:stCxn id="52" idx="0"/>
+            </p:cNvCxnSpPr>
+            <p:nvPr/>
+          </p:nvCxnSpPr>
+          <p:spPr>
+            <a:xfrm>
+              <a:off x="7256867" y="3771900"/>
+              <a:ext cx="191683" cy="0"/>
+            </a:xfrm>
+            <a:prstGeom prst="line">
+              <a:avLst/>
+            </a:prstGeom>
+          </p:spPr>
+          <p:style>
+            <a:lnRef idx="2">
+              <a:schemeClr val="dk1"/>
+            </a:lnRef>
+            <a:fillRef idx="1">
+              <a:schemeClr val="lt1"/>
+            </a:fillRef>
+            <a:effectRef idx="0">
+              <a:schemeClr val="dk1"/>
+            </a:effectRef>
+            <a:fontRef idx="minor">
+              <a:schemeClr val="dk1"/>
+            </a:fontRef>
+          </p:style>
+        </p:cxnSp>
+        <p:cxnSp>
+          <p:nvCxnSpPr>
+            <p:cNvPr id="55" name="Straight Arrow Connector 54">
+              <a:extLst>
+                <a:ext uri="{FF2B5EF4-FFF2-40B4-BE49-F238E27FC236}">
+                  <a16:creationId xmlns:a16="http://schemas.microsoft.com/office/drawing/2014/main" id="{BCBD4431-6ED7-D5C7-F231-C9FE9A65ECDF}"/>
+                </a:ext>
+              </a:extLst>
+            </p:cNvPr>
+            <p:cNvCxnSpPr>
+              <a:cxnSpLocks/>
+            </p:cNvCxnSpPr>
+            <p:nvPr/>
+          </p:nvCxnSpPr>
+          <p:spPr>
+            <a:xfrm flipV="1">
+              <a:off x="7192524" y="3552803"/>
+              <a:ext cx="128686" cy="127614"/>
+            </a:xfrm>
+            <a:prstGeom prst="straightConnector1">
+              <a:avLst/>
+            </a:prstGeom>
+            <a:ln>
+              <a:tailEnd type="triangle"/>
+            </a:ln>
+          </p:spPr>
+          <p:style>
+            <a:lnRef idx="2">
+              <a:schemeClr val="dk1"/>
+            </a:lnRef>
+            <a:fillRef idx="1">
+              <a:schemeClr val="lt1"/>
+            </a:fillRef>
+            <a:effectRef idx="0">
+              <a:schemeClr val="dk1"/>
+            </a:effectRef>
+            <a:fontRef idx="minor">
+              <a:schemeClr val="dk1"/>
+            </a:fontRef>
+          </p:style>
+        </p:cxnSp>
+        <p:cxnSp>
+          <p:nvCxnSpPr>
+            <p:cNvPr id="56" name="Straight Arrow Connector 55">
+              <a:extLst>
+                <a:ext uri="{FF2B5EF4-FFF2-40B4-BE49-F238E27FC236}">
+                  <a16:creationId xmlns:a16="http://schemas.microsoft.com/office/drawing/2014/main" id="{988FDEF9-1A17-02B3-8471-727CAF5601C7}"/>
+                </a:ext>
+              </a:extLst>
+            </p:cNvPr>
+            <p:cNvCxnSpPr>
+              <a:cxnSpLocks/>
+            </p:cNvCxnSpPr>
+            <p:nvPr/>
+          </p:nvCxnSpPr>
+          <p:spPr>
+            <a:xfrm flipV="1">
+              <a:off x="7105692" y="3488996"/>
+              <a:ext cx="128686" cy="127614"/>
+            </a:xfrm>
+            <a:prstGeom prst="straightConnector1">
+              <a:avLst/>
+            </a:prstGeom>
+            <a:ln>
+              <a:tailEnd type="triangle"/>
+            </a:ln>
+          </p:spPr>
+          <p:style>
+            <a:lnRef idx="2">
+              <a:schemeClr val="dk1"/>
+            </a:lnRef>
+            <a:fillRef idx="1">
+              <a:schemeClr val="lt1"/>
+            </a:fillRef>
+            <a:effectRef idx="0">
+              <a:schemeClr val="dk1"/>
+            </a:effectRef>
+            <a:fontRef idx="minor">
+              <a:schemeClr val="dk1"/>
+            </a:fontRef>
+          </p:style>
+        </p:cxnSp>
+      </p:grpSp>
+      <p:grpSp>
+        <p:nvGrpSpPr>
+          <p:cNvPr id="57" name="Group 56">
+            <a:extLst>
+              <a:ext uri="{FF2B5EF4-FFF2-40B4-BE49-F238E27FC236}">
+                <a16:creationId xmlns:a16="http://schemas.microsoft.com/office/drawing/2014/main" id="{08300953-0D7A-5324-B392-F33F1A381962}"/>
+              </a:ext>
+            </a:extLst>
+          </p:cNvPr>
+          <p:cNvGrpSpPr/>
+          <p:nvPr/>
+        </p:nvGrpSpPr>
+        <p:grpSpPr>
+          <a:xfrm>
+            <a:off x="1387782" y="3083344"/>
+            <a:ext cx="771525" cy="223838"/>
+            <a:chOff x="5454650" y="2763837"/>
+            <a:chExt cx="771525" cy="223838"/>
+          </a:xfrm>
+          <a:effectLst>
+            <a:outerShdw blurRad="50800" dist="38100" dir="2700000" algn="tl" rotWithShape="0">
+              <a:prstClr val="black">
+                <a:alpha val="40000"/>
+              </a:prstClr>
+            </a:outerShdw>
+          </a:effectLst>
+        </p:grpSpPr>
+        <p:cxnSp>
+          <p:nvCxnSpPr>
+            <p:cNvPr id="58" name="Straight Connector 57">
+              <a:extLst>
+                <a:ext uri="{FF2B5EF4-FFF2-40B4-BE49-F238E27FC236}">
+                  <a16:creationId xmlns:a16="http://schemas.microsoft.com/office/drawing/2014/main" id="{8126A361-0B84-3420-C280-E30677CCDAED}"/>
+                </a:ext>
+              </a:extLst>
+            </p:cNvPr>
+            <p:cNvCxnSpPr>
+              <a:cxnSpLocks/>
+              <a:endCxn id="59" idx="2"/>
+            </p:cNvCxnSpPr>
+            <p:nvPr/>
+          </p:nvCxnSpPr>
+          <p:spPr>
+            <a:xfrm>
+              <a:off x="5454650" y="2957512"/>
+              <a:ext cx="257175" cy="1"/>
+            </a:xfrm>
+            <a:prstGeom prst="line">
+              <a:avLst/>
+            </a:prstGeom>
+          </p:spPr>
+          <p:style>
+            <a:lnRef idx="2">
+              <a:schemeClr val="dk1"/>
+            </a:lnRef>
+            <a:fillRef idx="1">
+              <a:schemeClr val="lt1"/>
+            </a:fillRef>
+            <a:effectRef idx="0">
+              <a:schemeClr val="dk1"/>
+            </a:effectRef>
+            <a:fontRef idx="minor">
+              <a:schemeClr val="dk1"/>
+            </a:fontRef>
+          </p:style>
+        </p:cxnSp>
+        <p:sp>
+          <p:nvSpPr>
+            <p:cNvPr id="59" name="Oval 58">
+              <a:extLst>
+                <a:ext uri="{FF2B5EF4-FFF2-40B4-BE49-F238E27FC236}">
+                  <a16:creationId xmlns:a16="http://schemas.microsoft.com/office/drawing/2014/main" id="{E242495B-9215-8CF0-25A2-5AF808323EC2}"/>
+                </a:ext>
+              </a:extLst>
+            </p:cNvPr>
+            <p:cNvSpPr/>
+            <p:nvPr/>
+          </p:nvSpPr>
+          <p:spPr>
+            <a:xfrm>
+              <a:off x="5711825" y="2927350"/>
+              <a:ext cx="60325" cy="60325"/>
+            </a:xfrm>
+            <a:prstGeom prst="ellipse">
+              <a:avLst/>
+            </a:prstGeom>
+          </p:spPr>
+          <p:style>
+            <a:lnRef idx="2">
+              <a:schemeClr val="dk1"/>
+            </a:lnRef>
+            <a:fillRef idx="1">
+              <a:schemeClr val="lt1"/>
+            </a:fillRef>
+            <a:effectRef idx="0">
+              <a:schemeClr val="dk1"/>
+            </a:effectRef>
+            <a:fontRef idx="minor">
+              <a:schemeClr val="dk1"/>
+            </a:fontRef>
+          </p:style>
+          <p:txBody>
+            <a:bodyPr rtlCol="0" anchor="ctr"/>
+            <a:lstStyle/>
+            <a:p>
+              <a:pPr algn="ctr"/>
+              <a:endParaRPr lang="en-GB"/>
+            </a:p>
+          </p:txBody>
+        </p:sp>
+        <p:cxnSp>
+          <p:nvCxnSpPr>
+            <p:cNvPr id="60" name="Straight Connector 59">
+              <a:extLst>
+                <a:ext uri="{FF2B5EF4-FFF2-40B4-BE49-F238E27FC236}">
+                  <a16:creationId xmlns:a16="http://schemas.microsoft.com/office/drawing/2014/main" id="{F08A6677-9791-BF7E-84D6-E0D2E750F23C}"/>
+                </a:ext>
+              </a:extLst>
+            </p:cNvPr>
+            <p:cNvCxnSpPr>
+              <a:cxnSpLocks/>
+              <a:endCxn id="61" idx="2"/>
+            </p:cNvCxnSpPr>
+            <p:nvPr/>
+          </p:nvCxnSpPr>
+          <p:spPr>
+            <a:xfrm flipH="1">
+              <a:off x="5969000" y="2957512"/>
+              <a:ext cx="257175" cy="1"/>
+            </a:xfrm>
+            <a:prstGeom prst="line">
+              <a:avLst/>
+            </a:prstGeom>
+          </p:spPr>
+          <p:style>
+            <a:lnRef idx="2">
+              <a:schemeClr val="dk1"/>
+            </a:lnRef>
+            <a:fillRef idx="1">
+              <a:schemeClr val="lt1"/>
+            </a:fillRef>
+            <a:effectRef idx="0">
+              <a:schemeClr val="dk1"/>
+            </a:effectRef>
+            <a:fontRef idx="minor">
+              <a:schemeClr val="dk1"/>
+            </a:fontRef>
+          </p:style>
+        </p:cxnSp>
+        <p:sp>
+          <p:nvSpPr>
+            <p:cNvPr id="61" name="Oval 60">
+              <a:extLst>
+                <a:ext uri="{FF2B5EF4-FFF2-40B4-BE49-F238E27FC236}">
+                  <a16:creationId xmlns:a16="http://schemas.microsoft.com/office/drawing/2014/main" id="{2409004F-993A-DAC4-BAA8-B1357D61B587}"/>
+                </a:ext>
+              </a:extLst>
+            </p:cNvPr>
+            <p:cNvSpPr/>
+            <p:nvPr/>
+          </p:nvSpPr>
+          <p:spPr>
+            <a:xfrm flipH="1">
+              <a:off x="5908675" y="2927350"/>
+              <a:ext cx="60325" cy="60325"/>
+            </a:xfrm>
+            <a:prstGeom prst="ellipse">
+              <a:avLst/>
+            </a:prstGeom>
+          </p:spPr>
+          <p:style>
+            <a:lnRef idx="2">
+              <a:schemeClr val="dk1"/>
+            </a:lnRef>
+            <a:fillRef idx="1">
+              <a:schemeClr val="lt1"/>
+            </a:fillRef>
+            <a:effectRef idx="0">
+              <a:schemeClr val="dk1"/>
+            </a:effectRef>
+            <a:fontRef idx="minor">
+              <a:schemeClr val="dk1"/>
+            </a:fontRef>
+          </p:style>
+          <p:txBody>
+            <a:bodyPr rtlCol="0" anchor="ctr"/>
+            <a:lstStyle/>
+            <a:p>
+              <a:pPr algn="ctr"/>
+              <a:endParaRPr lang="en-GB"/>
+            </a:p>
+          </p:txBody>
+        </p:sp>
+        <p:grpSp>
+          <p:nvGrpSpPr>
+            <p:cNvPr id="62" name="Group 61">
+              <a:extLst>
+                <a:ext uri="{FF2B5EF4-FFF2-40B4-BE49-F238E27FC236}">
+                  <a16:creationId xmlns:a16="http://schemas.microsoft.com/office/drawing/2014/main" id="{A4FEBC33-18B1-F92C-BAC2-5FFFA9BDC272}"/>
+                </a:ext>
+              </a:extLst>
+            </p:cNvPr>
+            <p:cNvGrpSpPr/>
+            <p:nvPr/>
+          </p:nvGrpSpPr>
+          <p:grpSpPr>
+            <a:xfrm>
+              <a:off x="5705474" y="2763837"/>
+              <a:ext cx="271462" cy="119063"/>
+              <a:chOff x="5688013" y="2752725"/>
+              <a:chExt cx="271462" cy="119063"/>
+            </a:xfrm>
+          </p:grpSpPr>
+          <p:cxnSp>
+            <p:nvCxnSpPr>
+              <p:cNvPr id="63" name="Straight Connector 62">
+                <a:extLst>
+                  <a:ext uri="{FF2B5EF4-FFF2-40B4-BE49-F238E27FC236}">
+                    <a16:creationId xmlns:a16="http://schemas.microsoft.com/office/drawing/2014/main" id="{5B72CC3B-C68D-D4F9-F593-F0DAB341D8ED}"/>
+                  </a:ext>
+                </a:extLst>
+              </p:cNvPr>
+              <p:cNvCxnSpPr>
+                <a:cxnSpLocks/>
+              </p:cNvCxnSpPr>
+              <p:nvPr/>
+            </p:nvCxnSpPr>
+            <p:spPr>
+              <a:xfrm>
+                <a:off x="5688013" y="2871788"/>
+                <a:ext cx="271462" cy="0"/>
+              </a:xfrm>
+              <a:prstGeom prst="line">
+                <a:avLst/>
+              </a:prstGeom>
+              <a:ln w="25400"/>
+            </p:spPr>
+            <p:style>
+              <a:lnRef idx="1">
+                <a:schemeClr val="dk1"/>
+              </a:lnRef>
+              <a:fillRef idx="0">
+                <a:schemeClr val="dk1"/>
+              </a:fillRef>
+              <a:effectRef idx="0">
+                <a:schemeClr val="dk1"/>
+              </a:effectRef>
+              <a:fontRef idx="minor">
+                <a:schemeClr val="tx1"/>
+              </a:fontRef>
+            </p:style>
+          </p:cxnSp>
+          <p:cxnSp>
+            <p:nvCxnSpPr>
+              <p:cNvPr id="64" name="Straight Connector 63">
+                <a:extLst>
+                  <a:ext uri="{FF2B5EF4-FFF2-40B4-BE49-F238E27FC236}">
+                    <a16:creationId xmlns:a16="http://schemas.microsoft.com/office/drawing/2014/main" id="{D10CA969-5AE9-D359-5875-BF57E6C9DC2C}"/>
+                  </a:ext>
+                </a:extLst>
+              </p:cNvPr>
+              <p:cNvCxnSpPr>
+                <a:cxnSpLocks/>
+              </p:cNvCxnSpPr>
+              <p:nvPr/>
+            </p:nvCxnSpPr>
+            <p:spPr>
+              <a:xfrm flipV="1">
+                <a:off x="5823744" y="2752725"/>
+                <a:ext cx="0" cy="115888"/>
+              </a:xfrm>
+              <a:prstGeom prst="line">
+                <a:avLst/>
+              </a:prstGeom>
+            </p:spPr>
+            <p:style>
+              <a:lnRef idx="2">
+                <a:schemeClr val="dk1"/>
+              </a:lnRef>
+              <a:fillRef idx="1">
+                <a:schemeClr val="lt1"/>
+              </a:fillRef>
+              <a:effectRef idx="0">
+                <a:schemeClr val="dk1"/>
+              </a:effectRef>
+              <a:fontRef idx="minor">
+                <a:schemeClr val="dk1"/>
+              </a:fontRef>
+            </p:style>
+          </p:cxnSp>
+        </p:grpSp>
+      </p:grpSp>
+      <p:grpSp>
+        <p:nvGrpSpPr>
+          <p:cNvPr id="65" name="Group 64">
+            <a:extLst>
+              <a:ext uri="{FF2B5EF4-FFF2-40B4-BE49-F238E27FC236}">
+                <a16:creationId xmlns:a16="http://schemas.microsoft.com/office/drawing/2014/main" id="{67A89579-9173-DFE1-6F7C-03AA989920B2}"/>
+              </a:ext>
+            </a:extLst>
+          </p:cNvPr>
+          <p:cNvGrpSpPr/>
+          <p:nvPr/>
+        </p:nvGrpSpPr>
+        <p:grpSpPr>
+          <a:xfrm>
+            <a:off x="1387782" y="3744244"/>
+            <a:ext cx="771525" cy="223838"/>
+            <a:chOff x="5454650" y="2763837"/>
+            <a:chExt cx="771525" cy="223838"/>
+          </a:xfrm>
+          <a:effectLst>
+            <a:outerShdw blurRad="50800" dist="38100" dir="2700000" algn="tl" rotWithShape="0">
+              <a:prstClr val="black">
+                <a:alpha val="40000"/>
+              </a:prstClr>
+            </a:outerShdw>
+          </a:effectLst>
+        </p:grpSpPr>
+        <p:cxnSp>
+          <p:nvCxnSpPr>
+            <p:cNvPr id="66" name="Straight Connector 65">
+              <a:extLst>
+                <a:ext uri="{FF2B5EF4-FFF2-40B4-BE49-F238E27FC236}">
+                  <a16:creationId xmlns:a16="http://schemas.microsoft.com/office/drawing/2014/main" id="{75A99180-9FA3-D135-4909-9E20A20D18A1}"/>
+                </a:ext>
+              </a:extLst>
+            </p:cNvPr>
+            <p:cNvCxnSpPr>
+              <a:cxnSpLocks/>
+              <a:endCxn id="67" idx="2"/>
+            </p:cNvCxnSpPr>
+            <p:nvPr/>
+          </p:nvCxnSpPr>
+          <p:spPr>
+            <a:xfrm>
+              <a:off x="5454650" y="2957512"/>
+              <a:ext cx="257175" cy="1"/>
+            </a:xfrm>
+            <a:prstGeom prst="line">
+              <a:avLst/>
+            </a:prstGeom>
+          </p:spPr>
+          <p:style>
+            <a:lnRef idx="2">
+              <a:schemeClr val="dk1"/>
+            </a:lnRef>
+            <a:fillRef idx="1">
+              <a:schemeClr val="lt1"/>
+            </a:fillRef>
+            <a:effectRef idx="0">
+              <a:schemeClr val="dk1"/>
+            </a:effectRef>
+            <a:fontRef idx="minor">
+              <a:schemeClr val="dk1"/>
+            </a:fontRef>
+          </p:style>
+        </p:cxnSp>
+        <p:sp>
+          <p:nvSpPr>
+            <p:cNvPr id="67" name="Oval 66">
+              <a:extLst>
+                <a:ext uri="{FF2B5EF4-FFF2-40B4-BE49-F238E27FC236}">
+                  <a16:creationId xmlns:a16="http://schemas.microsoft.com/office/drawing/2014/main" id="{8A3C385E-8BF8-5FBC-9BE0-7698941A3B66}"/>
+                </a:ext>
+              </a:extLst>
+            </p:cNvPr>
+            <p:cNvSpPr/>
+            <p:nvPr/>
+          </p:nvSpPr>
+          <p:spPr>
+            <a:xfrm>
+              <a:off x="5711825" y="2927350"/>
+              <a:ext cx="60325" cy="60325"/>
+            </a:xfrm>
+            <a:prstGeom prst="ellipse">
+              <a:avLst/>
+            </a:prstGeom>
+          </p:spPr>
+          <p:style>
+            <a:lnRef idx="2">
+              <a:schemeClr val="dk1"/>
+            </a:lnRef>
+            <a:fillRef idx="1">
+              <a:schemeClr val="lt1"/>
+            </a:fillRef>
+            <a:effectRef idx="0">
+              <a:schemeClr val="dk1"/>
+            </a:effectRef>
+            <a:fontRef idx="minor">
+              <a:schemeClr val="dk1"/>
+            </a:fontRef>
+          </p:style>
+          <p:txBody>
+            <a:bodyPr rtlCol="0" anchor="ctr"/>
+            <a:lstStyle/>
+            <a:p>
+              <a:pPr algn="ctr"/>
+              <a:endParaRPr lang="en-GB"/>
+            </a:p>
+          </p:txBody>
+        </p:sp>
+        <p:cxnSp>
+          <p:nvCxnSpPr>
+            <p:cNvPr id="68" name="Straight Connector 67">
+              <a:extLst>
+                <a:ext uri="{FF2B5EF4-FFF2-40B4-BE49-F238E27FC236}">
+                  <a16:creationId xmlns:a16="http://schemas.microsoft.com/office/drawing/2014/main" id="{871A1DB1-5B1B-132D-2853-EEB685AFCA3B}"/>
+                </a:ext>
+              </a:extLst>
+            </p:cNvPr>
+            <p:cNvCxnSpPr>
+              <a:cxnSpLocks/>
+              <a:endCxn id="69" idx="2"/>
+            </p:cNvCxnSpPr>
+            <p:nvPr/>
+          </p:nvCxnSpPr>
+          <p:spPr>
+            <a:xfrm flipH="1">
+              <a:off x="5969000" y="2957512"/>
+              <a:ext cx="257175" cy="1"/>
+            </a:xfrm>
+            <a:prstGeom prst="line">
+              <a:avLst/>
+            </a:prstGeom>
+          </p:spPr>
+          <p:style>
+            <a:lnRef idx="2">
+              <a:schemeClr val="dk1"/>
+            </a:lnRef>
+            <a:fillRef idx="1">
+              <a:schemeClr val="lt1"/>
+            </a:fillRef>
+            <a:effectRef idx="0">
+              <a:schemeClr val="dk1"/>
+            </a:effectRef>
+            <a:fontRef idx="minor">
+              <a:schemeClr val="dk1"/>
+            </a:fontRef>
+          </p:style>
+        </p:cxnSp>
+        <p:sp>
+          <p:nvSpPr>
+            <p:cNvPr id="69" name="Oval 68">
+              <a:extLst>
+                <a:ext uri="{FF2B5EF4-FFF2-40B4-BE49-F238E27FC236}">
+                  <a16:creationId xmlns:a16="http://schemas.microsoft.com/office/drawing/2014/main" id="{0B53705E-690D-E04B-A30F-DA7C3F7C7D5A}"/>
+                </a:ext>
+              </a:extLst>
+            </p:cNvPr>
+            <p:cNvSpPr/>
+            <p:nvPr/>
+          </p:nvSpPr>
+          <p:spPr>
+            <a:xfrm flipH="1">
+              <a:off x="5908675" y="2927350"/>
+              <a:ext cx="60325" cy="60325"/>
+            </a:xfrm>
+            <a:prstGeom prst="ellipse">
+              <a:avLst/>
+            </a:prstGeom>
+          </p:spPr>
+          <p:style>
+            <a:lnRef idx="2">
+              <a:schemeClr val="dk1"/>
+            </a:lnRef>
+            <a:fillRef idx="1">
+              <a:schemeClr val="lt1"/>
+            </a:fillRef>
+            <a:effectRef idx="0">
+              <a:schemeClr val="dk1"/>
+            </a:effectRef>
+            <a:fontRef idx="minor">
+              <a:schemeClr val="dk1"/>
+            </a:fontRef>
+          </p:style>
+          <p:txBody>
+            <a:bodyPr rtlCol="0" anchor="ctr"/>
+            <a:lstStyle/>
+            <a:p>
+              <a:pPr algn="ctr"/>
+              <a:endParaRPr lang="en-GB"/>
+            </a:p>
+          </p:txBody>
+        </p:sp>
+        <p:grpSp>
+          <p:nvGrpSpPr>
+            <p:cNvPr id="70" name="Group 69">
+              <a:extLst>
+                <a:ext uri="{FF2B5EF4-FFF2-40B4-BE49-F238E27FC236}">
+                  <a16:creationId xmlns:a16="http://schemas.microsoft.com/office/drawing/2014/main" id="{FDBFD7AC-9BC8-CF57-2054-85CAEB77F3F5}"/>
+                </a:ext>
+              </a:extLst>
+            </p:cNvPr>
+            <p:cNvGrpSpPr/>
+            <p:nvPr/>
+          </p:nvGrpSpPr>
+          <p:grpSpPr>
+            <a:xfrm>
+              <a:off x="5705474" y="2763837"/>
+              <a:ext cx="271462" cy="119063"/>
+              <a:chOff x="5688013" y="2752725"/>
+              <a:chExt cx="271462" cy="119063"/>
+            </a:xfrm>
+          </p:grpSpPr>
+          <p:cxnSp>
+            <p:nvCxnSpPr>
+              <p:cNvPr id="71" name="Straight Connector 70">
+                <a:extLst>
+                  <a:ext uri="{FF2B5EF4-FFF2-40B4-BE49-F238E27FC236}">
+                    <a16:creationId xmlns:a16="http://schemas.microsoft.com/office/drawing/2014/main" id="{592733BD-D281-B5EF-E9DE-EDCBA74D23A8}"/>
+                  </a:ext>
+                </a:extLst>
+              </p:cNvPr>
+              <p:cNvCxnSpPr>
+                <a:cxnSpLocks/>
+              </p:cNvCxnSpPr>
+              <p:nvPr/>
+            </p:nvCxnSpPr>
+            <p:spPr>
+              <a:xfrm>
+                <a:off x="5688013" y="2871788"/>
+                <a:ext cx="271462" cy="0"/>
+              </a:xfrm>
+              <a:prstGeom prst="line">
+                <a:avLst/>
+              </a:prstGeom>
+              <a:ln w="25400"/>
+            </p:spPr>
+            <p:style>
+              <a:lnRef idx="1">
+                <a:schemeClr val="dk1"/>
+              </a:lnRef>
+              <a:fillRef idx="0">
+                <a:schemeClr val="dk1"/>
+              </a:fillRef>
+              <a:effectRef idx="0">
+                <a:schemeClr val="dk1"/>
+              </a:effectRef>
+              <a:fontRef idx="minor">
+                <a:schemeClr val="tx1"/>
+              </a:fontRef>
+            </p:style>
+          </p:cxnSp>
+          <p:cxnSp>
+            <p:nvCxnSpPr>
+              <p:cNvPr id="72" name="Straight Connector 71">
+                <a:extLst>
+                  <a:ext uri="{FF2B5EF4-FFF2-40B4-BE49-F238E27FC236}">
+                    <a16:creationId xmlns:a16="http://schemas.microsoft.com/office/drawing/2014/main" id="{D8C77588-ADDD-CBE4-BFBD-D7F6F553E447}"/>
+                  </a:ext>
+                </a:extLst>
+              </p:cNvPr>
+              <p:cNvCxnSpPr>
+                <a:cxnSpLocks/>
+              </p:cNvCxnSpPr>
+              <p:nvPr/>
+            </p:nvCxnSpPr>
+            <p:spPr>
+              <a:xfrm flipV="1">
+                <a:off x="5823744" y="2752725"/>
+                <a:ext cx="0" cy="115888"/>
+              </a:xfrm>
+              <a:prstGeom prst="line">
+                <a:avLst/>
+              </a:prstGeom>
+            </p:spPr>
+            <p:style>
+              <a:lnRef idx="2">
+                <a:schemeClr val="dk1"/>
+              </a:lnRef>
+              <a:fillRef idx="1">
+                <a:schemeClr val="lt1"/>
+              </a:fillRef>
+              <a:effectRef idx="0">
+                <a:schemeClr val="dk1"/>
+              </a:effectRef>
+              <a:fontRef idx="minor">
+                <a:schemeClr val="dk1"/>
+              </a:fontRef>
+            </p:style>
+          </p:cxnSp>
+        </p:grpSp>
+      </p:grpSp>
+      <p:grpSp>
+        <p:nvGrpSpPr>
+          <p:cNvPr id="73" name="Group 72">
+            <a:extLst>
+              <a:ext uri="{FF2B5EF4-FFF2-40B4-BE49-F238E27FC236}">
+                <a16:creationId xmlns:a16="http://schemas.microsoft.com/office/drawing/2014/main" id="{0D255EEA-F664-C544-0422-ACDAE57F4863}"/>
+              </a:ext>
+            </a:extLst>
+          </p:cNvPr>
+          <p:cNvGrpSpPr/>
+          <p:nvPr/>
+        </p:nvGrpSpPr>
+        <p:grpSpPr>
+          <a:xfrm>
+            <a:off x="1387782" y="3411810"/>
+            <a:ext cx="771525" cy="223838"/>
+            <a:chOff x="5454650" y="2763837"/>
+            <a:chExt cx="771525" cy="223838"/>
+          </a:xfrm>
+          <a:effectLst>
+            <a:outerShdw blurRad="50800" dist="38100" dir="2700000" algn="tl" rotWithShape="0">
+              <a:prstClr val="black">
+                <a:alpha val="40000"/>
+              </a:prstClr>
+            </a:outerShdw>
+          </a:effectLst>
+        </p:grpSpPr>
+        <p:cxnSp>
+          <p:nvCxnSpPr>
+            <p:cNvPr id="74" name="Straight Connector 73">
+              <a:extLst>
+                <a:ext uri="{FF2B5EF4-FFF2-40B4-BE49-F238E27FC236}">
+                  <a16:creationId xmlns:a16="http://schemas.microsoft.com/office/drawing/2014/main" id="{92F9E2F4-B91C-7E27-D33F-4A6D6BB6E49F}"/>
+                </a:ext>
+              </a:extLst>
+            </p:cNvPr>
+            <p:cNvCxnSpPr>
+              <a:cxnSpLocks/>
+              <a:endCxn id="75" idx="2"/>
+            </p:cNvCxnSpPr>
+            <p:nvPr/>
+          </p:nvCxnSpPr>
+          <p:spPr>
+            <a:xfrm>
+              <a:off x="5454650" y="2957512"/>
+              <a:ext cx="257175" cy="1"/>
+            </a:xfrm>
+            <a:prstGeom prst="line">
+              <a:avLst/>
+            </a:prstGeom>
+          </p:spPr>
+          <p:style>
+            <a:lnRef idx="2">
+              <a:schemeClr val="dk1"/>
+            </a:lnRef>
+            <a:fillRef idx="1">
+              <a:schemeClr val="lt1"/>
+            </a:fillRef>
+            <a:effectRef idx="0">
+              <a:schemeClr val="dk1"/>
+            </a:effectRef>
+            <a:fontRef idx="minor">
+              <a:schemeClr val="dk1"/>
+            </a:fontRef>
+          </p:style>
+        </p:cxnSp>
+        <p:sp>
+          <p:nvSpPr>
+            <p:cNvPr id="75" name="Oval 74">
+              <a:extLst>
+                <a:ext uri="{FF2B5EF4-FFF2-40B4-BE49-F238E27FC236}">
+                  <a16:creationId xmlns:a16="http://schemas.microsoft.com/office/drawing/2014/main" id="{39C3E460-A816-E715-84D4-3C7C4CDCE31B}"/>
+                </a:ext>
+              </a:extLst>
+            </p:cNvPr>
+            <p:cNvSpPr/>
+            <p:nvPr/>
+          </p:nvSpPr>
+          <p:spPr>
+            <a:xfrm>
+              <a:off x="5711825" y="2927350"/>
+              <a:ext cx="60325" cy="60325"/>
+            </a:xfrm>
+            <a:prstGeom prst="ellipse">
+              <a:avLst/>
+            </a:prstGeom>
+          </p:spPr>
+          <p:style>
+            <a:lnRef idx="2">
+              <a:schemeClr val="dk1"/>
+            </a:lnRef>
+            <a:fillRef idx="1">
+              <a:schemeClr val="lt1"/>
+            </a:fillRef>
+            <a:effectRef idx="0">
+              <a:schemeClr val="dk1"/>
+            </a:effectRef>
+            <a:fontRef idx="minor">
+              <a:schemeClr val="dk1"/>
+            </a:fontRef>
+          </p:style>
+          <p:txBody>
+            <a:bodyPr rtlCol="0" anchor="ctr"/>
+            <a:lstStyle/>
+            <a:p>
+              <a:pPr algn="ctr"/>
+              <a:endParaRPr lang="en-GB"/>
+            </a:p>
+          </p:txBody>
+        </p:sp>
+        <p:cxnSp>
+          <p:nvCxnSpPr>
+            <p:cNvPr id="76" name="Straight Connector 75">
+              <a:extLst>
+                <a:ext uri="{FF2B5EF4-FFF2-40B4-BE49-F238E27FC236}">
+                  <a16:creationId xmlns:a16="http://schemas.microsoft.com/office/drawing/2014/main" id="{0E10DA61-E81A-8FE2-6DCD-5498C4F3ECAB}"/>
+                </a:ext>
+              </a:extLst>
+            </p:cNvPr>
+            <p:cNvCxnSpPr>
+              <a:cxnSpLocks/>
+              <a:endCxn id="77" idx="2"/>
+            </p:cNvCxnSpPr>
+            <p:nvPr/>
+          </p:nvCxnSpPr>
+          <p:spPr>
+            <a:xfrm flipH="1">
+              <a:off x="5969000" y="2957512"/>
+              <a:ext cx="257175" cy="1"/>
+            </a:xfrm>
+            <a:prstGeom prst="line">
+              <a:avLst/>
+            </a:prstGeom>
+          </p:spPr>
+          <p:style>
+            <a:lnRef idx="2">
+              <a:schemeClr val="dk1"/>
+            </a:lnRef>
+            <a:fillRef idx="1">
+              <a:schemeClr val="lt1"/>
+            </a:fillRef>
+            <a:effectRef idx="0">
+              <a:schemeClr val="dk1"/>
+            </a:effectRef>
+            <a:fontRef idx="minor">
+              <a:schemeClr val="dk1"/>
+            </a:fontRef>
+          </p:style>
+        </p:cxnSp>
+        <p:sp>
+          <p:nvSpPr>
+            <p:cNvPr id="77" name="Oval 76">
+              <a:extLst>
+                <a:ext uri="{FF2B5EF4-FFF2-40B4-BE49-F238E27FC236}">
+                  <a16:creationId xmlns:a16="http://schemas.microsoft.com/office/drawing/2014/main" id="{C31E8E9E-A6C7-6B13-46E2-6B7F076E48DD}"/>
+                </a:ext>
+              </a:extLst>
+            </p:cNvPr>
+            <p:cNvSpPr/>
+            <p:nvPr/>
+          </p:nvSpPr>
+          <p:spPr>
+            <a:xfrm flipH="1">
+              <a:off x="5908675" y="2927350"/>
+              <a:ext cx="60325" cy="60325"/>
+            </a:xfrm>
+            <a:prstGeom prst="ellipse">
+              <a:avLst/>
+            </a:prstGeom>
+          </p:spPr>
+          <p:style>
+            <a:lnRef idx="2">
+              <a:schemeClr val="dk1"/>
+            </a:lnRef>
+            <a:fillRef idx="1">
+              <a:schemeClr val="lt1"/>
+            </a:fillRef>
+            <a:effectRef idx="0">
+              <a:schemeClr val="dk1"/>
+            </a:effectRef>
+            <a:fontRef idx="minor">
+              <a:schemeClr val="dk1"/>
+            </a:fontRef>
+          </p:style>
+          <p:txBody>
+            <a:bodyPr rtlCol="0" anchor="ctr"/>
+            <a:lstStyle/>
+            <a:p>
+              <a:pPr algn="ctr"/>
+              <a:endParaRPr lang="en-GB"/>
+            </a:p>
+          </p:txBody>
+        </p:sp>
+        <p:grpSp>
+          <p:nvGrpSpPr>
+            <p:cNvPr id="78" name="Group 77">
+              <a:extLst>
+                <a:ext uri="{FF2B5EF4-FFF2-40B4-BE49-F238E27FC236}">
+                  <a16:creationId xmlns:a16="http://schemas.microsoft.com/office/drawing/2014/main" id="{87E436EE-A8F1-C8C8-2955-7EFD20A75683}"/>
+                </a:ext>
+              </a:extLst>
+            </p:cNvPr>
+            <p:cNvGrpSpPr/>
+            <p:nvPr/>
+          </p:nvGrpSpPr>
+          <p:grpSpPr>
+            <a:xfrm>
+              <a:off x="5705474" y="2763837"/>
+              <a:ext cx="271462" cy="119063"/>
+              <a:chOff x="5688013" y="2752725"/>
+              <a:chExt cx="271462" cy="119063"/>
+            </a:xfrm>
+          </p:grpSpPr>
+          <p:cxnSp>
+            <p:nvCxnSpPr>
+              <p:cNvPr id="79" name="Straight Connector 78">
+                <a:extLst>
+                  <a:ext uri="{FF2B5EF4-FFF2-40B4-BE49-F238E27FC236}">
+                    <a16:creationId xmlns:a16="http://schemas.microsoft.com/office/drawing/2014/main" id="{7DA44ABC-E394-0B80-BE60-A4B48B69892F}"/>
+                  </a:ext>
+                </a:extLst>
+              </p:cNvPr>
+              <p:cNvCxnSpPr>
+                <a:cxnSpLocks/>
+              </p:cNvCxnSpPr>
+              <p:nvPr/>
+            </p:nvCxnSpPr>
+            <p:spPr>
+              <a:xfrm>
+                <a:off x="5688013" y="2871788"/>
+                <a:ext cx="271462" cy="0"/>
+              </a:xfrm>
+              <a:prstGeom prst="line">
+                <a:avLst/>
+              </a:prstGeom>
+              <a:ln w="25400"/>
+            </p:spPr>
+            <p:style>
+              <a:lnRef idx="1">
+                <a:schemeClr val="dk1"/>
+              </a:lnRef>
+              <a:fillRef idx="0">
+                <a:schemeClr val="dk1"/>
+              </a:fillRef>
+              <a:effectRef idx="0">
+                <a:schemeClr val="dk1"/>
+              </a:effectRef>
+              <a:fontRef idx="minor">
+                <a:schemeClr val="tx1"/>
+              </a:fontRef>
+            </p:style>
+          </p:cxnSp>
+          <p:cxnSp>
+            <p:nvCxnSpPr>
+              <p:cNvPr id="80" name="Straight Connector 79">
+                <a:extLst>
+                  <a:ext uri="{FF2B5EF4-FFF2-40B4-BE49-F238E27FC236}">
+                    <a16:creationId xmlns:a16="http://schemas.microsoft.com/office/drawing/2014/main" id="{976FF75D-47FD-6A02-8FBE-0A385A146137}"/>
+                  </a:ext>
+                </a:extLst>
+              </p:cNvPr>
+              <p:cNvCxnSpPr>
+                <a:cxnSpLocks/>
+              </p:cNvCxnSpPr>
+              <p:nvPr/>
+            </p:nvCxnSpPr>
+            <p:spPr>
+              <a:xfrm flipV="1">
+                <a:off x="5823744" y="2752725"/>
+                <a:ext cx="0" cy="115888"/>
+              </a:xfrm>
+              <a:prstGeom prst="line">
+                <a:avLst/>
+              </a:prstGeom>
+            </p:spPr>
+            <p:style>
+              <a:lnRef idx="2">
+                <a:schemeClr val="dk1"/>
+              </a:lnRef>
+              <a:fillRef idx="1">
+                <a:schemeClr val="lt1"/>
+              </a:fillRef>
+              <a:effectRef idx="0">
+                <a:schemeClr val="dk1"/>
+              </a:effectRef>
+              <a:fontRef idx="minor">
+                <a:schemeClr val="dk1"/>
+              </a:fontRef>
+            </p:style>
+          </p:cxnSp>
+        </p:grpSp>
+      </p:grpSp>
+      <p:cxnSp>
+        <p:nvCxnSpPr>
+          <p:cNvPr id="82" name="Straight Connector 81">
+            <a:extLst>
+              <a:ext uri="{FF2B5EF4-FFF2-40B4-BE49-F238E27FC236}">
+                <a16:creationId xmlns:a16="http://schemas.microsoft.com/office/drawing/2014/main" id="{F7CA4912-BBE6-90EF-089D-B790674F1018}"/>
+              </a:ext>
+            </a:extLst>
+          </p:cNvPr>
+          <p:cNvCxnSpPr/>
+          <p:nvPr/>
+        </p:nvCxnSpPr>
+        <p:spPr>
+          <a:xfrm>
+            <a:off x="4205211" y="2823425"/>
+            <a:ext cx="0" cy="1322500"/>
+          </a:xfrm>
+          <a:prstGeom prst="line">
+            <a:avLst/>
+          </a:prstGeom>
+        </p:spPr>
+        <p:style>
+          <a:lnRef idx="3">
+            <a:schemeClr val="dk1"/>
+          </a:lnRef>
+          <a:fillRef idx="0">
+            <a:schemeClr val="dk1"/>
+          </a:fillRef>
+          <a:effectRef idx="2">
+            <a:schemeClr val="dk1"/>
+          </a:effectRef>
+          <a:fontRef idx="minor">
+            <a:schemeClr val="tx1"/>
+          </a:fontRef>
+        </p:style>
+      </p:cxnSp>
+      <p:cxnSp>
+        <p:nvCxnSpPr>
+          <p:cNvPr id="84" name="Straight Connector 83">
+            <a:extLst>
+              <a:ext uri="{FF2B5EF4-FFF2-40B4-BE49-F238E27FC236}">
+                <a16:creationId xmlns:a16="http://schemas.microsoft.com/office/drawing/2014/main" id="{0A26B151-2B3C-B88B-0975-903E071CBA9A}"/>
+              </a:ext>
+            </a:extLst>
+          </p:cNvPr>
+          <p:cNvCxnSpPr>
+            <a:stCxn id="3" idx="3"/>
+          </p:cNvCxnSpPr>
+          <p:nvPr/>
+        </p:nvCxnSpPr>
+        <p:spPr>
+          <a:xfrm flipV="1">
+            <a:off x="3708050" y="3424829"/>
+            <a:ext cx="497161" cy="4171"/>
+          </a:xfrm>
+          <a:prstGeom prst="line">
+            <a:avLst/>
+          </a:prstGeom>
+        </p:spPr>
+        <p:style>
+          <a:lnRef idx="3">
+            <a:schemeClr val="dk1"/>
+          </a:lnRef>
+          <a:fillRef idx="0">
+            <a:schemeClr val="dk1"/>
+          </a:fillRef>
+          <a:effectRef idx="2">
+            <a:schemeClr val="dk1"/>
+          </a:effectRef>
+          <a:fontRef idx="minor">
+            <a:schemeClr val="tx1"/>
+          </a:fontRef>
+        </p:style>
+      </p:cxnSp>
+      <p:cxnSp>
+        <p:nvCxnSpPr>
+          <p:cNvPr id="86" name="Straight Connector 85">
+            <a:extLst>
+              <a:ext uri="{FF2B5EF4-FFF2-40B4-BE49-F238E27FC236}">
+                <a16:creationId xmlns:a16="http://schemas.microsoft.com/office/drawing/2014/main" id="{68F3F7AB-E86C-5A23-8D4B-0E8D484DDDCA}"/>
+              </a:ext>
+            </a:extLst>
+          </p:cNvPr>
+          <p:cNvCxnSpPr/>
+          <p:nvPr/>
+        </p:nvCxnSpPr>
+        <p:spPr>
+          <a:xfrm>
+            <a:off x="2159307" y="2948552"/>
+            <a:ext cx="0" cy="989367"/>
+          </a:xfrm>
+          <a:prstGeom prst="line">
+            <a:avLst/>
+          </a:prstGeom>
+        </p:spPr>
+        <p:style>
+          <a:lnRef idx="3">
+            <a:schemeClr val="dk1"/>
+          </a:lnRef>
+          <a:fillRef idx="0">
+            <a:schemeClr val="dk1"/>
+          </a:fillRef>
+          <a:effectRef idx="2">
+            <a:schemeClr val="dk1"/>
+          </a:effectRef>
+          <a:fontRef idx="minor">
+            <a:schemeClr val="tx1"/>
+          </a:fontRef>
+        </p:style>
+      </p:cxnSp>
+      <p:cxnSp>
+        <p:nvCxnSpPr>
+          <p:cNvPr id="91" name="Straight Connector 90">
+            <a:extLst>
+              <a:ext uri="{FF2B5EF4-FFF2-40B4-BE49-F238E27FC236}">
+                <a16:creationId xmlns:a16="http://schemas.microsoft.com/office/drawing/2014/main" id="{E018E146-AF2E-7654-7E24-2EC61239902A}"/>
+              </a:ext>
+            </a:extLst>
+          </p:cNvPr>
+          <p:cNvCxnSpPr>
+            <a:stCxn id="3" idx="1"/>
+          </p:cNvCxnSpPr>
+          <p:nvPr/>
+        </p:nvCxnSpPr>
+        <p:spPr>
+          <a:xfrm flipH="1" flipV="1">
+            <a:off x="2159307" y="3424829"/>
+            <a:ext cx="634343" cy="4171"/>
+          </a:xfrm>
+          <a:prstGeom prst="line">
+            <a:avLst/>
+          </a:prstGeom>
+        </p:spPr>
+        <p:style>
+          <a:lnRef idx="3">
+            <a:schemeClr val="dk1"/>
+          </a:lnRef>
+          <a:fillRef idx="0">
+            <a:schemeClr val="dk1"/>
+          </a:fillRef>
+          <a:effectRef idx="2">
+            <a:schemeClr val="dk1"/>
+          </a:effectRef>
+          <a:fontRef idx="minor">
+            <a:schemeClr val="tx1"/>
+          </a:fontRef>
+        </p:style>
+      </p:cxnSp>
+      <p:cxnSp>
+        <p:nvCxnSpPr>
+          <p:cNvPr id="93" name="Straight Arrow Connector 92">
+            <a:extLst>
+              <a:ext uri="{FF2B5EF4-FFF2-40B4-BE49-F238E27FC236}">
+                <a16:creationId xmlns:a16="http://schemas.microsoft.com/office/drawing/2014/main" id="{6EDC3D26-D76D-AFB2-B8BC-76195EB60C87}"/>
+              </a:ext>
+            </a:extLst>
+          </p:cNvPr>
+          <p:cNvCxnSpPr>
+            <a:stCxn id="2" idx="2"/>
+            <a:endCxn id="3" idx="0"/>
+          </p:cNvCxnSpPr>
+          <p:nvPr/>
+        </p:nvCxnSpPr>
+        <p:spPr>
+          <a:xfrm>
+            <a:off x="3250850" y="2540521"/>
+            <a:ext cx="0" cy="431279"/>
+          </a:xfrm>
+          <a:prstGeom prst="straightConnector1">
+            <a:avLst/>
+          </a:prstGeom>
+          <a:ln>
+            <a:headEnd type="triangle"/>
+            <a:tailEnd type="triangle"/>
+          </a:ln>
+        </p:spPr>
+        <p:style>
+          <a:lnRef idx="3">
+            <a:schemeClr val="dk1"/>
+          </a:lnRef>
+          <a:fillRef idx="0">
+            <a:schemeClr val="dk1"/>
+          </a:fillRef>
+          <a:effectRef idx="2">
+            <a:schemeClr val="dk1"/>
+          </a:effectRef>
+          <a:fontRef idx="minor">
+            <a:schemeClr val="tx1"/>
+          </a:fontRef>
+        </p:style>
+      </p:cxnSp>
+    </p:spTree>
+    <p:extLst>
+      <p:ext uri="{BB962C8B-B14F-4D97-AF65-F5344CB8AC3E}">
+        <p14:creationId xmlns:p14="http://schemas.microsoft.com/office/powerpoint/2010/main" val="293989708"/>
+      </p:ext>
+    </p:extLst>
+  </p:cSld>
+  <p:clrMapOvr>
+    <a:masterClrMapping/>
+  </p:clrMapOvr>
+</p:sld>
+</file>
+
 <file path=ppt/theme/theme1.xml><?xml version="1.0" encoding="utf-8"?>
 <a:theme xmlns:a="http://schemas.openxmlformats.org/drawingml/2006/main" name="Office Theme">
   <a:themeElements>

</xml_diff>

<commit_message>
Added 7 segment display to top level architecture
Fixed a broken link to the dimmer controller non-demo.
</commit_message>
<xml_diff>
--- a/docs/images/Diagrams.pptx
+++ b/docs/images/Diagrams.pptx
@@ -266,7 +266,7 @@
           <a:p>
             <a:fld id="{30A9C857-609A-43FA-83CE-07000BF55DB0}" type="datetimeFigureOut">
               <a:rPr lang="en-GB" smtClean="0"/>
-              <a:t>13/11/2022</a:t>
+              <a:t>19/11/2022</a:t>
             </a:fld>
             <a:endParaRPr lang="en-GB"/>
           </a:p>
@@ -466,7 +466,7 @@
           <a:p>
             <a:fld id="{30A9C857-609A-43FA-83CE-07000BF55DB0}" type="datetimeFigureOut">
               <a:rPr lang="en-GB" smtClean="0"/>
-              <a:t>13/11/2022</a:t>
+              <a:t>19/11/2022</a:t>
             </a:fld>
             <a:endParaRPr lang="en-GB"/>
           </a:p>
@@ -676,7 +676,7 @@
           <a:p>
             <a:fld id="{30A9C857-609A-43FA-83CE-07000BF55DB0}" type="datetimeFigureOut">
               <a:rPr lang="en-GB" smtClean="0"/>
-              <a:t>13/11/2022</a:t>
+              <a:t>19/11/2022</a:t>
             </a:fld>
             <a:endParaRPr lang="en-GB"/>
           </a:p>
@@ -876,7 +876,7 @@
           <a:p>
             <a:fld id="{30A9C857-609A-43FA-83CE-07000BF55DB0}" type="datetimeFigureOut">
               <a:rPr lang="en-GB" smtClean="0"/>
-              <a:t>13/11/2022</a:t>
+              <a:t>19/11/2022</a:t>
             </a:fld>
             <a:endParaRPr lang="en-GB"/>
           </a:p>
@@ -1152,7 +1152,7 @@
           <a:p>
             <a:fld id="{30A9C857-609A-43FA-83CE-07000BF55DB0}" type="datetimeFigureOut">
               <a:rPr lang="en-GB" smtClean="0"/>
-              <a:t>13/11/2022</a:t>
+              <a:t>19/11/2022</a:t>
             </a:fld>
             <a:endParaRPr lang="en-GB"/>
           </a:p>
@@ -1420,7 +1420,7 @@
           <a:p>
             <a:fld id="{30A9C857-609A-43FA-83CE-07000BF55DB0}" type="datetimeFigureOut">
               <a:rPr lang="en-GB" smtClean="0"/>
-              <a:t>13/11/2022</a:t>
+              <a:t>19/11/2022</a:t>
             </a:fld>
             <a:endParaRPr lang="en-GB"/>
           </a:p>
@@ -1835,7 +1835,7 @@
           <a:p>
             <a:fld id="{30A9C857-609A-43FA-83CE-07000BF55DB0}" type="datetimeFigureOut">
               <a:rPr lang="en-GB" smtClean="0"/>
-              <a:t>13/11/2022</a:t>
+              <a:t>19/11/2022</a:t>
             </a:fld>
             <a:endParaRPr lang="en-GB"/>
           </a:p>
@@ -1977,7 +1977,7 @@
           <a:p>
             <a:fld id="{30A9C857-609A-43FA-83CE-07000BF55DB0}" type="datetimeFigureOut">
               <a:rPr lang="en-GB" smtClean="0"/>
-              <a:t>13/11/2022</a:t>
+              <a:t>19/11/2022</a:t>
             </a:fld>
             <a:endParaRPr lang="en-GB"/>
           </a:p>
@@ -2090,7 +2090,7 @@
           <a:p>
             <a:fld id="{30A9C857-609A-43FA-83CE-07000BF55DB0}" type="datetimeFigureOut">
               <a:rPr lang="en-GB" smtClean="0"/>
-              <a:t>13/11/2022</a:t>
+              <a:t>19/11/2022</a:t>
             </a:fld>
             <a:endParaRPr lang="en-GB"/>
           </a:p>
@@ -2403,7 +2403,7 @@
           <a:p>
             <a:fld id="{30A9C857-609A-43FA-83CE-07000BF55DB0}" type="datetimeFigureOut">
               <a:rPr lang="en-GB" smtClean="0"/>
-              <a:t>13/11/2022</a:t>
+              <a:t>19/11/2022</a:t>
             </a:fld>
             <a:endParaRPr lang="en-GB"/>
           </a:p>
@@ -2692,7 +2692,7 @@
           <a:p>
             <a:fld id="{30A9C857-609A-43FA-83CE-07000BF55DB0}" type="datetimeFigureOut">
               <a:rPr lang="en-GB" smtClean="0"/>
-              <a:t>13/11/2022</a:t>
+              <a:t>19/11/2022</a:t>
             </a:fld>
             <a:endParaRPr lang="en-GB"/>
           </a:p>
@@ -2935,7 +2935,7 @@
           <a:p>
             <a:fld id="{30A9C857-609A-43FA-83CE-07000BF55DB0}" type="datetimeFigureOut">
               <a:rPr lang="en-GB" smtClean="0"/>
-              <a:t>13/11/2022</a:t>
+              <a:t>19/11/2022</a:t>
             </a:fld>
             <a:endParaRPr lang="en-GB"/>
           </a:p>
@@ -8838,7 +8838,7 @@
         <p:spPr>
           <a:xfrm>
             <a:off x="1718440" y="812800"/>
-            <a:ext cx="8365360" cy="4546600"/>
+            <a:ext cx="8436480" cy="4739640"/>
           </a:xfrm>
           <a:prstGeom prst="rect">
             <a:avLst/>
@@ -8884,8 +8884,8 @@
         </p:nvSpPr>
         <p:spPr>
           <a:xfrm>
-            <a:off x="3642174" y="980661"/>
-            <a:ext cx="4526459" cy="4211216"/>
+            <a:off x="3642174" y="980660"/>
+            <a:ext cx="4690442" cy="4440421"/>
           </a:xfrm>
           <a:prstGeom prst="rect">
             <a:avLst/>
@@ -10361,7 +10361,7 @@
         </p:nvGrpSpPr>
         <p:grpSpPr>
           <a:xfrm>
-            <a:off x="8361899" y="2086867"/>
+            <a:off x="8522217" y="2086867"/>
             <a:ext cx="650875" cy="438194"/>
             <a:chOff x="6797675" y="3488996"/>
             <a:chExt cx="650875" cy="438194"/>
@@ -10593,7 +10593,7 @@
         </p:nvGrpSpPr>
         <p:grpSpPr>
           <a:xfrm>
-            <a:off x="8361899" y="2532982"/>
+            <a:off x="8522217" y="2532982"/>
             <a:ext cx="650875" cy="438194"/>
             <a:chOff x="6797675" y="3488996"/>
             <a:chExt cx="650875" cy="438194"/>
@@ -10825,7 +10825,7 @@
         </p:nvGrpSpPr>
         <p:grpSpPr>
           <a:xfrm>
-            <a:off x="8361899" y="2971175"/>
+            <a:off x="8522217" y="2971175"/>
             <a:ext cx="650875" cy="438194"/>
             <a:chOff x="6797675" y="3488996"/>
             <a:chExt cx="650875" cy="438194"/>
@@ -11057,7 +11057,7 @@
         </p:nvGrpSpPr>
         <p:grpSpPr>
           <a:xfrm>
-            <a:off x="8361899" y="3409367"/>
+            <a:off x="8522217" y="3409367"/>
             <a:ext cx="650875" cy="438194"/>
             <a:chOff x="6797675" y="3488996"/>
             <a:chExt cx="650875" cy="438194"/>
@@ -11289,7 +11289,7 @@
         </p:nvCxnSpPr>
         <p:spPr>
           <a:xfrm>
-            <a:off x="8361899" y="2369771"/>
+            <a:off x="8522217" y="2369771"/>
             <a:ext cx="0" cy="1322500"/>
           </a:xfrm>
           <a:prstGeom prst="line">
@@ -13476,13 +13476,14 @@
           <p:cNvCxnSpPr>
             <a:cxnSpLocks/>
             <a:stCxn id="3" idx="3"/>
+            <a:endCxn id="110" idx="1"/>
           </p:cNvCxnSpPr>
           <p:nvPr/>
         </p:nvCxnSpPr>
         <p:spPr>
           <a:xfrm>
             <a:off x="4743115" y="4696665"/>
-            <a:ext cx="2450062" cy="0"/>
+            <a:ext cx="2100336" cy="3404"/>
           </a:xfrm>
           <a:prstGeom prst="line">
             <a:avLst/>
@@ -13521,14 +13522,14 @@
           </p:cNvPr>
           <p:cNvCxnSpPr>
             <a:cxnSpLocks/>
-            <a:stCxn id="2" idx="2"/>
+            <a:stCxn id="163" idx="2"/>
           </p:cNvCxnSpPr>
           <p:nvPr/>
         </p:nvCxnSpPr>
         <p:spPr>
           <a:xfrm>
-            <a:off x="7193177" y="3628416"/>
-            <a:ext cx="0" cy="1068249"/>
+            <a:off x="6605788" y="3628416"/>
+            <a:ext cx="0" cy="1067263"/>
           </a:xfrm>
           <a:prstGeom prst="line">
             <a:avLst/>
@@ -13827,7 +13828,7 @@
         <p:spPr>
           <a:xfrm>
             <a:off x="7942638" y="3023639"/>
-            <a:ext cx="419261" cy="0"/>
+            <a:ext cx="579579" cy="0"/>
           </a:xfrm>
           <a:prstGeom prst="line">
             <a:avLst/>
@@ -14083,7 +14084,7 @@
         </p:nvSpPr>
         <p:spPr>
           <a:xfrm>
-            <a:off x="9121140" y="2838972"/>
+            <a:off x="9281458" y="2838972"/>
             <a:ext cx="912429" cy="369332"/>
           </a:xfrm>
           <a:prstGeom prst="rect">
@@ -14118,8 +14119,8 @@
         </p:nvSpPr>
         <p:spPr>
           <a:xfrm>
-            <a:off x="6945852" y="2340213"/>
-            <a:ext cx="500778" cy="276999"/>
+            <a:off x="7028848" y="2418439"/>
+            <a:ext cx="316112" cy="184666"/>
           </a:xfrm>
           <a:prstGeom prst="rect">
             <a:avLst/>
@@ -14127,7 +14128,7 @@
           <a:noFill/>
         </p:spPr>
         <p:txBody>
-          <a:bodyPr wrap="none" rtlCol="0">
+          <a:bodyPr wrap="none" lIns="0" tIns="0" rIns="0" bIns="0" rtlCol="0">
             <a:spAutoFit/>
           </a:bodyPr>
           <a:lstStyle/>
@@ -14154,8 +14155,8 @@
         </p:nvSpPr>
         <p:spPr>
           <a:xfrm>
-            <a:off x="7018148" y="3380937"/>
-            <a:ext cx="356187" cy="276999"/>
+            <a:off x="6520027" y="3443750"/>
+            <a:ext cx="171522" cy="184666"/>
           </a:xfrm>
           <a:prstGeom prst="rect">
             <a:avLst/>
@@ -14163,7 +14164,7 @@
           <a:noFill/>
         </p:spPr>
         <p:txBody>
-          <a:bodyPr wrap="none" rtlCol="0">
+          <a:bodyPr wrap="none" lIns="0" tIns="0" rIns="0" bIns="0" rtlCol="0">
             <a:spAutoFit/>
           </a:bodyPr>
           <a:lstStyle/>
@@ -14227,8 +14228,8 @@
         </p:nvSpPr>
         <p:spPr>
           <a:xfrm>
-            <a:off x="6396309" y="2871528"/>
-            <a:ext cx="958468" cy="276999"/>
+            <a:off x="6452828" y="2923669"/>
+            <a:ext cx="810153" cy="184666"/>
           </a:xfrm>
           <a:prstGeom prst="rect">
             <a:avLst/>
@@ -14236,7 +14237,7 @@
           <a:noFill/>
         </p:spPr>
         <p:txBody>
-          <a:bodyPr wrap="none" rtlCol="0">
+          <a:bodyPr wrap="none" lIns="0" tIns="0" rIns="36000" bIns="0" rtlCol="0">
             <a:spAutoFit/>
           </a:bodyPr>
           <a:lstStyle/>
@@ -14262,8 +14263,8 @@
         </p:nvSpPr>
         <p:spPr>
           <a:xfrm>
-            <a:off x="7262524" y="2871528"/>
-            <a:ext cx="729687" cy="276999"/>
+            <a:off x="7358757" y="2923669"/>
+            <a:ext cx="581373" cy="184666"/>
           </a:xfrm>
           <a:prstGeom prst="rect">
             <a:avLst/>
@@ -14271,7 +14272,7 @@
           <a:noFill/>
         </p:spPr>
         <p:txBody>
-          <a:bodyPr wrap="none" rtlCol="0">
+          <a:bodyPr wrap="none" lIns="0" tIns="0" rIns="36000" bIns="0" rtlCol="0">
             <a:spAutoFit/>
           </a:bodyPr>
           <a:lstStyle/>
@@ -14285,6 +14286,840 @@
               <a:rPr lang="en-GB" sz="1200" dirty="0"/>
               <a:t>(3:0)</a:t>
             </a:r>
+          </a:p>
+        </p:txBody>
+      </p:sp>
+      <p:grpSp>
+        <p:nvGrpSpPr>
+          <p:cNvPr id="126" name="Group 125">
+            <a:extLst>
+              <a:ext uri="{FF2B5EF4-FFF2-40B4-BE49-F238E27FC236}">
+                <a16:creationId xmlns:a16="http://schemas.microsoft.com/office/drawing/2014/main" id="{DE393775-87C6-DB55-3EB0-9A7E9B5B1A27}"/>
+              </a:ext>
+            </a:extLst>
+          </p:cNvPr>
+          <p:cNvGrpSpPr/>
+          <p:nvPr/>
+        </p:nvGrpSpPr>
+        <p:grpSpPr>
+          <a:xfrm>
+            <a:off x="8525194" y="4067305"/>
+            <a:ext cx="912429" cy="1256747"/>
+            <a:chOff x="8522217" y="4030284"/>
+            <a:chExt cx="912429" cy="1256747"/>
+          </a:xfrm>
+        </p:grpSpPr>
+        <p:sp>
+          <p:nvSpPr>
+            <p:cNvPr id="64" name="Rectangle 63">
+              <a:extLst>
+                <a:ext uri="{FF2B5EF4-FFF2-40B4-BE49-F238E27FC236}">
+                  <a16:creationId xmlns:a16="http://schemas.microsoft.com/office/drawing/2014/main" id="{D6C71C24-592A-D3B7-DBAC-3404CC8111EE}"/>
+                </a:ext>
+              </a:extLst>
+            </p:cNvPr>
+            <p:cNvSpPr/>
+            <p:nvPr/>
+          </p:nvSpPr>
+          <p:spPr>
+            <a:xfrm>
+              <a:off x="8522217" y="4030284"/>
+              <a:ext cx="912429" cy="1256747"/>
+            </a:xfrm>
+            <a:prstGeom prst="rect">
+              <a:avLst/>
+            </a:prstGeom>
+            <a:effectLst>
+              <a:outerShdw blurRad="50800" dist="38100" dir="2700000" algn="tl" rotWithShape="0">
+                <a:prstClr val="black">
+                  <a:alpha val="40000"/>
+                </a:prstClr>
+              </a:outerShdw>
+            </a:effectLst>
+          </p:spPr>
+          <p:style>
+            <a:lnRef idx="2">
+              <a:schemeClr val="dk1"/>
+            </a:lnRef>
+            <a:fillRef idx="1">
+              <a:schemeClr val="lt1"/>
+            </a:fillRef>
+            <a:effectRef idx="0">
+              <a:schemeClr val="dk1"/>
+            </a:effectRef>
+            <a:fontRef idx="minor">
+              <a:schemeClr val="dk1"/>
+            </a:fontRef>
+          </p:style>
+          <p:txBody>
+            <a:bodyPr rtlCol="0" anchor="ctr"/>
+            <a:lstStyle/>
+            <a:p>
+              <a:pPr algn="ctr"/>
+              <a:endParaRPr lang="en-GB" dirty="0"/>
+            </a:p>
+          </p:txBody>
+        </p:sp>
+        <p:cxnSp>
+          <p:nvCxnSpPr>
+            <p:cNvPr id="71" name="Straight Connector 70">
+              <a:extLst>
+                <a:ext uri="{FF2B5EF4-FFF2-40B4-BE49-F238E27FC236}">
+                  <a16:creationId xmlns:a16="http://schemas.microsoft.com/office/drawing/2014/main" id="{616AA4B9-897A-6F07-C5D6-2525498050C0}"/>
+                </a:ext>
+              </a:extLst>
+            </p:cNvPr>
+            <p:cNvCxnSpPr>
+              <a:cxnSpLocks/>
+            </p:cNvCxnSpPr>
+            <p:nvPr/>
+          </p:nvCxnSpPr>
+          <p:spPr>
+            <a:xfrm flipH="1">
+              <a:off x="8772781" y="4281658"/>
+              <a:ext cx="40542" cy="291405"/>
+            </a:xfrm>
+            <a:prstGeom prst="line">
+              <a:avLst/>
+            </a:prstGeom>
+            <a:ln w="57150" cap="rnd">
+              <a:solidFill>
+                <a:srgbClr val="FF0000"/>
+              </a:solidFill>
+            </a:ln>
+            <a:effectLst>
+              <a:outerShdw blurRad="50800" dist="38100" dir="2700000" algn="tl" rotWithShape="0">
+                <a:prstClr val="black">
+                  <a:alpha val="40000"/>
+                </a:prstClr>
+              </a:outerShdw>
+            </a:effectLst>
+          </p:spPr>
+          <p:style>
+            <a:lnRef idx="1">
+              <a:schemeClr val="accent1"/>
+            </a:lnRef>
+            <a:fillRef idx="0">
+              <a:schemeClr val="accent1"/>
+            </a:fillRef>
+            <a:effectRef idx="0">
+              <a:schemeClr val="accent1"/>
+            </a:effectRef>
+            <a:fontRef idx="minor">
+              <a:schemeClr val="tx1"/>
+            </a:fontRef>
+          </p:style>
+        </p:cxnSp>
+        <p:cxnSp>
+          <p:nvCxnSpPr>
+            <p:cNvPr id="94" name="Straight Connector 93">
+              <a:extLst>
+                <a:ext uri="{FF2B5EF4-FFF2-40B4-BE49-F238E27FC236}">
+                  <a16:creationId xmlns:a16="http://schemas.microsoft.com/office/drawing/2014/main" id="{EF88683A-F9BB-9E8B-34E8-8ED71DE0467C}"/>
+                </a:ext>
+              </a:extLst>
+            </p:cNvPr>
+            <p:cNvCxnSpPr>
+              <a:cxnSpLocks/>
+            </p:cNvCxnSpPr>
+            <p:nvPr/>
+          </p:nvCxnSpPr>
+          <p:spPr>
+            <a:xfrm flipH="1">
+              <a:off x="8706754" y="4726415"/>
+              <a:ext cx="40542" cy="291405"/>
+            </a:xfrm>
+            <a:prstGeom prst="line">
+              <a:avLst/>
+            </a:prstGeom>
+            <a:ln w="57150" cap="rnd">
+              <a:solidFill>
+                <a:srgbClr val="FF0000"/>
+              </a:solidFill>
+            </a:ln>
+            <a:effectLst>
+              <a:outerShdw blurRad="50800" dist="38100" dir="2700000" algn="tl" rotWithShape="0">
+                <a:prstClr val="black">
+                  <a:alpha val="40000"/>
+                </a:prstClr>
+              </a:outerShdw>
+            </a:effectLst>
+          </p:spPr>
+          <p:style>
+            <a:lnRef idx="1">
+              <a:schemeClr val="accent1"/>
+            </a:lnRef>
+            <a:fillRef idx="0">
+              <a:schemeClr val="accent1"/>
+            </a:fillRef>
+            <a:effectRef idx="0">
+              <a:schemeClr val="accent1"/>
+            </a:effectRef>
+            <a:fontRef idx="minor">
+              <a:schemeClr val="tx1"/>
+            </a:fontRef>
+          </p:style>
+        </p:cxnSp>
+        <p:cxnSp>
+          <p:nvCxnSpPr>
+            <p:cNvPr id="102" name="Straight Connector 101">
+              <a:extLst>
+                <a:ext uri="{FF2B5EF4-FFF2-40B4-BE49-F238E27FC236}">
+                  <a16:creationId xmlns:a16="http://schemas.microsoft.com/office/drawing/2014/main" id="{852744CA-0A51-3019-665D-B9E4FCD57D38}"/>
+                </a:ext>
+              </a:extLst>
+            </p:cNvPr>
+            <p:cNvCxnSpPr>
+              <a:cxnSpLocks/>
+            </p:cNvCxnSpPr>
+            <p:nvPr/>
+          </p:nvCxnSpPr>
+          <p:spPr>
+            <a:xfrm>
+              <a:off x="8902201" y="4230202"/>
+              <a:ext cx="262376" cy="0"/>
+            </a:xfrm>
+            <a:prstGeom prst="line">
+              <a:avLst/>
+            </a:prstGeom>
+            <a:ln w="57150" cap="rnd">
+              <a:solidFill>
+                <a:srgbClr val="FF0000"/>
+              </a:solidFill>
+            </a:ln>
+            <a:effectLst>
+              <a:outerShdw blurRad="50800" dist="38100" dir="2700000" algn="tl" rotWithShape="0">
+                <a:prstClr val="black">
+                  <a:alpha val="40000"/>
+                </a:prstClr>
+              </a:outerShdw>
+            </a:effectLst>
+          </p:spPr>
+          <p:style>
+            <a:lnRef idx="1">
+              <a:schemeClr val="accent1"/>
+            </a:lnRef>
+            <a:fillRef idx="0">
+              <a:schemeClr val="accent1"/>
+            </a:fillRef>
+            <a:effectRef idx="0">
+              <a:schemeClr val="accent1"/>
+            </a:effectRef>
+            <a:fontRef idx="minor">
+              <a:schemeClr val="tx1"/>
+            </a:fontRef>
+          </p:style>
+        </p:cxnSp>
+        <p:cxnSp>
+          <p:nvCxnSpPr>
+            <p:cNvPr id="105" name="Straight Connector 104">
+              <a:extLst>
+                <a:ext uri="{FF2B5EF4-FFF2-40B4-BE49-F238E27FC236}">
+                  <a16:creationId xmlns:a16="http://schemas.microsoft.com/office/drawing/2014/main" id="{4BDFD318-366A-1D9B-A3A6-833FCDFAD6AA}"/>
+                </a:ext>
+              </a:extLst>
+            </p:cNvPr>
+            <p:cNvCxnSpPr>
+              <a:cxnSpLocks/>
+            </p:cNvCxnSpPr>
+            <p:nvPr/>
+          </p:nvCxnSpPr>
+          <p:spPr>
+            <a:xfrm>
+              <a:off x="8835613" y="4658658"/>
+              <a:ext cx="262376" cy="0"/>
+            </a:xfrm>
+            <a:prstGeom prst="line">
+              <a:avLst/>
+            </a:prstGeom>
+            <a:ln w="57150" cap="rnd">
+              <a:solidFill>
+                <a:srgbClr val="FF0000"/>
+              </a:solidFill>
+            </a:ln>
+            <a:effectLst>
+              <a:outerShdw blurRad="50800" dist="38100" dir="2700000" algn="tl" rotWithShape="0">
+                <a:prstClr val="black">
+                  <a:alpha val="40000"/>
+                </a:prstClr>
+              </a:outerShdw>
+            </a:effectLst>
+          </p:spPr>
+          <p:style>
+            <a:lnRef idx="1">
+              <a:schemeClr val="accent1"/>
+            </a:lnRef>
+            <a:fillRef idx="0">
+              <a:schemeClr val="accent1"/>
+            </a:fillRef>
+            <a:effectRef idx="0">
+              <a:schemeClr val="accent1"/>
+            </a:effectRef>
+            <a:fontRef idx="minor">
+              <a:schemeClr val="tx1"/>
+            </a:fontRef>
+          </p:style>
+        </p:cxnSp>
+        <p:cxnSp>
+          <p:nvCxnSpPr>
+            <p:cNvPr id="106" name="Straight Connector 105">
+              <a:extLst>
+                <a:ext uri="{FF2B5EF4-FFF2-40B4-BE49-F238E27FC236}">
+                  <a16:creationId xmlns:a16="http://schemas.microsoft.com/office/drawing/2014/main" id="{0EE26AD8-E5CB-075D-965E-08DA33008CDC}"/>
+                </a:ext>
+              </a:extLst>
+            </p:cNvPr>
+            <p:cNvCxnSpPr>
+              <a:cxnSpLocks/>
+            </p:cNvCxnSpPr>
+            <p:nvPr/>
+          </p:nvCxnSpPr>
+          <p:spPr>
+            <a:xfrm>
+              <a:off x="8782174" y="5087114"/>
+              <a:ext cx="262376" cy="0"/>
+            </a:xfrm>
+            <a:prstGeom prst="line">
+              <a:avLst/>
+            </a:prstGeom>
+            <a:ln w="57150" cap="rnd">
+              <a:solidFill>
+                <a:srgbClr val="FF0000"/>
+              </a:solidFill>
+            </a:ln>
+            <a:effectLst>
+              <a:outerShdw blurRad="50800" dist="38100" dir="2700000" algn="tl" rotWithShape="0">
+                <a:prstClr val="black">
+                  <a:alpha val="40000"/>
+                </a:prstClr>
+              </a:outerShdw>
+            </a:effectLst>
+          </p:spPr>
+          <p:style>
+            <a:lnRef idx="1">
+              <a:schemeClr val="accent1"/>
+            </a:lnRef>
+            <a:fillRef idx="0">
+              <a:schemeClr val="accent1"/>
+            </a:fillRef>
+            <a:effectRef idx="0">
+              <a:schemeClr val="accent1"/>
+            </a:effectRef>
+            <a:fontRef idx="minor">
+              <a:schemeClr val="tx1"/>
+            </a:fontRef>
+          </p:style>
+        </p:cxnSp>
+        <p:cxnSp>
+          <p:nvCxnSpPr>
+            <p:cNvPr id="107" name="Straight Connector 106">
+              <a:extLst>
+                <a:ext uri="{FF2B5EF4-FFF2-40B4-BE49-F238E27FC236}">
+                  <a16:creationId xmlns:a16="http://schemas.microsoft.com/office/drawing/2014/main" id="{4B4DB885-2975-D20B-A441-BB87C8F5AFB2}"/>
+                </a:ext>
+              </a:extLst>
+            </p:cNvPr>
+            <p:cNvCxnSpPr>
+              <a:cxnSpLocks/>
+            </p:cNvCxnSpPr>
+            <p:nvPr/>
+          </p:nvCxnSpPr>
+          <p:spPr>
+            <a:xfrm flipH="1">
+              <a:off x="9197732" y="4281658"/>
+              <a:ext cx="40542" cy="291405"/>
+            </a:xfrm>
+            <a:prstGeom prst="line">
+              <a:avLst/>
+            </a:prstGeom>
+            <a:ln w="57150" cap="rnd">
+              <a:solidFill>
+                <a:srgbClr val="FF0000"/>
+              </a:solidFill>
+            </a:ln>
+            <a:effectLst>
+              <a:outerShdw blurRad="50800" dist="38100" dir="2700000" algn="tl" rotWithShape="0">
+                <a:prstClr val="black">
+                  <a:alpha val="40000"/>
+                </a:prstClr>
+              </a:outerShdw>
+            </a:effectLst>
+          </p:spPr>
+          <p:style>
+            <a:lnRef idx="1">
+              <a:schemeClr val="accent1"/>
+            </a:lnRef>
+            <a:fillRef idx="0">
+              <a:schemeClr val="accent1"/>
+            </a:fillRef>
+            <a:effectRef idx="0">
+              <a:schemeClr val="accent1"/>
+            </a:effectRef>
+            <a:fontRef idx="minor">
+              <a:schemeClr val="tx1"/>
+            </a:fontRef>
+          </p:style>
+        </p:cxnSp>
+        <p:cxnSp>
+          <p:nvCxnSpPr>
+            <p:cNvPr id="108" name="Straight Connector 107">
+              <a:extLst>
+                <a:ext uri="{FF2B5EF4-FFF2-40B4-BE49-F238E27FC236}">
+                  <a16:creationId xmlns:a16="http://schemas.microsoft.com/office/drawing/2014/main" id="{4513B271-1C9D-9D84-C0CD-48C754EA11CE}"/>
+                </a:ext>
+              </a:extLst>
+            </p:cNvPr>
+            <p:cNvCxnSpPr>
+              <a:cxnSpLocks/>
+            </p:cNvCxnSpPr>
+            <p:nvPr/>
+          </p:nvCxnSpPr>
+          <p:spPr>
+            <a:xfrm flipH="1">
+              <a:off x="9131705" y="4726415"/>
+              <a:ext cx="40542" cy="291405"/>
+            </a:xfrm>
+            <a:prstGeom prst="line">
+              <a:avLst/>
+            </a:prstGeom>
+            <a:ln w="57150" cap="rnd">
+              <a:solidFill>
+                <a:srgbClr val="FF0000"/>
+              </a:solidFill>
+            </a:ln>
+            <a:effectLst>
+              <a:outerShdw blurRad="50800" dist="38100" dir="2700000" algn="tl" rotWithShape="0">
+                <a:prstClr val="black">
+                  <a:alpha val="40000"/>
+                </a:prstClr>
+              </a:outerShdw>
+            </a:effectLst>
+          </p:spPr>
+          <p:style>
+            <a:lnRef idx="1">
+              <a:schemeClr val="accent1"/>
+            </a:lnRef>
+            <a:fillRef idx="0">
+              <a:schemeClr val="accent1"/>
+            </a:fillRef>
+            <a:effectRef idx="0">
+              <a:schemeClr val="accent1"/>
+            </a:effectRef>
+            <a:fontRef idx="minor">
+              <a:schemeClr val="tx1"/>
+            </a:fontRef>
+          </p:style>
+        </p:cxnSp>
+      </p:grpSp>
+      <p:sp>
+        <p:nvSpPr>
+          <p:cNvPr id="110" name="Rectangle 109">
+            <a:extLst>
+              <a:ext uri="{FF2B5EF4-FFF2-40B4-BE49-F238E27FC236}">
+                <a16:creationId xmlns:a16="http://schemas.microsoft.com/office/drawing/2014/main" id="{0EAE3620-36E7-3BCC-A575-A4158C2F27D4}"/>
+              </a:ext>
+            </a:extLst>
+          </p:cNvPr>
+          <p:cNvSpPr/>
+          <p:nvPr/>
+        </p:nvSpPr>
+        <p:spPr>
+          <a:xfrm>
+            <a:off x="6843451" y="4168729"/>
+            <a:ext cx="1206357" cy="1062680"/>
+          </a:xfrm>
+          <a:prstGeom prst="rect">
+            <a:avLst/>
+          </a:prstGeom>
+          <a:effectLst>
+            <a:outerShdw blurRad="50800" dist="38100" dir="2700000" algn="tl" rotWithShape="0">
+              <a:prstClr val="black">
+                <a:alpha val="40000"/>
+              </a:prstClr>
+            </a:outerShdw>
+          </a:effectLst>
+        </p:spPr>
+        <p:style>
+          <a:lnRef idx="2">
+            <a:schemeClr val="dk1"/>
+          </a:lnRef>
+          <a:fillRef idx="1">
+            <a:schemeClr val="lt1"/>
+          </a:fillRef>
+          <a:effectRef idx="0">
+            <a:schemeClr val="dk1"/>
+          </a:effectRef>
+          <a:fontRef idx="minor">
+            <a:schemeClr val="dk1"/>
+          </a:fontRef>
+        </p:style>
+        <p:txBody>
+          <a:bodyPr rtlCol="0" anchor="b" anchorCtr="0"/>
+          <a:lstStyle/>
+          <a:p>
+            <a:pPr algn="ctr"/>
+            <a:r>
+              <a:rPr lang="en-GB" sz="1200" dirty="0"/>
+              <a:t>7 Segment  Display Decoder</a:t>
+            </a:r>
+          </a:p>
+        </p:txBody>
+      </p:sp>
+      <p:cxnSp>
+        <p:nvCxnSpPr>
+          <p:cNvPr id="123" name="Straight Connector 122">
+            <a:extLst>
+              <a:ext uri="{FF2B5EF4-FFF2-40B4-BE49-F238E27FC236}">
+                <a16:creationId xmlns:a16="http://schemas.microsoft.com/office/drawing/2014/main" id="{72A4CC78-A6E7-46C8-100A-59F8292B68A9}"/>
+              </a:ext>
+            </a:extLst>
+          </p:cNvPr>
+          <p:cNvCxnSpPr>
+            <a:cxnSpLocks/>
+            <a:stCxn id="110" idx="3"/>
+            <a:endCxn id="64" idx="1"/>
+          </p:cNvCxnSpPr>
+          <p:nvPr/>
+        </p:nvCxnSpPr>
+        <p:spPr>
+          <a:xfrm flipV="1">
+            <a:off x="8049808" y="4695679"/>
+            <a:ext cx="475386" cy="4390"/>
+          </a:xfrm>
+          <a:prstGeom prst="line">
+            <a:avLst/>
+          </a:prstGeom>
+          <a:effectLst>
+            <a:outerShdw blurRad="50800" dist="38100" dir="2700000" algn="tl" rotWithShape="0">
+              <a:prstClr val="black">
+                <a:alpha val="40000"/>
+              </a:prstClr>
+            </a:outerShdw>
+          </a:effectLst>
+        </p:spPr>
+        <p:style>
+          <a:lnRef idx="3">
+            <a:schemeClr val="dk1"/>
+          </a:lnRef>
+          <a:fillRef idx="0">
+            <a:schemeClr val="dk1"/>
+          </a:fillRef>
+          <a:effectRef idx="2">
+            <a:schemeClr val="dk1"/>
+          </a:effectRef>
+          <a:fontRef idx="minor">
+            <a:schemeClr val="tx1"/>
+          </a:fontRef>
+        </p:style>
+      </p:cxnSp>
+      <p:cxnSp>
+        <p:nvCxnSpPr>
+          <p:cNvPr id="134" name="Connector: Elbow 133">
+            <a:extLst>
+              <a:ext uri="{FF2B5EF4-FFF2-40B4-BE49-F238E27FC236}">
+                <a16:creationId xmlns:a16="http://schemas.microsoft.com/office/drawing/2014/main" id="{8F2BD19F-E975-6806-A862-88365E3FCC2C}"/>
+              </a:ext>
+            </a:extLst>
+          </p:cNvPr>
+          <p:cNvCxnSpPr>
+            <a:cxnSpLocks/>
+            <a:stCxn id="110" idx="0"/>
+          </p:cNvCxnSpPr>
+          <p:nvPr/>
+        </p:nvCxnSpPr>
+        <p:spPr>
+          <a:xfrm rot="5400000" flipH="1" flipV="1">
+            <a:off x="7630066" y="3680955"/>
+            <a:ext cx="304338" cy="671210"/>
+          </a:xfrm>
+          <a:prstGeom prst="bentConnector2">
+            <a:avLst/>
+          </a:prstGeom>
+          <a:effectLst>
+            <a:outerShdw blurRad="50800" dist="38100" dir="2700000" algn="tl" rotWithShape="0">
+              <a:prstClr val="black">
+                <a:alpha val="40000"/>
+              </a:prstClr>
+            </a:outerShdw>
+          </a:effectLst>
+        </p:spPr>
+        <p:style>
+          <a:lnRef idx="3">
+            <a:schemeClr val="dk1"/>
+          </a:lnRef>
+          <a:fillRef idx="0">
+            <a:schemeClr val="dk1"/>
+          </a:fillRef>
+          <a:effectRef idx="2">
+            <a:schemeClr val="dk1"/>
+          </a:effectRef>
+          <a:fontRef idx="minor">
+            <a:schemeClr val="tx1"/>
+          </a:fontRef>
+        </p:style>
+      </p:cxnSp>
+      <p:cxnSp>
+        <p:nvCxnSpPr>
+          <p:cNvPr id="142" name="Straight Connector 141">
+            <a:extLst>
+              <a:ext uri="{FF2B5EF4-FFF2-40B4-BE49-F238E27FC236}">
+                <a16:creationId xmlns:a16="http://schemas.microsoft.com/office/drawing/2014/main" id="{06B4646E-74FB-DB5F-C82B-D0115BB8A0A8}"/>
+              </a:ext>
+            </a:extLst>
+          </p:cNvPr>
+          <p:cNvCxnSpPr>
+            <a:cxnSpLocks/>
+          </p:cNvCxnSpPr>
+          <p:nvPr/>
+        </p:nvCxnSpPr>
+        <p:spPr>
+          <a:xfrm flipV="1">
+            <a:off x="8113729" y="3023638"/>
+            <a:ext cx="0" cy="840752"/>
+          </a:xfrm>
+          <a:prstGeom prst="line">
+            <a:avLst/>
+          </a:prstGeom>
+          <a:effectLst>
+            <a:outerShdw blurRad="50800" dist="38100" dir="2700000" algn="tl" rotWithShape="0">
+              <a:prstClr val="black">
+                <a:alpha val="40000"/>
+              </a:prstClr>
+            </a:outerShdw>
+          </a:effectLst>
+        </p:spPr>
+        <p:style>
+          <a:lnRef idx="3">
+            <a:schemeClr val="dk1"/>
+          </a:lnRef>
+          <a:fillRef idx="0">
+            <a:schemeClr val="dk1"/>
+          </a:fillRef>
+          <a:effectRef idx="2">
+            <a:schemeClr val="dk1"/>
+          </a:effectRef>
+          <a:fontRef idx="minor">
+            <a:schemeClr val="tx1"/>
+          </a:fontRef>
+        </p:style>
+      </p:cxnSp>
+      <p:sp>
+        <p:nvSpPr>
+          <p:cNvPr id="145" name="TextBox 144">
+            <a:extLst>
+              <a:ext uri="{FF2B5EF4-FFF2-40B4-BE49-F238E27FC236}">
+                <a16:creationId xmlns:a16="http://schemas.microsoft.com/office/drawing/2014/main" id="{1A01A30E-5883-FD03-F610-29461653D0DC}"/>
+              </a:ext>
+            </a:extLst>
+          </p:cNvPr>
+          <p:cNvSpPr txBox="1"/>
+          <p:nvPr/>
+        </p:nvSpPr>
+        <p:spPr>
+          <a:xfrm>
+            <a:off x="6854730" y="4603345"/>
+            <a:ext cx="207873" cy="184666"/>
+          </a:xfrm>
+          <a:prstGeom prst="rect">
+            <a:avLst/>
+          </a:prstGeom>
+          <a:noFill/>
+        </p:spPr>
+        <p:txBody>
+          <a:bodyPr wrap="none" lIns="36000" tIns="0" rIns="0" bIns="0" rtlCol="0">
+            <a:spAutoFit/>
+          </a:bodyPr>
+          <a:lstStyle/>
+          <a:p>
+            <a:r>
+              <a:rPr lang="en-GB" sz="1200" dirty="0" err="1"/>
+              <a:t>clk</a:t>
+            </a:r>
+            <a:endParaRPr lang="en-GB" sz="1200" dirty="0"/>
+          </a:p>
+        </p:txBody>
+      </p:sp>
+      <p:sp>
+        <p:nvSpPr>
+          <p:cNvPr id="146" name="TextBox 145">
+            <a:extLst>
+              <a:ext uri="{FF2B5EF4-FFF2-40B4-BE49-F238E27FC236}">
+                <a16:creationId xmlns:a16="http://schemas.microsoft.com/office/drawing/2014/main" id="{EDE269FE-71B7-F936-6530-17AFFF004E71}"/>
+              </a:ext>
+            </a:extLst>
+          </p:cNvPr>
+          <p:cNvSpPr txBox="1"/>
+          <p:nvPr/>
+        </p:nvSpPr>
+        <p:spPr>
+          <a:xfrm>
+            <a:off x="7172809" y="4180179"/>
+            <a:ext cx="545021" cy="184666"/>
+          </a:xfrm>
+          <a:prstGeom prst="rect">
+            <a:avLst/>
+          </a:prstGeom>
+          <a:noFill/>
+        </p:spPr>
+        <p:txBody>
+          <a:bodyPr wrap="none" lIns="0" tIns="0" rIns="0" bIns="0" rtlCol="0">
+            <a:spAutoFit/>
+          </a:bodyPr>
+          <a:lstStyle/>
+          <a:p>
+            <a:pPr algn="ctr"/>
+            <a:r>
+              <a:rPr lang="en-GB" sz="1200" dirty="0" err="1"/>
+              <a:t>leds</a:t>
+            </a:r>
+            <a:r>
+              <a:rPr lang="en-GB" sz="1200" dirty="0"/>
+              <a:t>(3:0)</a:t>
+            </a:r>
+          </a:p>
+        </p:txBody>
+      </p:sp>
+      <p:sp>
+        <p:nvSpPr>
+          <p:cNvPr id="148" name="TextBox 147">
+            <a:extLst>
+              <a:ext uri="{FF2B5EF4-FFF2-40B4-BE49-F238E27FC236}">
+                <a16:creationId xmlns:a16="http://schemas.microsoft.com/office/drawing/2014/main" id="{16329D3B-72AA-F2D1-7E6E-9C1C9C99C231}"/>
+              </a:ext>
+            </a:extLst>
+          </p:cNvPr>
+          <p:cNvSpPr txBox="1"/>
+          <p:nvPr/>
+        </p:nvSpPr>
+        <p:spPr>
+          <a:xfrm>
+            <a:off x="7318757" y="4610084"/>
+            <a:ext cx="743405" cy="184666"/>
+          </a:xfrm>
+          <a:prstGeom prst="rect">
+            <a:avLst/>
+          </a:prstGeom>
+          <a:noFill/>
+        </p:spPr>
+        <p:txBody>
+          <a:bodyPr wrap="none" lIns="0" tIns="0" rIns="36000" bIns="0" rtlCol="0">
+            <a:spAutoFit/>
+          </a:bodyPr>
+          <a:lstStyle/>
+          <a:p>
+            <a:pPr algn="r"/>
+            <a:r>
+              <a:rPr lang="en-GB" sz="1200" dirty="0" err="1"/>
+              <a:t>sevseg</a:t>
+            </a:r>
+            <a:r>
+              <a:rPr lang="en-GB" sz="1200" dirty="0"/>
+              <a:t>(6:0)</a:t>
+            </a:r>
+          </a:p>
+        </p:txBody>
+      </p:sp>
+      <p:sp>
+        <p:nvSpPr>
+          <p:cNvPr id="169" name="Oval 168">
+            <a:extLst>
+              <a:ext uri="{FF2B5EF4-FFF2-40B4-BE49-F238E27FC236}">
+                <a16:creationId xmlns:a16="http://schemas.microsoft.com/office/drawing/2014/main" id="{E1FC3EE2-3CBD-901C-D750-C6E6B6A66000}"/>
+              </a:ext>
+            </a:extLst>
+          </p:cNvPr>
+          <p:cNvSpPr/>
+          <p:nvPr/>
+        </p:nvSpPr>
+        <p:spPr>
+          <a:xfrm>
+            <a:off x="8083717" y="2993598"/>
+            <a:ext cx="62107" cy="62107"/>
+          </a:xfrm>
+          <a:prstGeom prst="ellipse">
+            <a:avLst/>
+          </a:prstGeom>
+          <a:solidFill>
+            <a:schemeClr val="tx1"/>
+          </a:solidFill>
+          <a:ln>
+            <a:noFill/>
+          </a:ln>
+        </p:spPr>
+        <p:style>
+          <a:lnRef idx="2">
+            <a:schemeClr val="accent1">
+              <a:shade val="50000"/>
+            </a:schemeClr>
+          </a:lnRef>
+          <a:fillRef idx="1">
+            <a:schemeClr val="accent1"/>
+          </a:fillRef>
+          <a:effectRef idx="0">
+            <a:schemeClr val="accent1"/>
+          </a:effectRef>
+          <a:fontRef idx="minor">
+            <a:schemeClr val="lt1"/>
+          </a:fontRef>
+        </p:style>
+        <p:txBody>
+          <a:bodyPr rtlCol="0" anchor="ctr"/>
+          <a:lstStyle/>
+          <a:p>
+            <a:pPr algn="ctr"/>
+            <a:endParaRPr lang="en-GB"/>
+          </a:p>
+        </p:txBody>
+      </p:sp>
+      <p:sp>
+        <p:nvSpPr>
+          <p:cNvPr id="170" name="Oval 169">
+            <a:extLst>
+              <a:ext uri="{FF2B5EF4-FFF2-40B4-BE49-F238E27FC236}">
+                <a16:creationId xmlns:a16="http://schemas.microsoft.com/office/drawing/2014/main" id="{8C1EB6EE-8C0A-C2EC-B39A-C558DC486623}"/>
+              </a:ext>
+            </a:extLst>
+          </p:cNvPr>
+          <p:cNvSpPr/>
+          <p:nvPr/>
+        </p:nvSpPr>
+        <p:spPr>
+          <a:xfrm flipV="1">
+            <a:off x="6581190" y="4672606"/>
+            <a:ext cx="45722" cy="45720"/>
+          </a:xfrm>
+          <a:prstGeom prst="ellipse">
+            <a:avLst/>
+          </a:prstGeom>
+          <a:solidFill>
+            <a:schemeClr val="tx1"/>
+          </a:solidFill>
+          <a:ln>
+            <a:noFill/>
+          </a:ln>
+        </p:spPr>
+        <p:style>
+          <a:lnRef idx="2">
+            <a:schemeClr val="accent1">
+              <a:shade val="50000"/>
+            </a:schemeClr>
+          </a:lnRef>
+          <a:fillRef idx="1">
+            <a:schemeClr val="accent1"/>
+          </a:fillRef>
+          <a:effectRef idx="0">
+            <a:schemeClr val="accent1"/>
+          </a:effectRef>
+          <a:fontRef idx="minor">
+            <a:schemeClr val="lt1"/>
+          </a:fontRef>
+        </p:style>
+        <p:txBody>
+          <a:bodyPr rtlCol="0" anchor="ctr"/>
+          <a:lstStyle/>
+          <a:p>
+            <a:pPr algn="ctr"/>
+            <a:endParaRPr lang="en-GB"/>
           </a:p>
         </p:txBody>
       </p:sp>

</xml_diff>

<commit_message>
Added a diagram of the ALU structure to RISC CPU docs
</commit_message>
<xml_diff>
--- a/docs/images/Diagrams.pptx
+++ b/docs/images/Diagrams.pptx
@@ -11,6 +11,7 @@
     <p:sldId id="260" r:id="rId5"/>
     <p:sldId id="261" r:id="rId6"/>
     <p:sldId id="259" r:id="rId7"/>
+    <p:sldId id="262" r:id="rId8"/>
   </p:sldIdLst>
   <p:sldSz cx="12192000" cy="6858000"/>
   <p:notesSz cx="6858000" cy="9144000"/>
@@ -266,7 +267,7 @@
           <a:p>
             <a:fld id="{30A9C857-609A-43FA-83CE-07000BF55DB0}" type="datetimeFigureOut">
               <a:rPr lang="en-GB" smtClean="0"/>
-              <a:t>19/11/2022</a:t>
+              <a:t>24/04/2023</a:t>
             </a:fld>
             <a:endParaRPr lang="en-GB"/>
           </a:p>
@@ -466,7 +467,7 @@
           <a:p>
             <a:fld id="{30A9C857-609A-43FA-83CE-07000BF55DB0}" type="datetimeFigureOut">
               <a:rPr lang="en-GB" smtClean="0"/>
-              <a:t>19/11/2022</a:t>
+              <a:t>24/04/2023</a:t>
             </a:fld>
             <a:endParaRPr lang="en-GB"/>
           </a:p>
@@ -676,7 +677,7 @@
           <a:p>
             <a:fld id="{30A9C857-609A-43FA-83CE-07000BF55DB0}" type="datetimeFigureOut">
               <a:rPr lang="en-GB" smtClean="0"/>
-              <a:t>19/11/2022</a:t>
+              <a:t>24/04/2023</a:t>
             </a:fld>
             <a:endParaRPr lang="en-GB"/>
           </a:p>
@@ -876,7 +877,7 @@
           <a:p>
             <a:fld id="{30A9C857-609A-43FA-83CE-07000BF55DB0}" type="datetimeFigureOut">
               <a:rPr lang="en-GB" smtClean="0"/>
-              <a:t>19/11/2022</a:t>
+              <a:t>24/04/2023</a:t>
             </a:fld>
             <a:endParaRPr lang="en-GB"/>
           </a:p>
@@ -1152,7 +1153,7 @@
           <a:p>
             <a:fld id="{30A9C857-609A-43FA-83CE-07000BF55DB0}" type="datetimeFigureOut">
               <a:rPr lang="en-GB" smtClean="0"/>
-              <a:t>19/11/2022</a:t>
+              <a:t>24/04/2023</a:t>
             </a:fld>
             <a:endParaRPr lang="en-GB"/>
           </a:p>
@@ -1420,7 +1421,7 @@
           <a:p>
             <a:fld id="{30A9C857-609A-43FA-83CE-07000BF55DB0}" type="datetimeFigureOut">
               <a:rPr lang="en-GB" smtClean="0"/>
-              <a:t>19/11/2022</a:t>
+              <a:t>24/04/2023</a:t>
             </a:fld>
             <a:endParaRPr lang="en-GB"/>
           </a:p>
@@ -1835,7 +1836,7 @@
           <a:p>
             <a:fld id="{30A9C857-609A-43FA-83CE-07000BF55DB0}" type="datetimeFigureOut">
               <a:rPr lang="en-GB" smtClean="0"/>
-              <a:t>19/11/2022</a:t>
+              <a:t>24/04/2023</a:t>
             </a:fld>
             <a:endParaRPr lang="en-GB"/>
           </a:p>
@@ -1977,7 +1978,7 @@
           <a:p>
             <a:fld id="{30A9C857-609A-43FA-83CE-07000BF55DB0}" type="datetimeFigureOut">
               <a:rPr lang="en-GB" smtClean="0"/>
-              <a:t>19/11/2022</a:t>
+              <a:t>24/04/2023</a:t>
             </a:fld>
             <a:endParaRPr lang="en-GB"/>
           </a:p>
@@ -2090,7 +2091,7 @@
           <a:p>
             <a:fld id="{30A9C857-609A-43FA-83CE-07000BF55DB0}" type="datetimeFigureOut">
               <a:rPr lang="en-GB" smtClean="0"/>
-              <a:t>19/11/2022</a:t>
+              <a:t>24/04/2023</a:t>
             </a:fld>
             <a:endParaRPr lang="en-GB"/>
           </a:p>
@@ -2403,7 +2404,7 @@
           <a:p>
             <a:fld id="{30A9C857-609A-43FA-83CE-07000BF55DB0}" type="datetimeFigureOut">
               <a:rPr lang="en-GB" smtClean="0"/>
-              <a:t>19/11/2022</a:t>
+              <a:t>24/04/2023</a:t>
             </a:fld>
             <a:endParaRPr lang="en-GB"/>
           </a:p>
@@ -2692,7 +2693,7 @@
           <a:p>
             <a:fld id="{30A9C857-609A-43FA-83CE-07000BF55DB0}" type="datetimeFigureOut">
               <a:rPr lang="en-GB" smtClean="0"/>
-              <a:t>19/11/2022</a:t>
+              <a:t>24/04/2023</a:t>
             </a:fld>
             <a:endParaRPr lang="en-GB"/>
           </a:p>
@@ -2935,7 +2936,7 @@
           <a:p>
             <a:fld id="{30A9C857-609A-43FA-83CE-07000BF55DB0}" type="datetimeFigureOut">
               <a:rPr lang="en-GB" smtClean="0"/>
-              <a:t>19/11/2022</a:t>
+              <a:t>24/04/2023</a:t>
             </a:fld>
             <a:endParaRPr lang="en-GB"/>
           </a:p>
@@ -17551,6 +17552,1550 @@
 </p:sld>
 </file>
 
+<file path=ppt/slides/slide7.xml><?xml version="1.0" encoding="utf-8"?>
+<p:sld xmlns:a="http://schemas.openxmlformats.org/drawingml/2006/main" xmlns:r="http://schemas.openxmlformats.org/officeDocument/2006/relationships" xmlns:p="http://schemas.openxmlformats.org/presentationml/2006/main">
+  <p:cSld>
+    <p:spTree>
+      <p:nvGrpSpPr>
+        <p:cNvPr id="1" name=""/>
+        <p:cNvGrpSpPr/>
+        <p:nvPr/>
+      </p:nvGrpSpPr>
+      <p:grpSpPr>
+        <a:xfrm>
+          <a:off x="0" y="0"/>
+          <a:ext cx="0" cy="0"/>
+          <a:chOff x="0" y="0"/>
+          <a:chExt cx="0" cy="0"/>
+        </a:xfrm>
+      </p:grpSpPr>
+      <p:sp>
+        <p:nvSpPr>
+          <p:cNvPr id="83" name="Rectangle 82">
+            <a:extLst>
+              <a:ext uri="{FF2B5EF4-FFF2-40B4-BE49-F238E27FC236}">
+                <a16:creationId xmlns:a16="http://schemas.microsoft.com/office/drawing/2014/main" id="{97365F58-C382-E857-FAB8-92734C74A180}"/>
+              </a:ext>
+            </a:extLst>
+          </p:cNvPr>
+          <p:cNvSpPr/>
+          <p:nvPr/>
+        </p:nvSpPr>
+        <p:spPr>
+          <a:xfrm>
+            <a:off x="1912402" y="513792"/>
+            <a:ext cx="6129093" cy="5830418"/>
+          </a:xfrm>
+          <a:prstGeom prst="rect">
+            <a:avLst/>
+          </a:prstGeom>
+          <a:solidFill>
+            <a:schemeClr val="bg1"/>
+          </a:solidFill>
+          <a:ln>
+            <a:noFill/>
+          </a:ln>
+        </p:spPr>
+        <p:style>
+          <a:lnRef idx="2">
+            <a:schemeClr val="accent1">
+              <a:shade val="50000"/>
+            </a:schemeClr>
+          </a:lnRef>
+          <a:fillRef idx="1">
+            <a:schemeClr val="accent1"/>
+          </a:fillRef>
+          <a:effectRef idx="0">
+            <a:schemeClr val="accent1"/>
+          </a:effectRef>
+          <a:fontRef idx="minor">
+            <a:schemeClr val="lt1"/>
+          </a:fontRef>
+        </p:style>
+        <p:txBody>
+          <a:bodyPr rtlCol="0" anchor="ctr"/>
+          <a:lstStyle/>
+          <a:p>
+            <a:pPr algn="ctr"/>
+            <a:endParaRPr lang="en-GB" dirty="0"/>
+          </a:p>
+        </p:txBody>
+      </p:sp>
+      <p:sp>
+        <p:nvSpPr>
+          <p:cNvPr id="40" name="Rectangle 39">
+            <a:extLst>
+              <a:ext uri="{FF2B5EF4-FFF2-40B4-BE49-F238E27FC236}">
+                <a16:creationId xmlns:a16="http://schemas.microsoft.com/office/drawing/2014/main" id="{7D37B6F7-0F28-BA1D-BA29-659C174AC3DF}"/>
+              </a:ext>
+            </a:extLst>
+          </p:cNvPr>
+          <p:cNvSpPr/>
+          <p:nvPr/>
+        </p:nvSpPr>
+        <p:spPr>
+          <a:xfrm>
+            <a:off x="3445845" y="2377440"/>
+            <a:ext cx="2550694" cy="3696101"/>
+          </a:xfrm>
+          <a:prstGeom prst="rect">
+            <a:avLst/>
+          </a:prstGeom>
+        </p:spPr>
+        <p:style>
+          <a:lnRef idx="2">
+            <a:schemeClr val="accent3">
+              <a:shade val="50000"/>
+            </a:schemeClr>
+          </a:lnRef>
+          <a:fillRef idx="1">
+            <a:schemeClr val="accent3"/>
+          </a:fillRef>
+          <a:effectRef idx="0">
+            <a:schemeClr val="accent3"/>
+          </a:effectRef>
+          <a:fontRef idx="minor">
+            <a:schemeClr val="lt1"/>
+          </a:fontRef>
+        </p:style>
+        <p:txBody>
+          <a:bodyPr rtlCol="0" anchor="ctr"/>
+          <a:lstStyle/>
+          <a:p>
+            <a:pPr algn="ctr"/>
+            <a:endParaRPr lang="en-GB"/>
+          </a:p>
+        </p:txBody>
+      </p:sp>
+      <p:sp>
+        <p:nvSpPr>
+          <p:cNvPr id="6" name="Rectangle 5">
+            <a:extLst>
+              <a:ext uri="{FF2B5EF4-FFF2-40B4-BE49-F238E27FC236}">
+                <a16:creationId xmlns:a16="http://schemas.microsoft.com/office/drawing/2014/main" id="{DE14A8FE-150F-DEBD-EADE-0C78C85B6F81}"/>
+              </a:ext>
+            </a:extLst>
+          </p:cNvPr>
+          <p:cNvSpPr/>
+          <p:nvPr/>
+        </p:nvSpPr>
+        <p:spPr>
+          <a:xfrm>
+            <a:off x="4196615" y="2517006"/>
+            <a:ext cx="1039529" cy="428325"/>
+          </a:xfrm>
+          <a:prstGeom prst="rect">
+            <a:avLst/>
+          </a:prstGeom>
+        </p:spPr>
+        <p:style>
+          <a:lnRef idx="2">
+            <a:schemeClr val="accent1">
+              <a:shade val="50000"/>
+            </a:schemeClr>
+          </a:lnRef>
+          <a:fillRef idx="1">
+            <a:schemeClr val="accent1"/>
+          </a:fillRef>
+          <a:effectRef idx="0">
+            <a:schemeClr val="accent1"/>
+          </a:effectRef>
+          <a:fontRef idx="minor">
+            <a:schemeClr val="lt1"/>
+          </a:fontRef>
+        </p:style>
+        <p:txBody>
+          <a:bodyPr rtlCol="0" anchor="ctr"/>
+          <a:lstStyle/>
+          <a:p>
+            <a:pPr algn="ctr"/>
+            <a:r>
+              <a:rPr lang="en-GB" dirty="0"/>
+              <a:t>r0</a:t>
+            </a:r>
+          </a:p>
+        </p:txBody>
+      </p:sp>
+      <p:sp>
+        <p:nvSpPr>
+          <p:cNvPr id="7" name="Rectangle 6">
+            <a:extLst>
+              <a:ext uri="{FF2B5EF4-FFF2-40B4-BE49-F238E27FC236}">
+                <a16:creationId xmlns:a16="http://schemas.microsoft.com/office/drawing/2014/main" id="{25AA6D25-B9F8-4306-C186-F7CA3BB35A1E}"/>
+              </a:ext>
+            </a:extLst>
+          </p:cNvPr>
+          <p:cNvSpPr/>
+          <p:nvPr/>
+        </p:nvSpPr>
+        <p:spPr>
+          <a:xfrm>
+            <a:off x="4196614" y="2945331"/>
+            <a:ext cx="1039529" cy="428325"/>
+          </a:xfrm>
+          <a:prstGeom prst="rect">
+            <a:avLst/>
+          </a:prstGeom>
+        </p:spPr>
+        <p:style>
+          <a:lnRef idx="2">
+            <a:schemeClr val="accent1">
+              <a:shade val="50000"/>
+            </a:schemeClr>
+          </a:lnRef>
+          <a:fillRef idx="1">
+            <a:schemeClr val="accent1"/>
+          </a:fillRef>
+          <a:effectRef idx="0">
+            <a:schemeClr val="accent1"/>
+          </a:effectRef>
+          <a:fontRef idx="minor">
+            <a:schemeClr val="lt1"/>
+          </a:fontRef>
+        </p:style>
+        <p:txBody>
+          <a:bodyPr rtlCol="0" anchor="ctr"/>
+          <a:lstStyle/>
+          <a:p>
+            <a:pPr algn="ctr"/>
+            <a:r>
+              <a:rPr lang="en-GB" dirty="0"/>
+              <a:t>r1</a:t>
+            </a:r>
+          </a:p>
+        </p:txBody>
+      </p:sp>
+      <p:sp>
+        <p:nvSpPr>
+          <p:cNvPr id="8" name="Rectangle 7">
+            <a:extLst>
+              <a:ext uri="{FF2B5EF4-FFF2-40B4-BE49-F238E27FC236}">
+                <a16:creationId xmlns:a16="http://schemas.microsoft.com/office/drawing/2014/main" id="{BFC6D284-1828-1205-AC7A-79FDB004182D}"/>
+              </a:ext>
+            </a:extLst>
+          </p:cNvPr>
+          <p:cNvSpPr/>
+          <p:nvPr/>
+        </p:nvSpPr>
+        <p:spPr>
+          <a:xfrm>
+            <a:off x="4196614" y="3373656"/>
+            <a:ext cx="1039529" cy="428325"/>
+          </a:xfrm>
+          <a:prstGeom prst="rect">
+            <a:avLst/>
+          </a:prstGeom>
+        </p:spPr>
+        <p:style>
+          <a:lnRef idx="2">
+            <a:schemeClr val="accent1">
+              <a:shade val="50000"/>
+            </a:schemeClr>
+          </a:lnRef>
+          <a:fillRef idx="1">
+            <a:schemeClr val="accent1"/>
+          </a:fillRef>
+          <a:effectRef idx="0">
+            <a:schemeClr val="accent1"/>
+          </a:effectRef>
+          <a:fontRef idx="minor">
+            <a:schemeClr val="lt1"/>
+          </a:fontRef>
+        </p:style>
+        <p:txBody>
+          <a:bodyPr rtlCol="0" anchor="ctr"/>
+          <a:lstStyle/>
+          <a:p>
+            <a:pPr algn="ctr"/>
+            <a:r>
+              <a:rPr lang="en-GB" dirty="0"/>
+              <a:t>r2</a:t>
+            </a:r>
+          </a:p>
+        </p:txBody>
+      </p:sp>
+      <p:sp>
+        <p:nvSpPr>
+          <p:cNvPr id="9" name="Rectangle 8">
+            <a:extLst>
+              <a:ext uri="{FF2B5EF4-FFF2-40B4-BE49-F238E27FC236}">
+                <a16:creationId xmlns:a16="http://schemas.microsoft.com/office/drawing/2014/main" id="{60AA649C-A8A2-66A2-E393-7CCCAD6C9C05}"/>
+              </a:ext>
+            </a:extLst>
+          </p:cNvPr>
+          <p:cNvSpPr/>
+          <p:nvPr/>
+        </p:nvSpPr>
+        <p:spPr>
+          <a:xfrm>
+            <a:off x="4196613" y="3801981"/>
+            <a:ext cx="1039529" cy="428325"/>
+          </a:xfrm>
+          <a:prstGeom prst="rect">
+            <a:avLst/>
+          </a:prstGeom>
+        </p:spPr>
+        <p:style>
+          <a:lnRef idx="2">
+            <a:schemeClr val="accent1">
+              <a:shade val="50000"/>
+            </a:schemeClr>
+          </a:lnRef>
+          <a:fillRef idx="1">
+            <a:schemeClr val="accent1"/>
+          </a:fillRef>
+          <a:effectRef idx="0">
+            <a:schemeClr val="accent1"/>
+          </a:effectRef>
+          <a:fontRef idx="minor">
+            <a:schemeClr val="lt1"/>
+          </a:fontRef>
+        </p:style>
+        <p:txBody>
+          <a:bodyPr rtlCol="0" anchor="ctr"/>
+          <a:lstStyle/>
+          <a:p>
+            <a:pPr algn="ctr"/>
+            <a:r>
+              <a:rPr lang="en-GB" dirty="0"/>
+              <a:t>r3</a:t>
+            </a:r>
+          </a:p>
+        </p:txBody>
+      </p:sp>
+      <p:sp>
+        <p:nvSpPr>
+          <p:cNvPr id="10" name="Rectangle 9">
+            <a:extLst>
+              <a:ext uri="{FF2B5EF4-FFF2-40B4-BE49-F238E27FC236}">
+                <a16:creationId xmlns:a16="http://schemas.microsoft.com/office/drawing/2014/main" id="{4A882935-CD67-C55C-B11A-ECAA774C85BE}"/>
+              </a:ext>
+            </a:extLst>
+          </p:cNvPr>
+          <p:cNvSpPr/>
+          <p:nvPr/>
+        </p:nvSpPr>
+        <p:spPr>
+          <a:xfrm>
+            <a:off x="4196613" y="4230306"/>
+            <a:ext cx="1039529" cy="428325"/>
+          </a:xfrm>
+          <a:prstGeom prst="rect">
+            <a:avLst/>
+          </a:prstGeom>
+        </p:spPr>
+        <p:style>
+          <a:lnRef idx="2">
+            <a:schemeClr val="accent1">
+              <a:shade val="50000"/>
+            </a:schemeClr>
+          </a:lnRef>
+          <a:fillRef idx="1">
+            <a:schemeClr val="accent1"/>
+          </a:fillRef>
+          <a:effectRef idx="0">
+            <a:schemeClr val="accent1"/>
+          </a:effectRef>
+          <a:fontRef idx="minor">
+            <a:schemeClr val="lt1"/>
+          </a:fontRef>
+        </p:style>
+        <p:txBody>
+          <a:bodyPr rtlCol="0" anchor="ctr"/>
+          <a:lstStyle/>
+          <a:p>
+            <a:pPr algn="ctr"/>
+            <a:r>
+              <a:rPr lang="en-GB" dirty="0"/>
+              <a:t>r4</a:t>
+            </a:r>
+          </a:p>
+        </p:txBody>
+      </p:sp>
+      <p:sp>
+        <p:nvSpPr>
+          <p:cNvPr id="11" name="Rectangle 10">
+            <a:extLst>
+              <a:ext uri="{FF2B5EF4-FFF2-40B4-BE49-F238E27FC236}">
+                <a16:creationId xmlns:a16="http://schemas.microsoft.com/office/drawing/2014/main" id="{DB842D63-838F-7AB6-7C68-C6833D427468}"/>
+              </a:ext>
+            </a:extLst>
+          </p:cNvPr>
+          <p:cNvSpPr/>
+          <p:nvPr/>
+        </p:nvSpPr>
+        <p:spPr>
+          <a:xfrm>
+            <a:off x="4196612" y="4658631"/>
+            <a:ext cx="1039529" cy="428325"/>
+          </a:xfrm>
+          <a:prstGeom prst="rect">
+            <a:avLst/>
+          </a:prstGeom>
+        </p:spPr>
+        <p:style>
+          <a:lnRef idx="2">
+            <a:schemeClr val="accent1">
+              <a:shade val="50000"/>
+            </a:schemeClr>
+          </a:lnRef>
+          <a:fillRef idx="1">
+            <a:schemeClr val="accent1"/>
+          </a:fillRef>
+          <a:effectRef idx="0">
+            <a:schemeClr val="accent1"/>
+          </a:effectRef>
+          <a:fontRef idx="minor">
+            <a:schemeClr val="lt1"/>
+          </a:fontRef>
+        </p:style>
+        <p:txBody>
+          <a:bodyPr rtlCol="0" anchor="ctr"/>
+          <a:lstStyle/>
+          <a:p>
+            <a:pPr algn="ctr"/>
+            <a:r>
+              <a:rPr lang="en-GB" dirty="0"/>
+              <a:t>r5</a:t>
+            </a:r>
+          </a:p>
+        </p:txBody>
+      </p:sp>
+      <p:sp>
+        <p:nvSpPr>
+          <p:cNvPr id="12" name="Rectangle 11">
+            <a:extLst>
+              <a:ext uri="{FF2B5EF4-FFF2-40B4-BE49-F238E27FC236}">
+                <a16:creationId xmlns:a16="http://schemas.microsoft.com/office/drawing/2014/main" id="{A136E710-70BE-AD57-55BA-CD1A232EAC83}"/>
+              </a:ext>
+            </a:extLst>
+          </p:cNvPr>
+          <p:cNvSpPr/>
+          <p:nvPr/>
+        </p:nvSpPr>
+        <p:spPr>
+          <a:xfrm>
+            <a:off x="4196612" y="5086956"/>
+            <a:ext cx="1039529" cy="428325"/>
+          </a:xfrm>
+          <a:prstGeom prst="rect">
+            <a:avLst/>
+          </a:prstGeom>
+        </p:spPr>
+        <p:style>
+          <a:lnRef idx="2">
+            <a:schemeClr val="accent1">
+              <a:shade val="50000"/>
+            </a:schemeClr>
+          </a:lnRef>
+          <a:fillRef idx="1">
+            <a:schemeClr val="accent1"/>
+          </a:fillRef>
+          <a:effectRef idx="0">
+            <a:schemeClr val="accent1"/>
+          </a:effectRef>
+          <a:fontRef idx="minor">
+            <a:schemeClr val="lt1"/>
+          </a:fontRef>
+        </p:style>
+        <p:txBody>
+          <a:bodyPr rtlCol="0" anchor="ctr"/>
+          <a:lstStyle/>
+          <a:p>
+            <a:pPr algn="ctr"/>
+            <a:r>
+              <a:rPr lang="en-GB" dirty="0" err="1"/>
+              <a:t>btns</a:t>
+            </a:r>
+            <a:endParaRPr lang="en-GB" dirty="0"/>
+          </a:p>
+        </p:txBody>
+      </p:sp>
+      <p:sp>
+        <p:nvSpPr>
+          <p:cNvPr id="13" name="Rectangle 12">
+            <a:extLst>
+              <a:ext uri="{FF2B5EF4-FFF2-40B4-BE49-F238E27FC236}">
+                <a16:creationId xmlns:a16="http://schemas.microsoft.com/office/drawing/2014/main" id="{9E7BCF26-2FC9-AFDD-A0BC-7C6F2B7F7D00}"/>
+              </a:ext>
+            </a:extLst>
+          </p:cNvPr>
+          <p:cNvSpPr/>
+          <p:nvPr/>
+        </p:nvSpPr>
+        <p:spPr>
+          <a:xfrm>
+            <a:off x="4196611" y="5515281"/>
+            <a:ext cx="1039529" cy="428325"/>
+          </a:xfrm>
+          <a:prstGeom prst="rect">
+            <a:avLst/>
+          </a:prstGeom>
+        </p:spPr>
+        <p:style>
+          <a:lnRef idx="2">
+            <a:schemeClr val="accent1">
+              <a:shade val="50000"/>
+            </a:schemeClr>
+          </a:lnRef>
+          <a:fillRef idx="1">
+            <a:schemeClr val="accent1"/>
+          </a:fillRef>
+          <a:effectRef idx="0">
+            <a:schemeClr val="accent1"/>
+          </a:effectRef>
+          <a:fontRef idx="minor">
+            <a:schemeClr val="lt1"/>
+          </a:fontRef>
+        </p:style>
+        <p:txBody>
+          <a:bodyPr rtlCol="0" anchor="ctr"/>
+          <a:lstStyle/>
+          <a:p>
+            <a:pPr algn="ctr"/>
+            <a:r>
+              <a:rPr lang="en-GB" dirty="0" err="1"/>
+              <a:t>leds</a:t>
+            </a:r>
+            <a:endParaRPr lang="en-GB" dirty="0"/>
+          </a:p>
+        </p:txBody>
+      </p:sp>
+      <p:sp>
+        <p:nvSpPr>
+          <p:cNvPr id="14" name="Trapezoid 13">
+            <a:extLst>
+              <a:ext uri="{FF2B5EF4-FFF2-40B4-BE49-F238E27FC236}">
+                <a16:creationId xmlns:a16="http://schemas.microsoft.com/office/drawing/2014/main" id="{95A393A4-C615-9720-5D4E-AF6B1B62A4FD}"/>
+              </a:ext>
+            </a:extLst>
+          </p:cNvPr>
+          <p:cNvSpPr/>
+          <p:nvPr/>
+        </p:nvSpPr>
+        <p:spPr>
+          <a:xfrm rot="5400000">
+            <a:off x="5225722" y="3161058"/>
+            <a:ext cx="856650" cy="425196"/>
+          </a:xfrm>
+          <a:prstGeom prst="trapezoid">
+            <a:avLst>
+              <a:gd name="adj" fmla="val 51033"/>
+            </a:avLst>
+          </a:prstGeom>
+        </p:spPr>
+        <p:style>
+          <a:lnRef idx="2">
+            <a:schemeClr val="accent1">
+              <a:shade val="50000"/>
+            </a:schemeClr>
+          </a:lnRef>
+          <a:fillRef idx="1">
+            <a:schemeClr val="accent1"/>
+          </a:fillRef>
+          <a:effectRef idx="0">
+            <a:schemeClr val="accent1"/>
+          </a:effectRef>
+          <a:fontRef idx="minor">
+            <a:schemeClr val="lt1"/>
+          </a:fontRef>
+        </p:style>
+        <p:txBody>
+          <a:bodyPr rtlCol="0" anchor="ctr"/>
+          <a:lstStyle/>
+          <a:p>
+            <a:pPr algn="ctr"/>
+            <a:endParaRPr lang="en-GB"/>
+          </a:p>
+        </p:txBody>
+      </p:sp>
+      <p:sp>
+        <p:nvSpPr>
+          <p:cNvPr id="16" name="Trapezoid 15">
+            <a:extLst>
+              <a:ext uri="{FF2B5EF4-FFF2-40B4-BE49-F238E27FC236}">
+                <a16:creationId xmlns:a16="http://schemas.microsoft.com/office/drawing/2014/main" id="{3BED0525-E5AB-61FD-014A-95C5625B868F}"/>
+              </a:ext>
+            </a:extLst>
+          </p:cNvPr>
+          <p:cNvSpPr/>
+          <p:nvPr/>
+        </p:nvSpPr>
+        <p:spPr>
+          <a:xfrm rot="16200000" flipH="1">
+            <a:off x="2065405" y="4017710"/>
+            <a:ext cx="3426601" cy="425196"/>
+          </a:xfrm>
+          <a:prstGeom prst="trapezoid">
+            <a:avLst>
+              <a:gd name="adj" fmla="val 78198"/>
+            </a:avLst>
+          </a:prstGeom>
+        </p:spPr>
+        <p:style>
+          <a:lnRef idx="2">
+            <a:schemeClr val="accent1">
+              <a:shade val="50000"/>
+            </a:schemeClr>
+          </a:lnRef>
+          <a:fillRef idx="1">
+            <a:schemeClr val="accent1"/>
+          </a:fillRef>
+          <a:effectRef idx="0">
+            <a:schemeClr val="accent1"/>
+          </a:effectRef>
+          <a:fontRef idx="minor">
+            <a:schemeClr val="lt1"/>
+          </a:fontRef>
+        </p:style>
+        <p:txBody>
+          <a:bodyPr rtlCol="0" anchor="ctr"/>
+          <a:lstStyle/>
+          <a:p>
+            <a:pPr algn="ctr"/>
+            <a:endParaRPr lang="en-GB"/>
+          </a:p>
+        </p:txBody>
+      </p:sp>
+      <p:sp>
+        <p:nvSpPr>
+          <p:cNvPr id="19" name="Rectangle 18">
+            <a:extLst>
+              <a:ext uri="{FF2B5EF4-FFF2-40B4-BE49-F238E27FC236}">
+                <a16:creationId xmlns:a16="http://schemas.microsoft.com/office/drawing/2014/main" id="{08B36969-6B67-3544-9188-22A7BCAEE589}"/>
+              </a:ext>
+            </a:extLst>
+          </p:cNvPr>
+          <p:cNvSpPr/>
+          <p:nvPr/>
+        </p:nvSpPr>
+        <p:spPr>
+          <a:xfrm>
+            <a:off x="6809886" y="3700914"/>
+            <a:ext cx="914400" cy="914400"/>
+          </a:xfrm>
+          <a:prstGeom prst="rect">
+            <a:avLst/>
+          </a:prstGeom>
+        </p:spPr>
+        <p:style>
+          <a:lnRef idx="2">
+            <a:schemeClr val="accent1">
+              <a:shade val="50000"/>
+            </a:schemeClr>
+          </a:lnRef>
+          <a:fillRef idx="1">
+            <a:schemeClr val="accent1"/>
+          </a:fillRef>
+          <a:effectRef idx="0">
+            <a:schemeClr val="accent1"/>
+          </a:effectRef>
+          <a:fontRef idx="minor">
+            <a:schemeClr val="lt1"/>
+          </a:fontRef>
+        </p:style>
+        <p:txBody>
+          <a:bodyPr rtlCol="0" anchor="ctr"/>
+          <a:lstStyle/>
+          <a:p>
+            <a:pPr algn="ctr"/>
+            <a:r>
+              <a:rPr lang="en-GB" dirty="0"/>
+              <a:t>ALU</a:t>
+            </a:r>
+          </a:p>
+        </p:txBody>
+      </p:sp>
+      <p:sp>
+        <p:nvSpPr>
+          <p:cNvPr id="20" name="Trapezoid 19">
+            <a:extLst>
+              <a:ext uri="{FF2B5EF4-FFF2-40B4-BE49-F238E27FC236}">
+                <a16:creationId xmlns:a16="http://schemas.microsoft.com/office/drawing/2014/main" id="{A45E68FD-12C8-20D3-09AC-B4BDAC92BA13}"/>
+              </a:ext>
+            </a:extLst>
+          </p:cNvPr>
+          <p:cNvSpPr/>
+          <p:nvPr/>
+        </p:nvSpPr>
+        <p:spPr>
+          <a:xfrm rot="5400000">
+            <a:off x="5225723" y="4874358"/>
+            <a:ext cx="856650" cy="425196"/>
+          </a:xfrm>
+          <a:prstGeom prst="trapezoid">
+            <a:avLst>
+              <a:gd name="adj" fmla="val 51033"/>
+            </a:avLst>
+          </a:prstGeom>
+        </p:spPr>
+        <p:style>
+          <a:lnRef idx="2">
+            <a:schemeClr val="accent1">
+              <a:shade val="50000"/>
+            </a:schemeClr>
+          </a:lnRef>
+          <a:fillRef idx="1">
+            <a:schemeClr val="accent1"/>
+          </a:fillRef>
+          <a:effectRef idx="0">
+            <a:schemeClr val="accent1"/>
+          </a:effectRef>
+          <a:fontRef idx="minor">
+            <a:schemeClr val="lt1"/>
+          </a:fontRef>
+        </p:style>
+        <p:txBody>
+          <a:bodyPr rtlCol="0" anchor="ctr"/>
+          <a:lstStyle/>
+          <a:p>
+            <a:pPr algn="ctr"/>
+            <a:endParaRPr lang="en-GB"/>
+          </a:p>
+        </p:txBody>
+      </p:sp>
+      <p:grpSp>
+        <p:nvGrpSpPr>
+          <p:cNvPr id="30" name="Group 29">
+            <a:extLst>
+              <a:ext uri="{FF2B5EF4-FFF2-40B4-BE49-F238E27FC236}">
+                <a16:creationId xmlns:a16="http://schemas.microsoft.com/office/drawing/2014/main" id="{06F4DFBF-EE94-C0FA-2E88-C2352612641D}"/>
+              </a:ext>
+            </a:extLst>
+          </p:cNvPr>
+          <p:cNvGrpSpPr/>
+          <p:nvPr/>
+        </p:nvGrpSpPr>
+        <p:grpSpPr>
+          <a:xfrm>
+            <a:off x="3625461" y="858873"/>
+            <a:ext cx="3436242" cy="837580"/>
+            <a:chOff x="3064821" y="671982"/>
+            <a:chExt cx="3436242" cy="837580"/>
+          </a:xfrm>
+        </p:grpSpPr>
+        <p:sp>
+          <p:nvSpPr>
+            <p:cNvPr id="22" name="Rectangle 21">
+              <a:extLst>
+                <a:ext uri="{FF2B5EF4-FFF2-40B4-BE49-F238E27FC236}">
+                  <a16:creationId xmlns:a16="http://schemas.microsoft.com/office/drawing/2014/main" id="{D7AC67FD-8027-58AB-5B90-6A0497665D96}"/>
+                </a:ext>
+              </a:extLst>
+            </p:cNvPr>
+            <p:cNvSpPr/>
+            <p:nvPr/>
+          </p:nvSpPr>
+          <p:spPr>
+            <a:xfrm>
+              <a:off x="4880809" y="1081237"/>
+              <a:ext cx="810127" cy="428325"/>
+            </a:xfrm>
+            <a:prstGeom prst="rect">
+              <a:avLst/>
+            </a:prstGeom>
+          </p:spPr>
+          <p:style>
+            <a:lnRef idx="2">
+              <a:schemeClr val="accent2">
+                <a:shade val="50000"/>
+              </a:schemeClr>
+            </a:lnRef>
+            <a:fillRef idx="1">
+              <a:schemeClr val="accent2"/>
+            </a:fillRef>
+            <a:effectRef idx="0">
+              <a:schemeClr val="accent2"/>
+            </a:effectRef>
+            <a:fontRef idx="minor">
+              <a:schemeClr val="lt1"/>
+            </a:fontRef>
+          </p:style>
+          <p:txBody>
+            <a:bodyPr rtlCol="0" anchor="ctr"/>
+            <a:lstStyle/>
+            <a:p>
+              <a:pPr algn="ctr"/>
+              <a:r>
+                <a:rPr lang="en-GB" dirty="0"/>
+                <a:t>5:3</a:t>
+              </a:r>
+            </a:p>
+          </p:txBody>
+        </p:sp>
+        <p:sp>
+          <p:nvSpPr>
+            <p:cNvPr id="23" name="Rectangle 22">
+              <a:extLst>
+                <a:ext uri="{FF2B5EF4-FFF2-40B4-BE49-F238E27FC236}">
+                  <a16:creationId xmlns:a16="http://schemas.microsoft.com/office/drawing/2014/main" id="{BBC545E8-0126-5A8C-54AB-D18218D903D2}"/>
+                </a:ext>
+              </a:extLst>
+            </p:cNvPr>
+            <p:cNvSpPr/>
+            <p:nvPr/>
+          </p:nvSpPr>
+          <p:spPr>
+            <a:xfrm>
+              <a:off x="5690936" y="1081237"/>
+              <a:ext cx="810127" cy="428325"/>
+            </a:xfrm>
+            <a:prstGeom prst="rect">
+              <a:avLst/>
+            </a:prstGeom>
+          </p:spPr>
+          <p:style>
+            <a:lnRef idx="2">
+              <a:schemeClr val="accent2">
+                <a:shade val="50000"/>
+              </a:schemeClr>
+            </a:lnRef>
+            <a:fillRef idx="1">
+              <a:schemeClr val="accent2"/>
+            </a:fillRef>
+            <a:effectRef idx="0">
+              <a:schemeClr val="accent2"/>
+            </a:effectRef>
+            <a:fontRef idx="minor">
+              <a:schemeClr val="lt1"/>
+            </a:fontRef>
+          </p:style>
+          <p:txBody>
+            <a:bodyPr rtlCol="0" anchor="ctr"/>
+            <a:lstStyle/>
+            <a:p>
+              <a:pPr algn="ctr"/>
+              <a:r>
+                <a:rPr lang="en-GB" dirty="0"/>
+                <a:t>2:0</a:t>
+              </a:r>
+            </a:p>
+          </p:txBody>
+        </p:sp>
+        <p:sp>
+          <p:nvSpPr>
+            <p:cNvPr id="24" name="Rectangle 23">
+              <a:extLst>
+                <a:ext uri="{FF2B5EF4-FFF2-40B4-BE49-F238E27FC236}">
+                  <a16:creationId xmlns:a16="http://schemas.microsoft.com/office/drawing/2014/main" id="{04C06452-669D-F36D-78D0-D4AADF9B5339}"/>
+                </a:ext>
+              </a:extLst>
+            </p:cNvPr>
+            <p:cNvSpPr/>
+            <p:nvPr/>
+          </p:nvSpPr>
+          <p:spPr>
+            <a:xfrm>
+              <a:off x="4070682" y="1081237"/>
+              <a:ext cx="810127" cy="428325"/>
+            </a:xfrm>
+            <a:prstGeom prst="rect">
+              <a:avLst/>
+            </a:prstGeom>
+          </p:spPr>
+          <p:style>
+            <a:lnRef idx="2">
+              <a:schemeClr val="accent2">
+                <a:shade val="50000"/>
+              </a:schemeClr>
+            </a:lnRef>
+            <a:fillRef idx="1">
+              <a:schemeClr val="accent2"/>
+            </a:fillRef>
+            <a:effectRef idx="0">
+              <a:schemeClr val="accent2"/>
+            </a:effectRef>
+            <a:fontRef idx="minor">
+              <a:schemeClr val="lt1"/>
+            </a:fontRef>
+          </p:style>
+          <p:txBody>
+            <a:bodyPr rtlCol="0" anchor="ctr"/>
+            <a:lstStyle/>
+            <a:p>
+              <a:pPr algn="ctr"/>
+              <a:r>
+                <a:rPr lang="en-GB" dirty="0"/>
+                <a:t>8:6</a:t>
+              </a:r>
+            </a:p>
+          </p:txBody>
+        </p:sp>
+        <p:sp>
+          <p:nvSpPr>
+            <p:cNvPr id="25" name="TextBox 24">
+              <a:extLst>
+                <a:ext uri="{FF2B5EF4-FFF2-40B4-BE49-F238E27FC236}">
+                  <a16:creationId xmlns:a16="http://schemas.microsoft.com/office/drawing/2014/main" id="{A916EC87-662C-8B6B-A9CC-B281C801BF48}"/>
+                </a:ext>
+              </a:extLst>
+            </p:cNvPr>
+            <p:cNvSpPr txBox="1"/>
+            <p:nvPr/>
+          </p:nvSpPr>
+          <p:spPr>
+            <a:xfrm>
+              <a:off x="4322498" y="671982"/>
+              <a:ext cx="306494" cy="369332"/>
+            </a:xfrm>
+            <a:prstGeom prst="rect">
+              <a:avLst/>
+            </a:prstGeom>
+            <a:noFill/>
+          </p:spPr>
+          <p:txBody>
+            <a:bodyPr wrap="none" rtlCol="0">
+              <a:spAutoFit/>
+            </a:bodyPr>
+            <a:lstStyle/>
+            <a:p>
+              <a:pPr algn="ctr"/>
+              <a:r>
+                <a:rPr lang="en-GB" dirty="0"/>
+                <a:t>o</a:t>
+              </a:r>
+            </a:p>
+          </p:txBody>
+        </p:sp>
+        <p:sp>
+          <p:nvSpPr>
+            <p:cNvPr id="26" name="TextBox 25">
+              <a:extLst>
+                <a:ext uri="{FF2B5EF4-FFF2-40B4-BE49-F238E27FC236}">
+                  <a16:creationId xmlns:a16="http://schemas.microsoft.com/office/drawing/2014/main" id="{D2AA3626-1868-955B-C3AF-1359EB4A82D7}"/>
+                </a:ext>
+              </a:extLst>
+            </p:cNvPr>
+            <p:cNvSpPr txBox="1"/>
+            <p:nvPr/>
+          </p:nvSpPr>
+          <p:spPr>
+            <a:xfrm>
+              <a:off x="5138235" y="671982"/>
+              <a:ext cx="295274" cy="369332"/>
+            </a:xfrm>
+            <a:prstGeom prst="rect">
+              <a:avLst/>
+            </a:prstGeom>
+            <a:noFill/>
+          </p:spPr>
+          <p:txBody>
+            <a:bodyPr wrap="none" rtlCol="0">
+              <a:spAutoFit/>
+            </a:bodyPr>
+            <a:lstStyle/>
+            <a:p>
+              <a:pPr algn="ctr"/>
+              <a:r>
+                <a:rPr lang="en-GB" dirty="0"/>
+                <a:t>a</a:t>
+              </a:r>
+            </a:p>
+          </p:txBody>
+        </p:sp>
+        <p:sp>
+          <p:nvSpPr>
+            <p:cNvPr id="27" name="TextBox 26">
+              <a:extLst>
+                <a:ext uri="{FF2B5EF4-FFF2-40B4-BE49-F238E27FC236}">
+                  <a16:creationId xmlns:a16="http://schemas.microsoft.com/office/drawing/2014/main" id="{C826CC46-3262-F756-2EE1-EC9864CE1778}"/>
+                </a:ext>
+              </a:extLst>
+            </p:cNvPr>
+            <p:cNvSpPr txBox="1"/>
+            <p:nvPr/>
+          </p:nvSpPr>
+          <p:spPr>
+            <a:xfrm>
+              <a:off x="5942752" y="671982"/>
+              <a:ext cx="306494" cy="369332"/>
+            </a:xfrm>
+            <a:prstGeom prst="rect">
+              <a:avLst/>
+            </a:prstGeom>
+            <a:noFill/>
+          </p:spPr>
+          <p:txBody>
+            <a:bodyPr wrap="none" rtlCol="0">
+              <a:spAutoFit/>
+            </a:bodyPr>
+            <a:lstStyle/>
+            <a:p>
+              <a:pPr algn="ctr"/>
+              <a:r>
+                <a:rPr lang="en-GB" dirty="0"/>
+                <a:t>b</a:t>
+              </a:r>
+            </a:p>
+          </p:txBody>
+        </p:sp>
+        <p:sp>
+          <p:nvSpPr>
+            <p:cNvPr id="28" name="Rectangle 27">
+              <a:extLst>
+                <a:ext uri="{FF2B5EF4-FFF2-40B4-BE49-F238E27FC236}">
+                  <a16:creationId xmlns:a16="http://schemas.microsoft.com/office/drawing/2014/main" id="{D62FFE52-FACF-6AC1-BFE8-EEF23C42A4BF}"/>
+                </a:ext>
+              </a:extLst>
+            </p:cNvPr>
+            <p:cNvSpPr/>
+            <p:nvPr/>
+          </p:nvSpPr>
+          <p:spPr>
+            <a:xfrm>
+              <a:off x="3064821" y="1081237"/>
+              <a:ext cx="1005862" cy="428325"/>
+            </a:xfrm>
+            <a:prstGeom prst="rect">
+              <a:avLst/>
+            </a:prstGeom>
+          </p:spPr>
+          <p:style>
+            <a:lnRef idx="2">
+              <a:schemeClr val="accent2">
+                <a:shade val="50000"/>
+              </a:schemeClr>
+            </a:lnRef>
+            <a:fillRef idx="1">
+              <a:schemeClr val="accent2"/>
+            </a:fillRef>
+            <a:effectRef idx="0">
+              <a:schemeClr val="accent2"/>
+            </a:effectRef>
+            <a:fontRef idx="minor">
+              <a:schemeClr val="lt1"/>
+            </a:fontRef>
+          </p:style>
+          <p:txBody>
+            <a:bodyPr rtlCol="0" anchor="ctr"/>
+            <a:lstStyle/>
+            <a:p>
+              <a:pPr algn="ctr"/>
+              <a:r>
+                <a:rPr lang="en-GB" dirty="0"/>
+                <a:t>12:9</a:t>
+              </a:r>
+            </a:p>
+          </p:txBody>
+        </p:sp>
+        <p:sp>
+          <p:nvSpPr>
+            <p:cNvPr id="29" name="TextBox 28">
+              <a:extLst>
+                <a:ext uri="{FF2B5EF4-FFF2-40B4-BE49-F238E27FC236}">
+                  <a16:creationId xmlns:a16="http://schemas.microsoft.com/office/drawing/2014/main" id="{6050585E-457E-5C1C-0323-6109E665055D}"/>
+                </a:ext>
+              </a:extLst>
+            </p:cNvPr>
+            <p:cNvSpPr txBox="1"/>
+            <p:nvPr/>
+          </p:nvSpPr>
+          <p:spPr>
+            <a:xfrm>
+              <a:off x="3351664" y="671982"/>
+              <a:ext cx="428323" cy="369332"/>
+            </a:xfrm>
+            <a:prstGeom prst="rect">
+              <a:avLst/>
+            </a:prstGeom>
+            <a:noFill/>
+          </p:spPr>
+          <p:txBody>
+            <a:bodyPr wrap="none" rtlCol="0">
+              <a:spAutoFit/>
+            </a:bodyPr>
+            <a:lstStyle/>
+            <a:p>
+              <a:pPr algn="ctr"/>
+              <a:r>
+                <a:rPr lang="en-GB" dirty="0"/>
+                <a:t>op</a:t>
+              </a:r>
+            </a:p>
+          </p:txBody>
+        </p:sp>
+      </p:grpSp>
+      <p:cxnSp>
+        <p:nvCxnSpPr>
+          <p:cNvPr id="32" name="Connector: Elbow 31">
+            <a:extLst>
+              <a:ext uri="{FF2B5EF4-FFF2-40B4-BE49-F238E27FC236}">
+                <a16:creationId xmlns:a16="http://schemas.microsoft.com/office/drawing/2014/main" id="{174B9D2F-D825-3375-EC3F-65B6FB9C4B0B}"/>
+              </a:ext>
+            </a:extLst>
+          </p:cNvPr>
+          <p:cNvCxnSpPr>
+            <a:stCxn id="14" idx="0"/>
+            <a:endCxn id="19" idx="0"/>
+          </p:cNvCxnSpPr>
+          <p:nvPr/>
+        </p:nvCxnSpPr>
+        <p:spPr>
+          <a:xfrm>
+            <a:off x="5866645" y="3373656"/>
+            <a:ext cx="1400441" cy="327258"/>
+          </a:xfrm>
+          <a:prstGeom prst="bentConnector2">
+            <a:avLst/>
+          </a:prstGeom>
+          <a:ln>
+            <a:tailEnd type="triangle"/>
+          </a:ln>
+        </p:spPr>
+        <p:style>
+          <a:lnRef idx="3">
+            <a:schemeClr val="dk1"/>
+          </a:lnRef>
+          <a:fillRef idx="0">
+            <a:schemeClr val="dk1"/>
+          </a:fillRef>
+          <a:effectRef idx="2">
+            <a:schemeClr val="dk1"/>
+          </a:effectRef>
+          <a:fontRef idx="minor">
+            <a:schemeClr val="tx1"/>
+          </a:fontRef>
+        </p:style>
+      </p:cxnSp>
+      <p:cxnSp>
+        <p:nvCxnSpPr>
+          <p:cNvPr id="34" name="Connector: Elbow 33">
+            <a:extLst>
+              <a:ext uri="{FF2B5EF4-FFF2-40B4-BE49-F238E27FC236}">
+                <a16:creationId xmlns:a16="http://schemas.microsoft.com/office/drawing/2014/main" id="{04CA80D3-8EF5-EA7F-0139-65EE8F063E06}"/>
+              </a:ext>
+            </a:extLst>
+          </p:cNvPr>
+          <p:cNvCxnSpPr>
+            <a:stCxn id="20" idx="0"/>
+            <a:endCxn id="19" idx="2"/>
+          </p:cNvCxnSpPr>
+          <p:nvPr/>
+        </p:nvCxnSpPr>
+        <p:spPr>
+          <a:xfrm flipV="1">
+            <a:off x="5866646" y="4615314"/>
+            <a:ext cx="1400440" cy="471642"/>
+          </a:xfrm>
+          <a:prstGeom prst="bentConnector2">
+            <a:avLst/>
+          </a:prstGeom>
+          <a:ln>
+            <a:tailEnd type="triangle"/>
+          </a:ln>
+        </p:spPr>
+        <p:style>
+          <a:lnRef idx="3">
+            <a:schemeClr val="dk1"/>
+          </a:lnRef>
+          <a:fillRef idx="0">
+            <a:schemeClr val="dk1"/>
+          </a:fillRef>
+          <a:effectRef idx="2">
+            <a:schemeClr val="dk1"/>
+          </a:effectRef>
+          <a:fontRef idx="minor">
+            <a:schemeClr val="tx1"/>
+          </a:fontRef>
+        </p:style>
+      </p:cxnSp>
+      <p:cxnSp>
+        <p:nvCxnSpPr>
+          <p:cNvPr id="38" name="Connector: Elbow 37">
+            <a:extLst>
+              <a:ext uri="{FF2B5EF4-FFF2-40B4-BE49-F238E27FC236}">
+                <a16:creationId xmlns:a16="http://schemas.microsoft.com/office/drawing/2014/main" id="{AE439596-3CA9-86A9-E23C-00012A778B79}"/>
+              </a:ext>
+            </a:extLst>
+          </p:cNvPr>
+          <p:cNvCxnSpPr>
+            <a:cxnSpLocks/>
+            <a:stCxn id="19" idx="3"/>
+            <a:endCxn id="16" idx="0"/>
+          </p:cNvCxnSpPr>
+          <p:nvPr/>
+        </p:nvCxnSpPr>
+        <p:spPr>
+          <a:xfrm flipH="1">
+            <a:off x="3566108" y="4158114"/>
+            <a:ext cx="4158178" cy="72195"/>
+          </a:xfrm>
+          <a:prstGeom prst="bentConnector5">
+            <a:avLst>
+              <a:gd name="adj1" fmla="val -5498"/>
+              <a:gd name="adj2" fmla="val 2889779"/>
+              <a:gd name="adj3" fmla="val 107929"/>
+            </a:avLst>
+          </a:prstGeom>
+          <a:ln>
+            <a:tailEnd type="triangle"/>
+          </a:ln>
+        </p:spPr>
+        <p:style>
+          <a:lnRef idx="3">
+            <a:schemeClr val="dk1"/>
+          </a:lnRef>
+          <a:fillRef idx="0">
+            <a:schemeClr val="dk1"/>
+          </a:fillRef>
+          <a:effectRef idx="2">
+            <a:schemeClr val="dk1"/>
+          </a:effectRef>
+          <a:fontRef idx="minor">
+            <a:schemeClr val="tx1"/>
+          </a:fontRef>
+        </p:style>
+      </p:cxnSp>
+      <p:cxnSp>
+        <p:nvCxnSpPr>
+          <p:cNvPr id="53" name="Connector: Elbow 52">
+            <a:extLst>
+              <a:ext uri="{FF2B5EF4-FFF2-40B4-BE49-F238E27FC236}">
+                <a16:creationId xmlns:a16="http://schemas.microsoft.com/office/drawing/2014/main" id="{C27CD05B-1F0C-2DC2-5BCB-D5247405DD43}"/>
+              </a:ext>
+            </a:extLst>
+          </p:cNvPr>
+          <p:cNvCxnSpPr>
+            <a:cxnSpLocks/>
+            <a:stCxn id="24" idx="2"/>
+            <a:endCxn id="16" idx="1"/>
+          </p:cNvCxnSpPr>
+          <p:nvPr/>
+        </p:nvCxnSpPr>
+        <p:spPr>
+          <a:xfrm rot="5400000">
+            <a:off x="3914145" y="1561014"/>
+            <a:ext cx="986802" cy="1257681"/>
+          </a:xfrm>
+          <a:prstGeom prst="bentConnector3">
+            <a:avLst>
+              <a:gd name="adj1" fmla="val 50000"/>
+            </a:avLst>
+          </a:prstGeom>
+          <a:ln>
+            <a:tailEnd type="triangle"/>
+          </a:ln>
+        </p:spPr>
+        <p:style>
+          <a:lnRef idx="3">
+            <a:schemeClr val="accent2"/>
+          </a:lnRef>
+          <a:fillRef idx="0">
+            <a:schemeClr val="accent2"/>
+          </a:fillRef>
+          <a:effectRef idx="2">
+            <a:schemeClr val="accent2"/>
+          </a:effectRef>
+          <a:fontRef idx="minor">
+            <a:schemeClr val="tx1"/>
+          </a:fontRef>
+        </p:style>
+      </p:cxnSp>
+      <p:cxnSp>
+        <p:nvCxnSpPr>
+          <p:cNvPr id="57" name="Connector: Elbow 56">
+            <a:extLst>
+              <a:ext uri="{FF2B5EF4-FFF2-40B4-BE49-F238E27FC236}">
+                <a16:creationId xmlns:a16="http://schemas.microsoft.com/office/drawing/2014/main" id="{B14AF3BA-85ED-DBFE-73BB-EBFD81670F8C}"/>
+              </a:ext>
+            </a:extLst>
+          </p:cNvPr>
+          <p:cNvCxnSpPr>
+            <a:stCxn id="22" idx="2"/>
+            <a:endCxn id="14" idx="1"/>
+          </p:cNvCxnSpPr>
+          <p:nvPr/>
+        </p:nvCxnSpPr>
+        <p:spPr>
+          <a:xfrm rot="5400000">
+            <a:off x="5071594" y="2278906"/>
+            <a:ext cx="1357373" cy="192466"/>
+          </a:xfrm>
+          <a:prstGeom prst="bentConnector3">
+            <a:avLst>
+              <a:gd name="adj1" fmla="val 35463"/>
+            </a:avLst>
+          </a:prstGeom>
+          <a:ln>
+            <a:tailEnd type="triangle"/>
+          </a:ln>
+        </p:spPr>
+        <p:style>
+          <a:lnRef idx="3">
+            <a:schemeClr val="accent2"/>
+          </a:lnRef>
+          <a:fillRef idx="0">
+            <a:schemeClr val="accent2"/>
+          </a:fillRef>
+          <a:effectRef idx="2">
+            <a:schemeClr val="accent2"/>
+          </a:effectRef>
+          <a:fontRef idx="minor">
+            <a:schemeClr val="tx1"/>
+          </a:fontRef>
+        </p:style>
+      </p:cxnSp>
+      <p:cxnSp>
+        <p:nvCxnSpPr>
+          <p:cNvPr id="59" name="Connector: Elbow 58">
+            <a:extLst>
+              <a:ext uri="{FF2B5EF4-FFF2-40B4-BE49-F238E27FC236}">
+                <a16:creationId xmlns:a16="http://schemas.microsoft.com/office/drawing/2014/main" id="{87A28614-34ED-2CB5-3D77-569508431C45}"/>
+              </a:ext>
+            </a:extLst>
+          </p:cNvPr>
+          <p:cNvCxnSpPr>
+            <a:stCxn id="23" idx="2"/>
+            <a:endCxn id="20" idx="1"/>
+          </p:cNvCxnSpPr>
+          <p:nvPr/>
+        </p:nvCxnSpPr>
+        <p:spPr>
+          <a:xfrm rot="5400000">
+            <a:off x="4620008" y="2730493"/>
+            <a:ext cx="3070673" cy="1002592"/>
+          </a:xfrm>
+          <a:prstGeom prst="bentConnector3">
+            <a:avLst>
+              <a:gd name="adj1" fmla="val 78211"/>
+            </a:avLst>
+          </a:prstGeom>
+          <a:ln>
+            <a:tailEnd type="triangle"/>
+          </a:ln>
+        </p:spPr>
+        <p:style>
+          <a:lnRef idx="3">
+            <a:schemeClr val="accent2"/>
+          </a:lnRef>
+          <a:fillRef idx="0">
+            <a:schemeClr val="accent2"/>
+          </a:fillRef>
+          <a:effectRef idx="2">
+            <a:schemeClr val="accent2"/>
+          </a:effectRef>
+          <a:fontRef idx="minor">
+            <a:schemeClr val="tx1"/>
+          </a:fontRef>
+        </p:style>
+      </p:cxnSp>
+      <p:cxnSp>
+        <p:nvCxnSpPr>
+          <p:cNvPr id="67" name="Connector: Elbow 66">
+            <a:extLst>
+              <a:ext uri="{FF2B5EF4-FFF2-40B4-BE49-F238E27FC236}">
+                <a16:creationId xmlns:a16="http://schemas.microsoft.com/office/drawing/2014/main" id="{FE3C754B-49C8-1A3A-475A-3E3D245B485B}"/>
+              </a:ext>
+            </a:extLst>
+          </p:cNvPr>
+          <p:cNvCxnSpPr>
+            <a:cxnSpLocks/>
+            <a:stCxn id="28" idx="2"/>
+            <a:endCxn id="68" idx="0"/>
+          </p:cNvCxnSpPr>
+          <p:nvPr/>
+        </p:nvCxnSpPr>
+        <p:spPr>
+          <a:xfrm rot="16200000" flipH="1">
+            <a:off x="4799976" y="1024869"/>
+            <a:ext cx="2008125" cy="3351292"/>
+          </a:xfrm>
+          <a:prstGeom prst="bentConnector3">
+            <a:avLst>
+              <a:gd name="adj1" fmla="val 11950"/>
+            </a:avLst>
+          </a:prstGeom>
+          <a:ln>
+            <a:tailEnd type="triangle"/>
+          </a:ln>
+        </p:spPr>
+        <p:style>
+          <a:lnRef idx="3">
+            <a:schemeClr val="accent2"/>
+          </a:lnRef>
+          <a:fillRef idx="0">
+            <a:schemeClr val="accent2"/>
+          </a:fillRef>
+          <a:effectRef idx="2">
+            <a:schemeClr val="accent2"/>
+          </a:effectRef>
+          <a:fontRef idx="minor">
+            <a:schemeClr val="tx1"/>
+          </a:fontRef>
+        </p:style>
+      </p:cxnSp>
+      <p:sp>
+        <p:nvSpPr>
+          <p:cNvPr id="68" name="Rectangle 67">
+            <a:extLst>
+              <a:ext uri="{FF2B5EF4-FFF2-40B4-BE49-F238E27FC236}">
+                <a16:creationId xmlns:a16="http://schemas.microsoft.com/office/drawing/2014/main" id="{CC0C3A94-B290-2073-4490-E2D2218BFBD0}"/>
+              </a:ext>
+            </a:extLst>
+          </p:cNvPr>
+          <p:cNvSpPr/>
+          <p:nvPr/>
+        </p:nvSpPr>
+        <p:spPr>
+          <a:xfrm>
+            <a:off x="7382281" y="3704578"/>
+            <a:ext cx="194805" cy="194805"/>
+          </a:xfrm>
+          <a:prstGeom prst="rect">
+            <a:avLst/>
+          </a:prstGeom>
+          <a:noFill/>
+          <a:ln>
+            <a:noFill/>
+          </a:ln>
+        </p:spPr>
+        <p:style>
+          <a:lnRef idx="2">
+            <a:schemeClr val="accent1">
+              <a:shade val="50000"/>
+            </a:schemeClr>
+          </a:lnRef>
+          <a:fillRef idx="1">
+            <a:schemeClr val="accent1"/>
+          </a:fillRef>
+          <a:effectRef idx="0">
+            <a:schemeClr val="accent1"/>
+          </a:effectRef>
+          <a:fontRef idx="minor">
+            <a:schemeClr val="lt1"/>
+          </a:fontRef>
+        </p:style>
+        <p:txBody>
+          <a:bodyPr rtlCol="0" anchor="ctr"/>
+          <a:lstStyle/>
+          <a:p>
+            <a:pPr algn="ctr"/>
+            <a:endParaRPr lang="en-GB"/>
+          </a:p>
+        </p:txBody>
+      </p:sp>
+      <p:sp>
+        <p:nvSpPr>
+          <p:cNvPr id="77" name="TextBox 76">
+            <a:extLst>
+              <a:ext uri="{FF2B5EF4-FFF2-40B4-BE49-F238E27FC236}">
+                <a16:creationId xmlns:a16="http://schemas.microsoft.com/office/drawing/2014/main" id="{5DF7A08A-7092-C6E9-6523-BC37EA94BB22}"/>
+              </a:ext>
+            </a:extLst>
+          </p:cNvPr>
+          <p:cNvSpPr txBox="1"/>
+          <p:nvPr/>
+        </p:nvSpPr>
+        <p:spPr>
+          <a:xfrm>
+            <a:off x="4385586" y="513791"/>
+            <a:ext cx="1701108" cy="369332"/>
+          </a:xfrm>
+          <a:prstGeom prst="rect">
+            <a:avLst/>
+          </a:prstGeom>
+          <a:noFill/>
+        </p:spPr>
+        <p:txBody>
+          <a:bodyPr wrap="none" rtlCol="0">
+            <a:spAutoFit/>
+          </a:bodyPr>
+          <a:lstStyle/>
+          <a:p>
+            <a:pPr algn="ctr"/>
+            <a:r>
+              <a:rPr lang="en-GB" dirty="0">
+                <a:latin typeface="Courier New" panose="02070309020205020404" pitchFamily="49" charset="0"/>
+                <a:cs typeface="Courier New" panose="02070309020205020404" pitchFamily="49" charset="0"/>
+              </a:rPr>
+              <a:t>o &lt;- a op b</a:t>
+            </a:r>
+          </a:p>
+        </p:txBody>
+      </p:sp>
+      <p:sp>
+        <p:nvSpPr>
+          <p:cNvPr id="81" name="TextBox 80">
+            <a:extLst>
+              <a:ext uri="{FF2B5EF4-FFF2-40B4-BE49-F238E27FC236}">
+                <a16:creationId xmlns:a16="http://schemas.microsoft.com/office/drawing/2014/main" id="{52D95111-6666-63A3-36E6-DD5F65E190EC}"/>
+              </a:ext>
+            </a:extLst>
+          </p:cNvPr>
+          <p:cNvSpPr txBox="1"/>
+          <p:nvPr/>
+        </p:nvSpPr>
+        <p:spPr>
+          <a:xfrm>
+            <a:off x="1985490" y="1025788"/>
+            <a:ext cx="1629809" cy="923330"/>
+          </a:xfrm>
+          <a:prstGeom prst="rect">
+            <a:avLst/>
+          </a:prstGeom>
+          <a:noFill/>
+        </p:spPr>
+        <p:txBody>
+          <a:bodyPr wrap="square" rtlCol="0">
+            <a:spAutoFit/>
+          </a:bodyPr>
+          <a:lstStyle/>
+          <a:p>
+            <a:r>
+              <a:rPr lang="en-GB" dirty="0"/>
+              <a:t>Assembled instructions are 13-bits long</a:t>
+            </a:r>
+          </a:p>
+        </p:txBody>
+      </p:sp>
+      <p:sp>
+        <p:nvSpPr>
+          <p:cNvPr id="82" name="TextBox 81">
+            <a:extLst>
+              <a:ext uri="{FF2B5EF4-FFF2-40B4-BE49-F238E27FC236}">
+                <a16:creationId xmlns:a16="http://schemas.microsoft.com/office/drawing/2014/main" id="{8FC7DDFA-5607-54BC-C13F-AC29F7B88B72}"/>
+              </a:ext>
+            </a:extLst>
+          </p:cNvPr>
+          <p:cNvSpPr txBox="1"/>
+          <p:nvPr/>
+        </p:nvSpPr>
+        <p:spPr>
+          <a:xfrm>
+            <a:off x="1989878" y="2503673"/>
+            <a:ext cx="1446335" cy="1200329"/>
+          </a:xfrm>
+          <a:prstGeom prst="rect">
+            <a:avLst/>
+          </a:prstGeom>
+          <a:noFill/>
+        </p:spPr>
+        <p:txBody>
+          <a:bodyPr wrap="square" rtlCol="0">
+            <a:spAutoFit/>
+          </a:bodyPr>
+          <a:lstStyle/>
+          <a:p>
+            <a:r>
+              <a:rPr lang="en-GB" dirty="0"/>
+              <a:t>6 registers, but no RAM. 2 “special” registers</a:t>
+            </a:r>
+          </a:p>
+        </p:txBody>
+      </p:sp>
+    </p:spTree>
+    <p:extLst>
+      <p:ext uri="{BB962C8B-B14F-4D97-AF65-F5344CB8AC3E}">
+        <p14:creationId xmlns:p14="http://schemas.microsoft.com/office/powerpoint/2010/main" val="2637868964"/>
+      </p:ext>
+    </p:extLst>
+  </p:cSld>
+  <p:clrMapOvr>
+    <a:masterClrMapping/>
+  </p:clrMapOvr>
+</p:sld>
+</file>
+
 <file path=ppt/theme/theme1.xml><?xml version="1.0" encoding="utf-8"?>
 <a:theme xmlns:a="http://schemas.openxmlformats.org/drawingml/2006/main" name="Office Theme">
   <a:themeElements>

</xml_diff>